<commit_message>
before end of class
</commit_message>
<xml_diff>
--- a/NSS Capstone Ann Rumsey.pptx
+++ b/NSS Capstone Ann Rumsey.pptx
@@ -8,10 +8,15 @@
     <p:sldId id="257" r:id="rId5"/>
     <p:sldId id="261" r:id="rId6"/>
     <p:sldId id="262" r:id="rId7"/>
-    <p:sldId id="263" r:id="rId8"/>
-    <p:sldId id="264" r:id="rId9"/>
-    <p:sldId id="265" r:id="rId10"/>
-    <p:sldId id="266" r:id="rId11"/>
+    <p:sldId id="271" r:id="rId8"/>
+    <p:sldId id="268" r:id="rId9"/>
+    <p:sldId id="270" r:id="rId10"/>
+    <p:sldId id="269" r:id="rId11"/>
+    <p:sldId id="267" r:id="rId12"/>
+    <p:sldId id="263" r:id="rId13"/>
+    <p:sldId id="264" r:id="rId14"/>
+    <p:sldId id="265" r:id="rId15"/>
+    <p:sldId id="266" r:id="rId16"/>
   </p:sldIdLst>
   <p:sldSz cx="12192000" cy="6858000"/>
   <p:notesSz cx="6858000" cy="9144000"/>
@@ -171,7 +176,7 @@
                   <a:bodyPr/>
                   <a:lstStyle/>
                   <a:p>
-                    <a:fld id="{6816C2E5-7477-46F7-BF94-FC7A1B871917}" type="CELLRANGE">
+                    <a:fld id="{FB4A12AF-9100-43CD-8058-62E5327470D8}" type="CELLRANGE">
                       <a:rPr lang="en-US"/>
                       <a:pPr/>
                       <a:t>[CELLRANGE]</a:t>
@@ -205,7 +210,7 @@
                   <a:bodyPr/>
                   <a:lstStyle/>
                   <a:p>
-                    <a:fld id="{BFFF86E9-6836-4A41-AEE3-2DF3E2472237}" type="CELLRANGE">
+                    <a:fld id="{F6961B57-C1A9-4331-8B00-103082DB8311}" type="CELLRANGE">
                       <a:rPr lang="en-US"/>
                       <a:pPr/>
                       <a:t>[CELLRANGE]</a:t>
@@ -239,7 +244,7 @@
                   <a:bodyPr/>
                   <a:lstStyle/>
                   <a:p>
-                    <a:fld id="{A64F7C55-2D22-4443-8245-1C81DD5E1F7B}" type="CELLRANGE">
+                    <a:fld id="{52EF42F2-BDB2-46FB-9EFF-D017EC6B6BE7}" type="CELLRANGE">
                       <a:rPr lang="en-US"/>
                       <a:pPr/>
                       <a:t>[CELLRANGE]</a:t>
@@ -273,7 +278,7 @@
                   <a:bodyPr/>
                   <a:lstStyle/>
                   <a:p>
-                    <a:fld id="{40E97963-E2D0-4975-BDC5-8182EBB4245D}" type="CELLRANGE">
+                    <a:fld id="{96E302C3-29DF-4569-BFFA-54627E662BB9}" type="CELLRANGE">
                       <a:rPr lang="en-US"/>
                       <a:pPr/>
                       <a:t>[CELLRANGE]</a:t>
@@ -307,7 +312,7 @@
                   <a:bodyPr/>
                   <a:lstStyle/>
                   <a:p>
-                    <a:fld id="{B480E333-68EB-4085-82FD-5420995FD1FC}" type="CELLRANGE">
+                    <a:fld id="{86EC1849-C110-420A-BBE6-4AEDE57AFC6A}" type="CELLRANGE">
                       <a:rPr lang="en-US"/>
                       <a:pPr/>
                       <a:t>[CELLRANGE]</a:t>
@@ -341,7 +346,7 @@
                   <a:bodyPr/>
                   <a:lstStyle/>
                   <a:p>
-                    <a:fld id="{E571BD26-1251-425E-8632-53815DD1B28D}" type="CELLRANGE">
+                    <a:fld id="{DF2B8D4A-6D24-4057-B113-F4F38988A9EC}" type="CELLRANGE">
                       <a:rPr lang="en-US"/>
                       <a:pPr/>
                       <a:t>[CELLRANGE]</a:t>
@@ -375,7 +380,7 @@
                   <a:bodyPr/>
                   <a:lstStyle/>
                   <a:p>
-                    <a:fld id="{72FC6225-7F30-4A61-A492-9322B589C37F}" type="CELLRANGE">
+                    <a:fld id="{563B4982-C5B0-460D-9F7E-67C51D6DD32A}" type="CELLRANGE">
                       <a:rPr lang="en-US"/>
                       <a:pPr/>
                       <a:t>[CELLRANGE]</a:t>
@@ -409,7 +414,7 @@
                   <a:bodyPr/>
                   <a:lstStyle/>
                   <a:p>
-                    <a:fld id="{712F312E-3F1C-40A3-8F21-82586153CB86}" type="CELLRANGE">
+                    <a:fld id="{8AF05BD5-5184-4DBE-8210-5F865870D10B}" type="CELLRANGE">
                       <a:rPr lang="en-US"/>
                       <a:pPr/>
                       <a:t>[CELLRANGE]</a:t>
@@ -443,7 +448,7 @@
                   <a:bodyPr/>
                   <a:lstStyle/>
                   <a:p>
-                    <a:fld id="{EDDECFE8-F301-44A1-8787-EAD963E3CEAB}" type="CELLRANGE">
+                    <a:fld id="{A8DD1AB2-B018-4F0A-BF6F-8EFFBACC48FF}" type="CELLRANGE">
                       <a:rPr lang="en-US"/>
                       <a:pPr/>
                       <a:t>[CELLRANGE]</a:t>
@@ -477,7 +482,7 @@
                   <a:bodyPr/>
                   <a:lstStyle/>
                   <a:p>
-                    <a:fld id="{1AE2CB16-D061-428E-9DA7-A6FFBCC3D705}" type="CELLRANGE">
+                    <a:fld id="{C99BAA3D-C70F-4BF7-8C0B-C2BF3A054233}" type="CELLRANGE">
                       <a:rPr lang="en-US"/>
                       <a:pPr/>
                       <a:t>[CELLRANGE]</a:t>
@@ -511,7 +516,7 @@
                   <a:bodyPr/>
                   <a:lstStyle/>
                   <a:p>
-                    <a:fld id="{A052B3D5-C445-48A9-A50D-63DDE5488723}" type="CELLRANGE">
+                    <a:fld id="{232B7251-1EB5-4A6D-B5DF-CE926C3F1DEC}" type="CELLRANGE">
                       <a:rPr lang="en-US"/>
                       <a:pPr/>
                       <a:t>[CELLRANGE]</a:t>
@@ -545,7 +550,7 @@
                   <a:bodyPr/>
                   <a:lstStyle/>
                   <a:p>
-                    <a:fld id="{8198E177-6DF3-4B54-B81A-5E55BB0AF412}" type="CELLRANGE">
+                    <a:fld id="{7951147D-C4D9-49E9-9297-D8D207CC3CA2}" type="CELLRANGE">
                       <a:rPr lang="en-US"/>
                       <a:pPr/>
                       <a:t>[CELLRANGE]</a:t>
@@ -579,7 +584,7 @@
                   <a:bodyPr/>
                   <a:lstStyle/>
                   <a:p>
-                    <a:fld id="{30585ECE-9743-41D7-B203-8F430F535453}" type="CELLRANGE">
+                    <a:fld id="{812337AD-8AE7-4476-9F4A-9C07831BA14E}" type="CELLRANGE">
                       <a:rPr lang="en-US"/>
                       <a:pPr/>
                       <a:t>[CELLRANGE]</a:t>
@@ -613,7 +618,7 @@
                   <a:bodyPr/>
                   <a:lstStyle/>
                   <a:p>
-                    <a:fld id="{4D1A4F92-C0F7-4C17-9402-255589BD88B0}" type="CELLRANGE">
+                    <a:fld id="{201D9504-3B03-4969-84B0-1B45719DF5DE}" type="CELLRANGE">
                       <a:rPr lang="en-US"/>
                       <a:pPr/>
                       <a:t>[CELLRANGE]</a:t>
@@ -647,7 +652,7 @@
                   <a:bodyPr/>
                   <a:lstStyle/>
                   <a:p>
-                    <a:fld id="{C1965715-5404-4C3C-9317-FD9AFD33B94D}" type="CELLRANGE">
+                    <a:fld id="{42F35E4C-4FCC-4354-8A8E-7287C294832E}" type="CELLRANGE">
                       <a:rPr lang="en-US"/>
                       <a:pPr/>
                       <a:t>[CELLRANGE]</a:t>
@@ -681,7 +686,7 @@
                   <a:bodyPr/>
                   <a:lstStyle/>
                   <a:p>
-                    <a:fld id="{D0791A6C-4172-44CB-A03D-B4A8FBEEC943}" type="CELLRANGE">
+                    <a:fld id="{5E337AD0-FFD9-44BD-8BB9-3D628C2EE3EE}" type="CELLRANGE">
                       <a:rPr lang="en-US"/>
                       <a:pPr/>
                       <a:t>[CELLRANGE]</a:t>
@@ -715,7 +720,7 @@
                   <a:bodyPr/>
                   <a:lstStyle/>
                   <a:p>
-                    <a:fld id="{432F7B0B-9D6D-4A20-8D51-B9DDBB9D5335}" type="CELLRANGE">
+                    <a:fld id="{7780ACC9-B442-474D-AC40-0EACC227F849}" type="CELLRANGE">
                       <a:rPr lang="en-US"/>
                       <a:pPr/>
                       <a:t>[CELLRANGE]</a:t>
@@ -749,7 +754,7 @@
                   <a:bodyPr/>
                   <a:lstStyle/>
                   <a:p>
-                    <a:fld id="{E7529E4A-1DCE-450D-B832-32555FA6B703}" type="CELLRANGE">
+                    <a:fld id="{ACD10A03-25CD-47B2-8164-5A70228779C2}" type="CELLRANGE">
                       <a:rPr lang="en-US"/>
                       <a:pPr/>
                       <a:t>[CELLRANGE]</a:t>
@@ -783,7 +788,7 @@
                   <a:bodyPr/>
                   <a:lstStyle/>
                   <a:p>
-                    <a:fld id="{F4C054C4-C05B-4A71-B455-332C05E32364}" type="CELLRANGE">
+                    <a:fld id="{7484B10A-7087-4523-B175-DC821864D365}" type="CELLRANGE">
                       <a:rPr lang="en-US"/>
                       <a:pPr/>
                       <a:t>[CELLRANGE]</a:t>
@@ -817,7 +822,7 @@
                   <a:bodyPr/>
                   <a:lstStyle/>
                   <a:p>
-                    <a:fld id="{744345B8-C573-482E-BD3D-B3C78C6B2CBE}" type="CELLRANGE">
+                    <a:fld id="{4FBD49DD-3424-48F8-B50B-681BD669BE4B}" type="CELLRANGE">
                       <a:rPr lang="en-US"/>
                       <a:pPr/>
                       <a:t>[CELLRANGE]</a:t>
@@ -851,7 +856,7 @@
                   <a:bodyPr/>
                   <a:lstStyle/>
                   <a:p>
-                    <a:fld id="{A5CC9BBE-B89A-4391-88C7-89CE26FBD6EB}" type="CELLRANGE">
+                    <a:fld id="{174C7F46-F0AC-4080-AB53-E003E4C65943}" type="CELLRANGE">
                       <a:rPr lang="en-US"/>
                       <a:pPr/>
                       <a:t>[CELLRANGE]</a:t>
@@ -885,7 +890,7 @@
                   <a:bodyPr/>
                   <a:lstStyle/>
                   <a:p>
-                    <a:fld id="{F57D8F61-0539-497B-B938-BA8503FA28F4}" type="CELLRANGE">
+                    <a:fld id="{D349FDC8-BAB0-475B-9419-02D5F65F0586}" type="CELLRANGE">
                       <a:rPr lang="en-US"/>
                       <a:pPr/>
                       <a:t>[CELLRANGE]</a:t>
@@ -919,7 +924,7 @@
                   <a:bodyPr/>
                   <a:lstStyle/>
                   <a:p>
-                    <a:fld id="{8E31FDC0-A953-451A-977B-D6379CFE1885}" type="CELLRANGE">
+                    <a:fld id="{14951565-D6AB-4EEE-A96A-19C9E31C949B}" type="CELLRANGE">
                       <a:rPr lang="en-US"/>
                       <a:pPr/>
                       <a:t>[CELLRANGE]</a:t>
@@ -953,7 +958,7 @@
                   <a:bodyPr/>
                   <a:lstStyle/>
                   <a:p>
-                    <a:fld id="{20B14D76-F0AE-4EE1-A007-1C49645E40A5}" type="CELLRANGE">
+                    <a:fld id="{8F6BFF00-E18E-4E38-970A-FC7BED213DA5}" type="CELLRANGE">
                       <a:rPr lang="en-US"/>
                       <a:pPr/>
                       <a:t>[CELLRANGE]</a:t>
@@ -987,7 +992,7 @@
                   <a:bodyPr/>
                   <a:lstStyle/>
                   <a:p>
-                    <a:fld id="{17C4486B-5BE7-46C1-BB98-B426B1B2DFEC}" type="CELLRANGE">
+                    <a:fld id="{E9C83FD8-268F-4D61-ABC9-08833AB8B121}" type="CELLRANGE">
                       <a:rPr lang="en-US"/>
                       <a:pPr/>
                       <a:t>[CELLRANGE]</a:t>
@@ -1021,7 +1026,7 @@
                   <a:bodyPr/>
                   <a:lstStyle/>
                   <a:p>
-                    <a:fld id="{CEB65EA1-202D-4609-B12F-757DC1C8293D}" type="CELLRANGE">
+                    <a:fld id="{677C65DF-DCD4-483B-A8BA-B560D7B0FE4C}" type="CELLRANGE">
                       <a:rPr lang="en-US"/>
                       <a:pPr/>
                       <a:t>[CELLRANGE]</a:t>
@@ -1055,7 +1060,7 @@
                   <a:bodyPr/>
                   <a:lstStyle/>
                   <a:p>
-                    <a:fld id="{C8479EE6-4222-44B7-BE4D-24FA7177DF7E}" type="CELLRANGE">
+                    <a:fld id="{1E47367E-6677-4C38-9CF1-9153267C2CAB}" type="CELLRANGE">
                       <a:rPr lang="en-US"/>
                       <a:pPr/>
                       <a:t>[CELLRANGE]</a:t>
@@ -1089,7 +1094,7 @@
                   <a:bodyPr/>
                   <a:lstStyle/>
                   <a:p>
-                    <a:fld id="{62E03539-44D3-4FFA-809F-5AFB21EC1957}" type="CELLRANGE">
+                    <a:fld id="{BA68B868-97D5-4AEE-AEA3-0EBF4F1E6841}" type="CELLRANGE">
                       <a:rPr lang="en-US"/>
                       <a:pPr/>
                       <a:t>[CELLRANGE]</a:t>
@@ -1123,7 +1128,7 @@
                   <a:bodyPr/>
                   <a:lstStyle/>
                   <a:p>
-                    <a:fld id="{2C0A99EA-FA34-4804-8007-42F50E36DDDA}" type="CELLRANGE">
+                    <a:fld id="{8E7C3F5F-EBC7-4930-89C9-3E0E4CEF326D}" type="CELLRANGE">
                       <a:rPr lang="en-US"/>
                       <a:pPr/>
                       <a:t>[CELLRANGE]</a:t>
@@ -1157,7 +1162,7 @@
                   <a:bodyPr/>
                   <a:lstStyle/>
                   <a:p>
-                    <a:fld id="{0C363271-1658-4E01-A790-EEC6FDA1663E}" type="CELLRANGE">
+                    <a:fld id="{B1956448-1A36-4587-91A5-B2E64687FB2C}" type="CELLRANGE">
                       <a:rPr lang="en-US"/>
                       <a:pPr/>
                       <a:t>[CELLRANGE]</a:t>
@@ -1191,7 +1196,7 @@
                   <a:bodyPr/>
                   <a:lstStyle/>
                   <a:p>
-                    <a:fld id="{65B56F3D-0853-4296-9A67-EE9D0BED0EEF}" type="CELLRANGE">
+                    <a:fld id="{B2EA6A63-3EF5-47C5-B069-981854D6BE4F}" type="CELLRANGE">
                       <a:rPr lang="en-US"/>
                       <a:pPr/>
                       <a:t>[CELLRANGE]</a:t>
@@ -1225,7 +1230,7 @@
                   <a:bodyPr/>
                   <a:lstStyle/>
                   <a:p>
-                    <a:fld id="{6ACD3D96-131C-42D4-ABC1-109C21C361A2}" type="CELLRANGE">
+                    <a:fld id="{D9888201-7F48-417E-8087-A62B520F0DF9}" type="CELLRANGE">
                       <a:rPr lang="en-US"/>
                       <a:pPr/>
                       <a:t>[CELLRANGE]</a:t>
@@ -1259,7 +1264,7 @@
                   <a:bodyPr/>
                   <a:lstStyle/>
                   <a:p>
-                    <a:fld id="{3C28AA56-8355-41AA-A680-8982758EC0F0}" type="CELLRANGE">
+                    <a:fld id="{B7901D5F-102A-4BA4-AE2F-4ED9C6C3C319}" type="CELLRANGE">
                       <a:rPr lang="en-US"/>
                       <a:pPr/>
                       <a:t>[CELLRANGE]</a:t>
@@ -1293,7 +1298,7 @@
                   <a:bodyPr/>
                   <a:lstStyle/>
                   <a:p>
-                    <a:fld id="{19058F3E-6188-49CC-99EC-7D216B4AF07E}" type="CELLRANGE">
+                    <a:fld id="{19B9C2DF-ABE5-494E-9690-8B19FBCD96A3}" type="CELLRANGE">
                       <a:rPr lang="en-US"/>
                       <a:pPr/>
                       <a:t>[CELLRANGE]</a:t>
@@ -1327,7 +1332,7 @@
                   <a:bodyPr/>
                   <a:lstStyle/>
                   <a:p>
-                    <a:fld id="{07431AFA-14F6-4914-B1DB-4DA83A44640A}" type="CELLRANGE">
+                    <a:fld id="{21496302-FC26-4F18-BE3B-2905BE365938}" type="CELLRANGE">
                       <a:rPr lang="en-US"/>
                       <a:pPr/>
                       <a:t>[CELLRANGE]</a:t>
@@ -1361,7 +1366,7 @@
                   <a:bodyPr/>
                   <a:lstStyle/>
                   <a:p>
-                    <a:fld id="{C47F6432-E8F3-45DE-828A-B7F8E68B3026}" type="CELLRANGE">
+                    <a:fld id="{F29BC5D8-7075-45F2-9D79-7FAE4B0A0F7F}" type="CELLRANGE">
                       <a:rPr lang="en-US"/>
                       <a:pPr/>
                       <a:t>[CELLRANGE]</a:t>
@@ -1395,7 +1400,7 @@
                   <a:bodyPr/>
                   <a:lstStyle/>
                   <a:p>
-                    <a:fld id="{73EA6B77-C064-44A4-8CBC-5C9E75B58489}" type="CELLRANGE">
+                    <a:fld id="{F0FCDB62-2857-428C-B765-2792DD9F96B5}" type="CELLRANGE">
                       <a:rPr lang="en-US"/>
                       <a:pPr/>
                       <a:t>[CELLRANGE]</a:t>
@@ -1429,7 +1434,7 @@
                   <a:bodyPr/>
                   <a:lstStyle/>
                   <a:p>
-                    <a:fld id="{EB38D320-89FA-4B8F-86E0-660E9565EEEB}" type="CELLRANGE">
+                    <a:fld id="{578731A4-87A5-4741-A4E1-55D9750E39A4}" type="CELLRANGE">
                       <a:rPr lang="en-US"/>
                       <a:pPr/>
                       <a:t>[CELLRANGE]</a:t>
@@ -1463,7 +1468,7 @@
                   <a:bodyPr/>
                   <a:lstStyle/>
                   <a:p>
-                    <a:fld id="{2A03492F-D26B-441B-A3C4-4EEB826F4FFB}" type="CELLRANGE">
+                    <a:fld id="{B96F25FE-5539-4134-AD9F-C1C9746F5BC2}" type="CELLRANGE">
                       <a:rPr lang="en-US"/>
                       <a:pPr/>
                       <a:t>[CELLRANGE]</a:t>
@@ -1497,7 +1502,7 @@
                   <a:bodyPr/>
                   <a:lstStyle/>
                   <a:p>
-                    <a:fld id="{A7B398DF-2292-4AC5-AD71-C2A88922201B}" type="CELLRANGE">
+                    <a:fld id="{B45CBD68-CC70-49DF-9758-2F7F6BA327AC}" type="CELLRANGE">
                       <a:rPr lang="en-US"/>
                       <a:pPr/>
                       <a:t>[CELLRANGE]</a:t>
@@ -1531,7 +1536,7 @@
                   <a:bodyPr/>
                   <a:lstStyle/>
                   <a:p>
-                    <a:fld id="{42FEE7D0-26C9-49C0-9A86-4F635798AEDF}" type="CELLRANGE">
+                    <a:fld id="{A4F99A87-2521-4E1A-8A39-B57A1D96A644}" type="CELLRANGE">
                       <a:rPr lang="en-US"/>
                       <a:pPr/>
                       <a:t>[CELLRANGE]</a:t>
@@ -1565,7 +1570,7 @@
                   <a:bodyPr/>
                   <a:lstStyle/>
                   <a:p>
-                    <a:fld id="{8358E50F-2E09-43B9-A53C-F8977A1E5927}" type="CELLRANGE">
+                    <a:fld id="{2BE7F44C-E533-4AD6-95DA-E45CFCE67AF8}" type="CELLRANGE">
                       <a:rPr lang="en-US"/>
                       <a:pPr/>
                       <a:t>[CELLRANGE]</a:t>
@@ -1599,7 +1604,7 @@
                   <a:bodyPr/>
                   <a:lstStyle/>
                   <a:p>
-                    <a:fld id="{3BF45BB4-DAD3-4BDA-8C51-28BD97A7DCE8}" type="CELLRANGE">
+                    <a:fld id="{B2FB3F20-6106-4861-86F8-DB7843EF1C52}" type="CELLRANGE">
                       <a:rPr lang="en-US"/>
                       <a:pPr/>
                       <a:t>[CELLRANGE]</a:t>
@@ -1633,7 +1638,7 @@
                   <a:bodyPr/>
                   <a:lstStyle/>
                   <a:p>
-                    <a:fld id="{D58E8EC9-DD4C-4A94-8A23-AF0DB0A4BC93}" type="CELLRANGE">
+                    <a:fld id="{F72811CD-4AD2-40A7-B1AE-65C3E3A06DA8}" type="CELLRANGE">
                       <a:rPr lang="en-US"/>
                       <a:pPr/>
                       <a:t>[CELLRANGE]</a:t>
@@ -1667,7 +1672,7 @@
                   <a:bodyPr/>
                   <a:lstStyle/>
                   <a:p>
-                    <a:fld id="{87DA940A-8548-4C51-968D-5A609CFED9A9}" type="CELLRANGE">
+                    <a:fld id="{0DAE6B96-7BC8-433F-8CE0-EE8437899700}" type="CELLRANGE">
                       <a:rPr lang="en-US"/>
                       <a:pPr/>
                       <a:t>[CELLRANGE]</a:t>
@@ -1701,7 +1706,7 @@
                   <a:bodyPr/>
                   <a:lstStyle/>
                   <a:p>
-                    <a:fld id="{0862C9AF-D98A-4F72-A105-C8EF29E01B7C}" type="CELLRANGE">
+                    <a:fld id="{20DB886D-CCCA-4B4A-B89E-89786B468169}" type="CELLRANGE">
                       <a:rPr lang="en-US"/>
                       <a:pPr/>
                       <a:t>[CELLRANGE]</a:t>
@@ -1735,7 +1740,7 @@
                   <a:bodyPr/>
                   <a:lstStyle/>
                   <a:p>
-                    <a:fld id="{D0B11610-A80C-4A70-B380-84B8B7B81420}" type="CELLRANGE">
+                    <a:fld id="{77CF2081-E365-4D9B-A8F1-2FE86A71CDF4}" type="CELLRANGE">
                       <a:rPr lang="en-US"/>
                       <a:pPr/>
                       <a:t>[CELLRANGE]</a:t>
@@ -1769,7 +1774,7 @@
                   <a:bodyPr/>
                   <a:lstStyle/>
                   <a:p>
-                    <a:fld id="{6A19ED01-9F54-405C-8D7A-6E814A24414B}" type="CELLRANGE">
+                    <a:fld id="{78A34FCE-474B-495A-BE74-1355DDCE9B54}" type="CELLRANGE">
                       <a:rPr lang="en-US"/>
                       <a:pPr/>
                       <a:t>[CELLRANGE]</a:t>
@@ -1803,7 +1808,7 @@
                   <a:bodyPr/>
                   <a:lstStyle/>
                   <a:p>
-                    <a:fld id="{1FA0A535-5393-4C77-83BE-8E97D4D6CBB7}" type="CELLRANGE">
+                    <a:fld id="{89A3DBE5-491F-4E1D-9512-E40E85A43E7E}" type="CELLRANGE">
                       <a:rPr lang="en-US"/>
                       <a:pPr/>
                       <a:t>[CELLRANGE]</a:t>
@@ -1837,7 +1842,7 @@
                   <a:bodyPr/>
                   <a:lstStyle/>
                   <a:p>
-                    <a:fld id="{A61252CD-7098-4961-BB2E-2BF856552853}" type="CELLRANGE">
+                    <a:fld id="{EB304BAF-5508-4B37-86D3-4D54FD4E06E5}" type="CELLRANGE">
                       <a:rPr lang="en-US"/>
                       <a:pPr/>
                       <a:t>[CELLRANGE]</a:t>
@@ -1871,7 +1876,7 @@
                   <a:bodyPr/>
                   <a:lstStyle/>
                   <a:p>
-                    <a:fld id="{8DE6FF11-DFC5-43BE-86D5-83CF4B90EE92}" type="CELLRANGE">
+                    <a:fld id="{D665C51C-9CC5-4319-9588-CA6792DC3AC7}" type="CELLRANGE">
                       <a:rPr lang="en-US"/>
                       <a:pPr/>
                       <a:t>[CELLRANGE]</a:t>
@@ -1905,7 +1910,7 @@
                   <a:bodyPr/>
                   <a:lstStyle/>
                   <a:p>
-                    <a:fld id="{5F7E33EA-4571-4E43-96AA-0082A907040C}" type="CELLRANGE">
+                    <a:fld id="{EA313F19-E29B-486E-A436-73A6BCD8045A}" type="CELLRANGE">
                       <a:rPr lang="en-US"/>
                       <a:pPr/>
                       <a:t>[CELLRANGE]</a:t>
@@ -1939,7 +1944,7 @@
                   <a:bodyPr/>
                   <a:lstStyle/>
                   <a:p>
-                    <a:fld id="{521B98FC-B830-4D4A-A7A2-B2D0A9FF0A56}" type="CELLRANGE">
+                    <a:fld id="{45ED63FF-709C-4EA8-83E3-2A1917AFE55C}" type="CELLRANGE">
                       <a:rPr lang="en-US"/>
                       <a:pPr/>
                       <a:t>[CELLRANGE]</a:t>
@@ -1973,7 +1978,7 @@
                   <a:bodyPr/>
                   <a:lstStyle/>
                   <a:p>
-                    <a:fld id="{3EB8A904-931E-4504-8F3B-642924EBA65B}" type="CELLRANGE">
+                    <a:fld id="{863A4F02-A3A1-43A1-B5E6-638DF64404EB}" type="CELLRANGE">
                       <a:rPr lang="en-US"/>
                       <a:pPr/>
                       <a:t>[CELLRANGE]</a:t>
@@ -2007,7 +2012,7 @@
                   <a:bodyPr/>
                   <a:lstStyle/>
                   <a:p>
-                    <a:fld id="{59A7C666-CECF-4A63-B250-8F39025B4CF5}" type="CELLRANGE">
+                    <a:fld id="{A72C6883-D71D-415B-B66A-094C872BDD3C}" type="CELLRANGE">
                       <a:rPr lang="en-US"/>
                       <a:pPr/>
                       <a:t>[CELLRANGE]</a:t>
@@ -2041,7 +2046,7 @@
                   <a:bodyPr/>
                   <a:lstStyle/>
                   <a:p>
-                    <a:fld id="{A5A64442-1D84-4821-8260-8EE743B53B8A}" type="CELLRANGE">
+                    <a:fld id="{97ADB8ED-6595-45F3-8D38-C19BDE5A0D15}" type="CELLRANGE">
                       <a:rPr lang="en-US"/>
                       <a:pPr/>
                       <a:t>[CELLRANGE]</a:t>
@@ -2075,7 +2080,7 @@
                   <a:bodyPr/>
                   <a:lstStyle/>
                   <a:p>
-                    <a:fld id="{987D1855-E794-4537-B4DF-82C890FBB298}" type="CELLRANGE">
+                    <a:fld id="{208E4AD4-735A-4B15-AA60-4165D30AF4C5}" type="CELLRANGE">
                       <a:rPr lang="en-US"/>
                       <a:pPr/>
                       <a:t>[CELLRANGE]</a:t>
@@ -2109,7 +2114,7 @@
                   <a:bodyPr/>
                   <a:lstStyle/>
                   <a:p>
-                    <a:fld id="{4C2FF86C-B43A-4548-82A6-EB310D020495}" type="CELLRANGE">
+                    <a:fld id="{AD4CE9A5-02C7-40B2-AD43-FBCC8FFDE7DB}" type="CELLRANGE">
                       <a:rPr lang="en-US"/>
                       <a:pPr/>
                       <a:t>[CELLRANGE]</a:t>
@@ -2143,7 +2148,7 @@
                   <a:bodyPr/>
                   <a:lstStyle/>
                   <a:p>
-                    <a:fld id="{3BAD100D-525F-4722-A997-F3544ED88676}" type="CELLRANGE">
+                    <a:fld id="{4710B79F-CBCB-4F3B-ABE9-F958DEBD9923}" type="CELLRANGE">
                       <a:rPr lang="en-US"/>
                       <a:pPr/>
                       <a:t>[CELLRANGE]</a:t>
@@ -2177,7 +2182,7 @@
                   <a:bodyPr/>
                   <a:lstStyle/>
                   <a:p>
-                    <a:fld id="{84E4BFA5-F97C-4BC3-B69F-C2957A09EC09}" type="CELLRANGE">
+                    <a:fld id="{DEAFC787-A33A-4081-BCD3-121479D00823}" type="CELLRANGE">
                       <a:rPr lang="en-US"/>
                       <a:pPr/>
                       <a:t>[CELLRANGE]</a:t>
@@ -4570,7 +4575,7 @@
           </a:pPr>
           <a:r>
             <a:rPr lang="en-US" dirty="0"/>
-            <a:t>Lorem ipsum dolor sit amet, consectetuer adipiscing elit. </a:t>
+            <a:t>Link to Git Hub</a:t>
           </a:r>
         </a:p>
       </dgm:t>
@@ -4612,7 +4617,7 @@
           </a:pPr>
           <a:r>
             <a:rPr lang="en-US" dirty="0"/>
-            <a:t>Nunc viverra imperdiet enim. Fusce est. Vivamus a tellus.</a:t>
+            <a:t>Link to Power BI</a:t>
           </a:r>
         </a:p>
       </dgm:t>
@@ -4653,8 +4658,10 @@
             <a:defRPr cap="all"/>
           </a:pPr>
           <a:r>
-            <a:rPr lang="en-US" dirty="0"/>
-            <a:t>Pellentesque habitant morbi tristique senectus et netus.</a:t>
+            <a:rPr lang="en-US" dirty="0">
+              <a:latin typeface="+mn-lt"/>
+            </a:rPr>
+            <a:t>Link to Tableau</a:t>
           </a:r>
         </a:p>
       </dgm:t>
@@ -4723,7 +4730,9 @@
       </dgm:spPr>
       <dgm:extLst>
         <a:ext uri="{E40237B7-FDA0-4F09-8148-C483321AD2D9}">
-          <dgm14:cNvPr xmlns:dgm14="http://schemas.microsoft.com/office/drawing/2010/diagram" id="0" name="" descr="Bar graph with downward trend"/>
+          <dgm14:cNvPr xmlns:dgm14="http://schemas.microsoft.com/office/drawing/2010/diagram" id="0" name="" descr="Bar graph with downward trend">
+            <a:hlinkClick xmlns:r="http://schemas.openxmlformats.org/officeDocument/2006/relationships" r:id="rId3"/>
+          </dgm14:cNvPr>
         </a:ext>
       </dgm:extLst>
     </dgm:pt>
@@ -4756,13 +4765,13 @@
       <dgm:prSet presAssocID="{49225C73-1633-42F1-AB3B-7CB183E5F8B8}" presName="iconRect" presStyleLbl="node1" presStyleIdx="1" presStyleCnt="3"/>
       <dgm:spPr>
         <a:blipFill>
-          <a:blip xmlns:r="http://schemas.openxmlformats.org/officeDocument/2006/relationships" r:embed="rId3">
+          <a:blip xmlns:r="http://schemas.openxmlformats.org/officeDocument/2006/relationships" r:embed="rId4">
             <a:extLst>
               <a:ext uri="{28A0092B-C50C-407E-A947-70E740481C1C}">
                 <a14:useLocalDpi xmlns:a14="http://schemas.microsoft.com/office/drawing/2010/main" val="0"/>
               </a:ext>
               <a:ext uri="{96DAC541-7B7A-43D3-8B79-37D633B846F1}">
-                <asvg:svgBlip xmlns:asvg="http://schemas.microsoft.com/office/drawing/2016/SVG/main" r:embed="rId4"/>
+                <asvg:svgBlip xmlns:asvg="http://schemas.microsoft.com/office/drawing/2016/SVG/main" r:embed="rId5"/>
               </a:ext>
             </a:extLst>
           </a:blip>
@@ -4810,13 +4819,13 @@
       <dgm:prSet presAssocID="{1C383F32-22E8-4F62-A3E0-BDC3D5F48992}" presName="iconRect" presStyleLbl="node1" presStyleIdx="2" presStyleCnt="3"/>
       <dgm:spPr>
         <a:blipFill>
-          <a:blip xmlns:r="http://schemas.openxmlformats.org/officeDocument/2006/relationships" r:embed="rId5">
+          <a:blip xmlns:r="http://schemas.openxmlformats.org/officeDocument/2006/relationships" r:embed="rId6">
             <a:extLst>
               <a:ext uri="{28A0092B-C50C-407E-A947-70E740481C1C}">
                 <a14:useLocalDpi xmlns:a14="http://schemas.microsoft.com/office/drawing/2010/main" val="0"/>
               </a:ext>
               <a:ext uri="{96DAC541-7B7A-43D3-8B79-37D633B846F1}">
-                <asvg:svgBlip xmlns:asvg="http://schemas.microsoft.com/office/drawing/2016/SVG/main" r:embed="rId6"/>
+                <asvg:svgBlip xmlns:asvg="http://schemas.microsoft.com/office/drawing/2016/SVG/main" r:embed="rId7"/>
               </a:ext>
             </a:extLst>
           </a:blip>
@@ -5019,7 +5028,7 @@
         </a:bodyPr>
         <a:lstStyle/>
         <a:p>
-          <a:pPr marL="0" lvl="0" indent="0" algn="ctr" defTabSz="666750">
+          <a:pPr marL="0" lvl="0" indent="0" algn="ctr" defTabSz="1200150">
             <a:lnSpc>
               <a:spcPct val="100000"/>
             </a:lnSpc>
@@ -5033,8 +5042,8 @@
             <a:defRPr cap="all"/>
           </a:pPr>
           <a:r>
-            <a:rPr lang="en-US" sz="1500" kern="1200" dirty="0"/>
-            <a:t>Lorem ipsum dolor sit amet, consectetuer adipiscing elit. </a:t>
+            <a:rPr lang="en-US" sz="2700" kern="1200" dirty="0"/>
+            <a:t>Link to Git Hub</a:t>
           </a:r>
         </a:p>
       </dsp:txBody>
@@ -5169,7 +5178,7 @@
         </a:bodyPr>
         <a:lstStyle/>
         <a:p>
-          <a:pPr marL="0" lvl="0" indent="0" algn="ctr" defTabSz="666750">
+          <a:pPr marL="0" lvl="0" indent="0" algn="ctr" defTabSz="1200150">
             <a:lnSpc>
               <a:spcPct val="100000"/>
             </a:lnSpc>
@@ -5183,8 +5192,8 @@
             <a:defRPr cap="all"/>
           </a:pPr>
           <a:r>
-            <a:rPr lang="en-US" sz="1500" kern="1200" dirty="0"/>
-            <a:t>Nunc viverra imperdiet enim. Fusce est. Vivamus a tellus.</a:t>
+            <a:rPr lang="en-US" sz="2700" kern="1200" dirty="0"/>
+            <a:t>Link to Power BI</a:t>
           </a:r>
         </a:p>
       </dsp:txBody>
@@ -5319,7 +5328,7 @@
         </a:bodyPr>
         <a:lstStyle/>
         <a:p>
-          <a:pPr marL="0" lvl="0" indent="0" algn="ctr" defTabSz="666750">
+          <a:pPr marL="0" lvl="0" indent="0" algn="ctr" defTabSz="1200150">
             <a:lnSpc>
               <a:spcPct val="100000"/>
             </a:lnSpc>
@@ -5333,8 +5342,10 @@
             <a:defRPr cap="all"/>
           </a:pPr>
           <a:r>
-            <a:rPr lang="en-US" sz="1500" kern="1200" dirty="0"/>
-            <a:t>Pellentesque habitant morbi tristique senectus et netus.</a:t>
+            <a:rPr lang="en-US" sz="2700" kern="1200" dirty="0">
+              <a:latin typeface="+mn-lt"/>
+            </a:rPr>
+            <a:t>Link to Tableau</a:t>
           </a:r>
         </a:p>
       </dsp:txBody>
@@ -7065,7 +7076,7 @@
           <a:p>
             <a:fld id="{EA0C0817-A112-4847-8014-A94B7D2A4EA3}" type="datetime1">
               <a:rPr lang="en-US" smtClean="0"/>
-              <a:t>6/13/2020</a:t>
+              <a:t>6/16/2020</a:t>
             </a:fld>
             <a:endParaRPr lang="en-US" dirty="0"/>
           </a:p>
@@ -7267,7 +7278,7 @@
           <a:p>
             <a:fld id="{7332B432-ACDA-4023-A761-2BAB76577B62}" type="datetime1">
               <a:rPr lang="en-US" smtClean="0"/>
-              <a:t>6/13/2020</a:t>
+              <a:t>6/16/2020</a:t>
             </a:fld>
             <a:endParaRPr lang="en-US" dirty="0"/>
           </a:p>
@@ -7866,7 +7877,7 @@
           <a:p>
             <a:fld id="{D9C646AA-F36E-4540-911D-FFFC0A0EF24A}" type="datetime1">
               <a:rPr lang="en-US" smtClean="0"/>
-              <a:t>6/13/2020</a:t>
+              <a:t>6/16/2020</a:t>
             </a:fld>
             <a:endParaRPr lang="en-US" dirty="0"/>
           </a:p>
@@ -8186,7 +8197,7 @@
           <a:p>
             <a:fld id="{69186D26-FA5F-4637-B602-B7C2DC34CFD4}" type="datetime1">
               <a:rPr lang="en-US" smtClean="0"/>
-              <a:t>6/13/2020</a:t>
+              <a:t>6/16/2020</a:t>
             </a:fld>
             <a:endParaRPr lang="en-US" dirty="0"/>
           </a:p>
@@ -8623,7 +8634,7 @@
           <a:p>
             <a:fld id="{8A7F15D8-96D1-4781-BC50-CA8A088B2FE4}" type="datetime1">
               <a:rPr lang="en-US" smtClean="0"/>
-              <a:t>6/13/2020</a:t>
+              <a:t>6/16/2020</a:t>
             </a:fld>
             <a:endParaRPr lang="en-US" dirty="0"/>
           </a:p>
@@ -8741,7 +8752,7 @@
           <a:p>
             <a:fld id="{F9A96C99-B8F8-4528-BD05-0E16E943DC09}" type="datetime1">
               <a:rPr lang="en-US" smtClean="0"/>
-              <a:t>6/13/2020</a:t>
+              <a:t>6/16/2020</a:t>
             </a:fld>
             <a:endParaRPr lang="en-US" dirty="0"/>
           </a:p>
@@ -8836,7 +8847,7 @@
           <a:p>
             <a:fld id="{03636942-C211-4B28-8DBD-C953E00AF71B}" type="datetime1">
               <a:rPr lang="en-US" smtClean="0"/>
-              <a:t>6/13/2020</a:t>
+              <a:t>6/16/2020</a:t>
             </a:fld>
             <a:endParaRPr lang="en-US" dirty="0"/>
           </a:p>
@@ -9253,7 +9264,7 @@
           <a:p>
             <a:fld id="{7E8D12A6-918A-48BD-8CB9-CA713993B0EA}" type="datetime1">
               <a:rPr lang="en-US" smtClean="0"/>
-              <a:t>6/13/2020</a:t>
+              <a:t>6/16/2020</a:t>
             </a:fld>
             <a:endParaRPr lang="en-US" dirty="0"/>
           </a:p>
@@ -9515,7 +9526,7 @@
             <a:fld id="{E778CE86-875F-4587-BCF6-FA054AFC0D53}" type="datetime1">
               <a:rPr lang="en-US" smtClean="0"/>
               <a:pPr/>
-              <a:t>6/13/2020</a:t>
+              <a:t>6/16/2020</a:t>
             </a:fld>
             <a:endParaRPr lang="en-US" dirty="0"/>
           </a:p>
@@ -10031,7 +10042,7 @@
           <a:p>
             <a:fld id="{F6FA2B21-3FCD-4721-B95C-427943F61125}" type="datetime1">
               <a:rPr lang="en-US" smtClean="0"/>
-              <a:t>6/13/2020</a:t>
+              <a:t>6/16/2020</a:t>
             </a:fld>
             <a:endParaRPr lang="en-US" dirty="0"/>
           </a:p>
@@ -10664,7 +10675,7 @@
                   <a:schemeClr val="tx1"/>
                 </a:solidFill>
               </a:rPr>
-              <a:t>Hunger</a:t>
+              <a:t>Hunger in America</a:t>
             </a:r>
           </a:p>
         </p:txBody>
@@ -10722,6 +10733,406 @@
   </p:cSld>
   <p:clrMapOvr>
     <a:overrideClrMapping bg1="dk1" tx1="lt1" bg2="dk2" tx2="lt2" accent1="accent1" accent2="accent2" accent3="accent3" accent4="accent4" accent5="accent5" accent6="accent6" hlink="hlink" folHlink="folHlink"/>
+  </p:clrMapOvr>
+</p:sld>
+</file>
+
+<file path=ppt/slides/slide10.xml><?xml version="1.0" encoding="utf-8"?>
+<p:sld xmlns:a="http://schemas.openxmlformats.org/drawingml/2006/main" xmlns:r="http://schemas.openxmlformats.org/officeDocument/2006/relationships" xmlns:p="http://schemas.openxmlformats.org/presentationml/2006/main">
+  <p:cSld>
+    <p:spTree>
+      <p:nvGrpSpPr>
+        <p:cNvPr id="1" name=""/>
+        <p:cNvGrpSpPr/>
+        <p:nvPr/>
+      </p:nvGrpSpPr>
+      <p:grpSpPr>
+        <a:xfrm>
+          <a:off x="0" y="0"/>
+          <a:ext cx="0" cy="0"/>
+          <a:chOff x="0" y="0"/>
+          <a:chExt cx="0" cy="0"/>
+        </a:xfrm>
+      </p:grpSpPr>
+      <p:sp>
+        <p:nvSpPr>
+          <p:cNvPr id="2" name="Title 1">
+            <a:extLst>
+              <a:ext uri="{FF2B5EF4-FFF2-40B4-BE49-F238E27FC236}">
+                <a16:creationId xmlns:a16="http://schemas.microsoft.com/office/drawing/2014/main" id="{4A7AB02A-ACDD-42E6-9D47-51BD56F57612}"/>
+              </a:ext>
+            </a:extLst>
+          </p:cNvPr>
+          <p:cNvSpPr>
+            <a:spLocks noGrp="1"/>
+          </p:cNvSpPr>
+          <p:nvPr>
+            <p:ph type="title"/>
+          </p:nvPr>
+        </p:nvSpPr>
+        <p:spPr/>
+        <p:txBody>
+          <a:bodyPr>
+            <a:normAutofit/>
+          </a:bodyPr>
+          <a:lstStyle/>
+          <a:p>
+            <a:r>
+              <a:rPr lang="en-US" dirty="0"/>
+              <a:t>Tableau Geo and State Maps</a:t>
+            </a:r>
+          </a:p>
+        </p:txBody>
+      </p:sp>
+      <p:sp>
+        <p:nvSpPr>
+          <p:cNvPr id="3" name="Content Placeholder 2">
+            <a:extLst>
+              <a:ext uri="{FF2B5EF4-FFF2-40B4-BE49-F238E27FC236}">
+                <a16:creationId xmlns:a16="http://schemas.microsoft.com/office/drawing/2014/main" id="{178A81F0-FE58-42F0-88B0-40A0B5BFF2BE}"/>
+              </a:ext>
+            </a:extLst>
+          </p:cNvPr>
+          <p:cNvSpPr>
+            <a:spLocks noGrp="1"/>
+          </p:cNvSpPr>
+          <p:nvPr>
+            <p:ph idx="1"/>
+          </p:nvPr>
+        </p:nvSpPr>
+        <p:spPr/>
+        <p:txBody>
+          <a:bodyPr/>
+          <a:lstStyle/>
+          <a:p>
+            <a:r>
+              <a:rPr lang="en-US" dirty="0"/>
+              <a:t>Local organizations and Food recipients' quick views </a:t>
+            </a:r>
+          </a:p>
+        </p:txBody>
+      </p:sp>
+      <p:sp>
+        <p:nvSpPr>
+          <p:cNvPr id="4" name="Text Placeholder 3">
+            <a:extLst>
+              <a:ext uri="{FF2B5EF4-FFF2-40B4-BE49-F238E27FC236}">
+                <a16:creationId xmlns:a16="http://schemas.microsoft.com/office/drawing/2014/main" id="{485CD28A-E930-4564-93C2-4E02DAA529EF}"/>
+              </a:ext>
+            </a:extLst>
+          </p:cNvPr>
+          <p:cNvSpPr>
+            <a:spLocks noGrp="1"/>
+          </p:cNvSpPr>
+          <p:nvPr>
+            <p:ph type="body" sz="half" idx="2"/>
+          </p:nvPr>
+        </p:nvSpPr>
+        <p:spPr/>
+        <p:txBody>
+          <a:bodyPr/>
+          <a:lstStyle/>
+          <a:p>
+            <a:r>
+              <a:rPr lang="en-US" dirty="0"/>
+              <a:t>Tableau interactivity allows for quick visuals for multiple data points across a large table.</a:t>
+            </a:r>
+          </a:p>
+          <a:p>
+            <a:pPr marL="285750" indent="-285750">
+              <a:buFont typeface="Arial" panose="020B0604020202020204" pitchFamily="34" charset="0"/>
+              <a:buChar char="•"/>
+            </a:pPr>
+            <a:r>
+              <a:rPr lang="en-US" dirty="0"/>
+              <a:t>By State meals served to support Child Nutrition</a:t>
+            </a:r>
+          </a:p>
+          <a:p>
+            <a:pPr marL="285750" indent="-285750">
+              <a:buFont typeface="Arial" panose="020B0604020202020204" pitchFamily="34" charset="0"/>
+              <a:buChar char="•"/>
+            </a:pPr>
+            <a:r>
+              <a:rPr lang="en-US" dirty="0"/>
+              <a:t>By County Food Banks and Excess Food </a:t>
+            </a:r>
+          </a:p>
+          <a:p>
+            <a:pPr marL="285750" indent="-285750">
+              <a:buFont typeface="Arial" panose="020B0604020202020204" pitchFamily="34" charset="0"/>
+              <a:buChar char="•"/>
+            </a:pPr>
+            <a:r>
+              <a:rPr lang="en-US" dirty="0">
+                <a:highlight>
+                  <a:srgbClr val="FFFF00"/>
+                </a:highlight>
+              </a:rPr>
+              <a:t>LINK</a:t>
+            </a:r>
+          </a:p>
+        </p:txBody>
+      </p:sp>
+      <p:pic>
+        <p:nvPicPr>
+          <p:cNvPr id="8" name="Picture 7" descr="A close up of a map&#10;&#10;Description automatically generated">
+            <a:extLst>
+              <a:ext uri="{FF2B5EF4-FFF2-40B4-BE49-F238E27FC236}">
+                <a16:creationId xmlns:a16="http://schemas.microsoft.com/office/drawing/2014/main" id="{D7DB9C6D-5B3F-486A-86C2-9A01A3CB8A2F}"/>
+              </a:ext>
+            </a:extLst>
+          </p:cNvPr>
+          <p:cNvPicPr>
+            <a:picLocks noChangeAspect="1"/>
+          </p:cNvPicPr>
+          <p:nvPr/>
+        </p:nvPicPr>
+        <p:blipFill>
+          <a:blip r:embed="rId2"/>
+          <a:stretch>
+            <a:fillRect/>
+          </a:stretch>
+        </p:blipFill>
+        <p:spPr>
+          <a:xfrm>
+            <a:off x="458608" y="1085838"/>
+            <a:ext cx="6087012" cy="3774269"/>
+          </a:xfrm>
+          <a:prstGeom prst="rect">
+            <a:avLst/>
+          </a:prstGeom>
+        </p:spPr>
+      </p:pic>
+      <p:pic>
+        <p:nvPicPr>
+          <p:cNvPr id="6" name="Picture 5" descr="A close up of a state School lunch map&#10;&#10;Description automatically generated">
+            <a:extLst>
+              <a:ext uri="{FF2B5EF4-FFF2-40B4-BE49-F238E27FC236}">
+                <a16:creationId xmlns:a16="http://schemas.microsoft.com/office/drawing/2014/main" id="{E7544DA8-4710-41AC-9472-361360BEA093}"/>
+              </a:ext>
+            </a:extLst>
+          </p:cNvPr>
+          <p:cNvPicPr>
+            <a:picLocks noChangeAspect="1"/>
+          </p:cNvPicPr>
+          <p:nvPr/>
+        </p:nvPicPr>
+        <p:blipFill>
+          <a:blip r:embed="rId3"/>
+          <a:stretch>
+            <a:fillRect/>
+          </a:stretch>
+        </p:blipFill>
+        <p:spPr>
+          <a:xfrm>
+            <a:off x="3733801" y="4224706"/>
+            <a:ext cx="4270017" cy="2223278"/>
+          </a:xfrm>
+          <a:prstGeom prst="rect">
+            <a:avLst/>
+          </a:prstGeom>
+        </p:spPr>
+      </p:pic>
+    </p:spTree>
+    <p:extLst>
+      <p:ext uri="{BB962C8B-B14F-4D97-AF65-F5344CB8AC3E}">
+        <p14:creationId xmlns:p14="http://schemas.microsoft.com/office/powerpoint/2010/main" val="1501877054"/>
+      </p:ext>
+    </p:extLst>
+  </p:cSld>
+  <p:clrMapOvr>
+    <a:masterClrMapping/>
+  </p:clrMapOvr>
+</p:sld>
+</file>
+
+<file path=ppt/slides/slide11.xml><?xml version="1.0" encoding="utf-8"?>
+<p:sld xmlns:a="http://schemas.openxmlformats.org/drawingml/2006/main" xmlns:r="http://schemas.openxmlformats.org/officeDocument/2006/relationships" xmlns:p="http://schemas.openxmlformats.org/presentationml/2006/main">
+  <p:cSld>
+    <p:spTree>
+      <p:nvGrpSpPr>
+        <p:cNvPr id="1" name=""/>
+        <p:cNvGrpSpPr/>
+        <p:nvPr/>
+      </p:nvGrpSpPr>
+      <p:grpSpPr>
+        <a:xfrm>
+          <a:off x="0" y="0"/>
+          <a:ext cx="0" cy="0"/>
+          <a:chOff x="0" y="0"/>
+          <a:chExt cx="0" cy="0"/>
+        </a:xfrm>
+      </p:grpSpPr>
+      <p:sp>
+        <p:nvSpPr>
+          <p:cNvPr id="2" name="Title 1">
+            <a:extLst>
+              <a:ext uri="{FF2B5EF4-FFF2-40B4-BE49-F238E27FC236}">
+                <a16:creationId xmlns:a16="http://schemas.microsoft.com/office/drawing/2014/main" id="{2E8F5975-87ED-4A9C-B5CB-262A2E0F3906}"/>
+              </a:ext>
+            </a:extLst>
+          </p:cNvPr>
+          <p:cNvSpPr>
+            <a:spLocks noGrp="1"/>
+          </p:cNvSpPr>
+          <p:nvPr>
+            <p:ph type="title"/>
+          </p:nvPr>
+        </p:nvSpPr>
+        <p:spPr/>
+        <p:txBody>
+          <a:bodyPr/>
+          <a:lstStyle/>
+          <a:p>
+            <a:r>
+              <a:rPr lang="en-US" dirty="0"/>
+              <a:t>Sources</a:t>
+            </a:r>
+          </a:p>
+        </p:txBody>
+      </p:sp>
+      <p:sp>
+        <p:nvSpPr>
+          <p:cNvPr id="3" name="Content Placeholder 2">
+            <a:extLst>
+              <a:ext uri="{FF2B5EF4-FFF2-40B4-BE49-F238E27FC236}">
+                <a16:creationId xmlns:a16="http://schemas.microsoft.com/office/drawing/2014/main" id="{770A82F1-0CBD-4A4C-A646-09C9BC09A4FE}"/>
+              </a:ext>
+            </a:extLst>
+          </p:cNvPr>
+          <p:cNvSpPr>
+            <a:spLocks noGrp="1"/>
+          </p:cNvSpPr>
+          <p:nvPr>
+            <p:ph idx="1"/>
+          </p:nvPr>
+        </p:nvSpPr>
+        <p:spPr/>
+        <p:txBody>
+          <a:bodyPr/>
+          <a:lstStyle/>
+          <a:p>
+            <a:endParaRPr lang="en-US" dirty="0"/>
+          </a:p>
+        </p:txBody>
+      </p:sp>
+    </p:spTree>
+    <p:extLst>
+      <p:ext uri="{BB962C8B-B14F-4D97-AF65-F5344CB8AC3E}">
+        <p14:creationId xmlns:p14="http://schemas.microsoft.com/office/powerpoint/2010/main" val="1887844965"/>
+      </p:ext>
+    </p:extLst>
+  </p:cSld>
+  <p:clrMapOvr>
+    <a:masterClrMapping/>
+  </p:clrMapOvr>
+</p:sld>
+</file>
+
+<file path=ppt/slides/slide12.xml><?xml version="1.0" encoding="utf-8"?>
+<p:sld xmlns:a="http://schemas.openxmlformats.org/drawingml/2006/main" xmlns:r="http://schemas.openxmlformats.org/officeDocument/2006/relationships" xmlns:p="http://schemas.openxmlformats.org/presentationml/2006/main">
+  <p:cSld>
+    <p:spTree>
+      <p:nvGrpSpPr>
+        <p:cNvPr id="1" name=""/>
+        <p:cNvGrpSpPr/>
+        <p:nvPr/>
+      </p:nvGrpSpPr>
+      <p:grpSpPr>
+        <a:xfrm>
+          <a:off x="0" y="0"/>
+          <a:ext cx="0" cy="0"/>
+          <a:chOff x="0" y="0"/>
+          <a:chExt cx="0" cy="0"/>
+        </a:xfrm>
+      </p:grpSpPr>
+      <p:sp>
+        <p:nvSpPr>
+          <p:cNvPr id="2" name="Rectangle 1">
+            <a:extLst>
+              <a:ext uri="{FF2B5EF4-FFF2-40B4-BE49-F238E27FC236}">
+                <a16:creationId xmlns:a16="http://schemas.microsoft.com/office/drawing/2014/main" id="{7056825A-6957-4AF0-B29B-F9DED036DFE4}"/>
+              </a:ext>
+            </a:extLst>
+          </p:cNvPr>
+          <p:cNvSpPr/>
+          <p:nvPr/>
+        </p:nvSpPr>
+        <p:spPr>
+          <a:xfrm>
+            <a:off x="850006" y="2485623"/>
+            <a:ext cx="8293994" cy="2559204"/>
+          </a:xfrm>
+          <a:prstGeom prst="rect">
+            <a:avLst/>
+          </a:prstGeom>
+        </p:spPr>
+        <p:txBody>
+          <a:bodyPr wrap="square">
+            <a:spAutoFit/>
+          </a:bodyPr>
+          <a:lstStyle/>
+          <a:p>
+            <a:r>
+              <a:rPr lang="en-US" dirty="0">
+                <a:latin typeface="Calibri" panose="020F0502020204030204" pitchFamily="34" charset="0"/>
+              </a:rPr>
+              <a:t>CRISPR-Cas9 is a method for quickly and accurately editing the genome of virtually any living thing. Using custom-built guide RNA paired with a cutting enzyme (Cas9), it can find and snip a selected sequence of DNA or RNA, eliminating or replacing a “bad” gene. Since it was first described, in late 2012, CRISPR has drastically accelerated the scope of research and moved into practical applications in medicine. So far in 2020, there are 15 trials underway. In medicine, where new drugs take a decade or more to develop, that’s game changing.</a:t>
+            </a:r>
+          </a:p>
+          <a:p>
+            <a:r>
+              <a:rPr lang="en-US" dirty="0">
+                <a:latin typeface="Calibri" panose="020F0502020204030204" pitchFamily="34" charset="0"/>
+              </a:rPr>
+              <a:t> </a:t>
+            </a:r>
+          </a:p>
+          <a:p>
+            <a:r>
+              <a:rPr lang="en-US" sz="1200" i="1" dirty="0">
+                <a:solidFill>
+                  <a:srgbClr val="595959"/>
+                </a:solidFill>
+                <a:latin typeface="Calibri" panose="020F0502020204030204" pitchFamily="34" charset="0"/>
+              </a:rPr>
+              <a:t>From &lt;</a:t>
+            </a:r>
+            <a:r>
+              <a:rPr lang="en-US" sz="1200" i="1" dirty="0">
+                <a:solidFill>
+                  <a:srgbClr val="595959"/>
+                </a:solidFill>
+                <a:latin typeface="Calibri" panose="020F0502020204030204" pitchFamily="34" charset="0"/>
+                <a:hlinkClick r:id="rId2"/>
+              </a:rPr>
+              <a:t>https://geneticliteracyproject.org/2020/06/12/infographic-what-crispr-is-curing-in-2020/</a:t>
+            </a:r>
+            <a:r>
+              <a:rPr lang="en-US" sz="1200" i="1" dirty="0">
+                <a:solidFill>
+                  <a:srgbClr val="595959"/>
+                </a:solidFill>
+                <a:latin typeface="Calibri" panose="020F0502020204030204" pitchFamily="34" charset="0"/>
+              </a:rPr>
+              <a:t>&gt; </a:t>
+            </a:r>
+            <a:endParaRPr lang="en-US" dirty="0">
+              <a:latin typeface="Calibri" panose="020F0502020204030204" pitchFamily="34" charset="0"/>
+            </a:endParaRPr>
+          </a:p>
+        </p:txBody>
+      </p:sp>
+    </p:spTree>
+    <p:extLst>
+      <p:ext uri="{BB962C8B-B14F-4D97-AF65-F5344CB8AC3E}">
+        <p14:creationId xmlns:p14="http://schemas.microsoft.com/office/powerpoint/2010/main" val="3818359876"/>
+      </p:ext>
+    </p:extLst>
+  </p:cSld>
+  <p:clrMapOvr>
+    <a:masterClrMapping/>
   </p:clrMapOvr>
 </p:sld>
 </file>
@@ -10803,7 +11214,7 @@
             <p:ph idx="1"/>
             <p:extLst>
               <p:ext uri="{D42A27DB-BD31-4B8C-83A1-F6EECF244321}">
-                <p14:modId xmlns:p14="http://schemas.microsoft.com/office/powerpoint/2010/main" val="3617019551"/>
+                <p14:modId xmlns:p14="http://schemas.microsoft.com/office/powerpoint/2010/main" val="2786834153"/>
               </p:ext>
             </p:extLst>
           </p:nvPr>
@@ -10871,6 +11282,605 @@
           <a:p>
             <a:r>
               <a:rPr lang="en-US" dirty="0"/>
+              <a:t>Agenda</a:t>
+            </a:r>
+          </a:p>
+        </p:txBody>
+      </p:sp>
+      <p:sp>
+        <p:nvSpPr>
+          <p:cNvPr id="5" name="Content Placeholder 4">
+            <a:extLst>
+              <a:ext uri="{FF2B5EF4-FFF2-40B4-BE49-F238E27FC236}">
+                <a16:creationId xmlns:a16="http://schemas.microsoft.com/office/drawing/2014/main" id="{80225470-B069-44FB-9CB1-8653A3E2C769}"/>
+              </a:ext>
+            </a:extLst>
+          </p:cNvPr>
+          <p:cNvSpPr>
+            <a:spLocks noGrp="1"/>
+          </p:cNvSpPr>
+          <p:nvPr>
+            <p:ph idx="1"/>
+          </p:nvPr>
+        </p:nvSpPr>
+        <p:spPr/>
+        <p:txBody>
+          <a:bodyPr/>
+          <a:lstStyle/>
+          <a:p>
+            <a:r>
+              <a:rPr lang="en-US" sz="2000" dirty="0"/>
+              <a:t>Tools used Python, Power BI, Tableau, Excel </a:t>
+            </a:r>
+          </a:p>
+          <a:p>
+            <a:r>
+              <a:rPr lang="en-US" sz="2000" dirty="0"/>
+              <a:t>To use a correlation plot I installed an R package in Power BI </a:t>
+            </a:r>
+            <a:endParaRPr lang="en-US" sz="2800" dirty="0"/>
+          </a:p>
+          <a:p>
+            <a:endParaRPr lang="en-US" sz="2000" dirty="0"/>
+          </a:p>
+          <a:p>
+            <a:r>
+              <a:rPr lang="en-US" sz="2000" dirty="0"/>
+              <a:t>Data sets from USDA (United States Department of Agriculture)</a:t>
+            </a:r>
+          </a:p>
+          <a:p>
+            <a:r>
+              <a:rPr lang="en-US" sz="2000" dirty="0"/>
+              <a:t> SNAP -  Supplemental Nutrition Assistance Program</a:t>
+            </a:r>
+          </a:p>
+          <a:p>
+            <a:r>
+              <a:rPr lang="en-US" sz="2000" dirty="0"/>
+              <a:t>Food expenditures</a:t>
+            </a:r>
+          </a:p>
+          <a:p>
+            <a:r>
+              <a:rPr lang="en-US" sz="2000" dirty="0"/>
+              <a:t>Census data and projections </a:t>
+            </a:r>
+          </a:p>
+          <a:p>
+            <a:endParaRPr lang="en-US" dirty="0"/>
+          </a:p>
+        </p:txBody>
+      </p:sp>
+    </p:spTree>
+    <p:extLst>
+      <p:ext uri="{BB962C8B-B14F-4D97-AF65-F5344CB8AC3E}">
+        <p14:creationId xmlns:p14="http://schemas.microsoft.com/office/powerpoint/2010/main" val="3411267927"/>
+      </p:ext>
+    </p:extLst>
+  </p:cSld>
+  <p:clrMapOvr>
+    <a:masterClrMapping/>
+  </p:clrMapOvr>
+</p:sld>
+</file>
+
+<file path=ppt/slides/slide4.xml><?xml version="1.0" encoding="utf-8"?>
+<p:sld xmlns:a="http://schemas.openxmlformats.org/drawingml/2006/main" xmlns:r="http://schemas.openxmlformats.org/officeDocument/2006/relationships" xmlns:p="http://schemas.openxmlformats.org/presentationml/2006/main">
+  <p:cSld>
+    <p:spTree>
+      <p:nvGrpSpPr>
+        <p:cNvPr id="1" name=""/>
+        <p:cNvGrpSpPr/>
+        <p:nvPr/>
+      </p:nvGrpSpPr>
+      <p:grpSpPr>
+        <a:xfrm>
+          <a:off x="0" y="0"/>
+          <a:ext cx="0" cy="0"/>
+          <a:chOff x="0" y="0"/>
+          <a:chExt cx="0" cy="0"/>
+        </a:xfrm>
+      </p:grpSpPr>
+      <p:sp>
+        <p:nvSpPr>
+          <p:cNvPr id="2" name="Title 1">
+            <a:extLst>
+              <a:ext uri="{FF2B5EF4-FFF2-40B4-BE49-F238E27FC236}">
+                <a16:creationId xmlns:a16="http://schemas.microsoft.com/office/drawing/2014/main" id="{2E8F5975-87ED-4A9C-B5CB-262A2E0F3906}"/>
+              </a:ext>
+            </a:extLst>
+          </p:cNvPr>
+          <p:cNvSpPr>
+            <a:spLocks noGrp="1"/>
+          </p:cNvSpPr>
+          <p:nvPr>
+            <p:ph type="title"/>
+          </p:nvPr>
+        </p:nvSpPr>
+        <p:spPr/>
+        <p:txBody>
+          <a:bodyPr>
+            <a:normAutofit/>
+          </a:bodyPr>
+          <a:lstStyle/>
+          <a:p>
+            <a:r>
+              <a:rPr lang="en-US" dirty="0">
+                <a:latin typeface="+mn-lt"/>
+              </a:rPr>
+              <a:t>The first National Food Stamp program</a:t>
+            </a:r>
+          </a:p>
+        </p:txBody>
+      </p:sp>
+      <p:sp>
+        <p:nvSpPr>
+          <p:cNvPr id="3" name="Content Placeholder 2">
+            <a:extLst>
+              <a:ext uri="{FF2B5EF4-FFF2-40B4-BE49-F238E27FC236}">
+                <a16:creationId xmlns:a16="http://schemas.microsoft.com/office/drawing/2014/main" id="{770A82F1-0CBD-4A4C-A646-09C9BC09A4FE}"/>
+              </a:ext>
+            </a:extLst>
+          </p:cNvPr>
+          <p:cNvSpPr>
+            <a:spLocks noGrp="1"/>
+          </p:cNvSpPr>
+          <p:nvPr>
+            <p:ph idx="1"/>
+          </p:nvPr>
+        </p:nvSpPr>
+        <p:spPr/>
+        <p:txBody>
+          <a:bodyPr>
+            <a:normAutofit/>
+          </a:bodyPr>
+          <a:lstStyle/>
+          <a:p>
+            <a:r>
+              <a:rPr lang="en-US" sz="2400" dirty="0"/>
+              <a:t>Established in 1939 to combat hunger during high unemployment</a:t>
+            </a:r>
+          </a:p>
+          <a:p>
+            <a:endParaRPr lang="en-US" sz="2400" dirty="0">
+              <a:latin typeface="Arial" panose="020B0604020202020204" pitchFamily="34" charset="0"/>
+              <a:cs typeface="Arial" panose="020B0604020202020204" pitchFamily="34" charset="0"/>
+            </a:endParaRPr>
+          </a:p>
+          <a:p>
+            <a:r>
+              <a:rPr lang="en-US" sz="2400" dirty="0">
+                <a:latin typeface="Arial" panose="020B0604020202020204" pitchFamily="34" charset="0"/>
+                <a:cs typeface="Arial" panose="020B0604020202020204" pitchFamily="34" charset="0"/>
+              </a:rPr>
+              <a:t>"</a:t>
+            </a:r>
+            <a:r>
+              <a:rPr lang="en-US" sz="2400" i="1" dirty="0">
+                <a:latin typeface="Arial" panose="020B0604020202020204" pitchFamily="34" charset="0"/>
+                <a:cs typeface="Arial" panose="020B0604020202020204" pitchFamily="34" charset="0"/>
+              </a:rPr>
+              <a:t>We got a picture of a gorge, with farm surpluses on one cliff and under-nourished city folks with outstretched hands on the other. We set out to find a practical way to build a bridge across that chasm</a:t>
+            </a:r>
+            <a:r>
+              <a:rPr lang="en-US" sz="2400" dirty="0">
+                <a:latin typeface="Arial" panose="020B0604020202020204" pitchFamily="34" charset="0"/>
+                <a:cs typeface="Arial" panose="020B0604020202020204" pitchFamily="34" charset="0"/>
+              </a:rPr>
+              <a:t>." </a:t>
+            </a:r>
+          </a:p>
+          <a:p>
+            <a:r>
+              <a:rPr lang="en-US" sz="2400" dirty="0">
+                <a:latin typeface="Arial" panose="020B0604020202020204" pitchFamily="34" charset="0"/>
+                <a:cs typeface="Arial" panose="020B0604020202020204" pitchFamily="34" charset="0"/>
+              </a:rPr>
+              <a:t>                  (Milo Perkins, the Food Stamp program’s first administrator)</a:t>
+            </a:r>
+          </a:p>
+          <a:p>
+            <a:endParaRPr lang="en-US" dirty="0"/>
+          </a:p>
+        </p:txBody>
+      </p:sp>
+    </p:spTree>
+    <p:extLst>
+      <p:ext uri="{BB962C8B-B14F-4D97-AF65-F5344CB8AC3E}">
+        <p14:creationId xmlns:p14="http://schemas.microsoft.com/office/powerpoint/2010/main" val="183527646"/>
+      </p:ext>
+    </p:extLst>
+  </p:cSld>
+  <p:clrMapOvr>
+    <a:masterClrMapping/>
+  </p:clrMapOvr>
+</p:sld>
+</file>
+
+<file path=ppt/slides/slide5.xml><?xml version="1.0" encoding="utf-8"?>
+<p:sld xmlns:a="http://schemas.openxmlformats.org/drawingml/2006/main" xmlns:r="http://schemas.openxmlformats.org/officeDocument/2006/relationships" xmlns:p="http://schemas.openxmlformats.org/presentationml/2006/main">
+  <p:cSld>
+    <p:spTree>
+      <p:nvGrpSpPr>
+        <p:cNvPr id="1" name=""/>
+        <p:cNvGrpSpPr/>
+        <p:nvPr/>
+      </p:nvGrpSpPr>
+      <p:grpSpPr>
+        <a:xfrm>
+          <a:off x="0" y="0"/>
+          <a:ext cx="0" cy="0"/>
+          <a:chOff x="0" y="0"/>
+          <a:chExt cx="0" cy="0"/>
+        </a:xfrm>
+      </p:grpSpPr>
+      <p:sp>
+        <p:nvSpPr>
+          <p:cNvPr id="2" name="Title 1">
+            <a:extLst>
+              <a:ext uri="{FF2B5EF4-FFF2-40B4-BE49-F238E27FC236}">
+                <a16:creationId xmlns:a16="http://schemas.microsoft.com/office/drawing/2014/main" id="{2E8F5975-87ED-4A9C-B5CB-262A2E0F3906}"/>
+              </a:ext>
+            </a:extLst>
+          </p:cNvPr>
+          <p:cNvSpPr>
+            <a:spLocks noGrp="1"/>
+          </p:cNvSpPr>
+          <p:nvPr>
+            <p:ph type="title"/>
+          </p:nvPr>
+        </p:nvSpPr>
+        <p:spPr/>
+        <p:txBody>
+          <a:bodyPr>
+            <a:normAutofit fontScale="90000"/>
+          </a:bodyPr>
+          <a:lstStyle/>
+          <a:p>
+            <a:r>
+              <a:rPr lang="en-US" dirty="0">
+                <a:latin typeface="+mn-lt"/>
+              </a:rPr>
+              <a:t>From Food Stamps to Snap - Supplemental Nutrition Assistance Program </a:t>
+            </a:r>
+          </a:p>
+        </p:txBody>
+      </p:sp>
+      <p:sp>
+        <p:nvSpPr>
+          <p:cNvPr id="3" name="Content Placeholder 2">
+            <a:extLst>
+              <a:ext uri="{FF2B5EF4-FFF2-40B4-BE49-F238E27FC236}">
+                <a16:creationId xmlns:a16="http://schemas.microsoft.com/office/drawing/2014/main" id="{770A82F1-0CBD-4A4C-A646-09C9BC09A4FE}"/>
+              </a:ext>
+            </a:extLst>
+          </p:cNvPr>
+          <p:cNvSpPr>
+            <a:spLocks noGrp="1"/>
+          </p:cNvSpPr>
+          <p:nvPr>
+            <p:ph idx="1"/>
+          </p:nvPr>
+        </p:nvSpPr>
+        <p:spPr/>
+        <p:txBody>
+          <a:bodyPr>
+            <a:normAutofit/>
+          </a:bodyPr>
+          <a:lstStyle/>
+          <a:p>
+            <a:r>
+              <a:rPr lang="en-US" sz="2400" dirty="0">
+                <a:latin typeface="Arial" panose="020B0604020202020204" pitchFamily="34" charset="0"/>
+                <a:cs typeface="Arial" panose="020B0604020202020204" pitchFamily="34" charset="0"/>
+              </a:rPr>
+              <a:t>Food Stamp program re-established in 1964 for a half-million recipients that first year, going nationwide in 1974 and growing to 22 million in 1981, </a:t>
+            </a:r>
+          </a:p>
+          <a:p>
+            <a:r>
+              <a:rPr lang="en-US" sz="2400" dirty="0">
+                <a:latin typeface="Arial" panose="020B0604020202020204" pitchFamily="34" charset="0"/>
+                <a:cs typeface="Arial" panose="020B0604020202020204" pitchFamily="34" charset="0"/>
+              </a:rPr>
+              <a:t>adding electronic benefit access in 1984, and peaking at 47 million in 2013, </a:t>
+            </a:r>
+          </a:p>
+          <a:p>
+            <a:r>
+              <a:rPr lang="en-US" sz="2400" dirty="0">
+                <a:latin typeface="Arial" panose="020B0604020202020204" pitchFamily="34" charset="0"/>
+                <a:cs typeface="Arial" panose="020B0604020202020204" pitchFamily="34" charset="0"/>
+              </a:rPr>
+              <a:t>then declining to the current level with 37 million SNAP recipients in February 2020.</a:t>
+            </a:r>
+          </a:p>
+          <a:p>
+            <a:endParaRPr lang="en-US" sz="2400" dirty="0">
+              <a:latin typeface="Arial" panose="020B0604020202020204" pitchFamily="34" charset="0"/>
+              <a:cs typeface="Arial" panose="020B0604020202020204" pitchFamily="34" charset="0"/>
+            </a:endParaRPr>
+          </a:p>
+          <a:p>
+            <a:endParaRPr lang="en-US" dirty="0"/>
+          </a:p>
+        </p:txBody>
+      </p:sp>
+    </p:spTree>
+    <p:extLst>
+      <p:ext uri="{BB962C8B-B14F-4D97-AF65-F5344CB8AC3E}">
+        <p14:creationId xmlns:p14="http://schemas.microsoft.com/office/powerpoint/2010/main" val="2613229182"/>
+      </p:ext>
+    </p:extLst>
+  </p:cSld>
+  <p:clrMapOvr>
+    <a:masterClrMapping/>
+  </p:clrMapOvr>
+</p:sld>
+</file>
+
+<file path=ppt/slides/slide6.xml><?xml version="1.0" encoding="utf-8"?>
+<p:sld xmlns:a="http://schemas.openxmlformats.org/drawingml/2006/main" xmlns:r="http://schemas.openxmlformats.org/officeDocument/2006/relationships" xmlns:p="http://schemas.openxmlformats.org/presentationml/2006/main">
+  <p:cSld>
+    <p:spTree>
+      <p:nvGrpSpPr>
+        <p:cNvPr id="1" name=""/>
+        <p:cNvGrpSpPr/>
+        <p:nvPr/>
+      </p:nvGrpSpPr>
+      <p:grpSpPr>
+        <a:xfrm>
+          <a:off x="0" y="0"/>
+          <a:ext cx="0" cy="0"/>
+          <a:chOff x="0" y="0"/>
+          <a:chExt cx="0" cy="0"/>
+        </a:xfrm>
+      </p:grpSpPr>
+      <p:sp>
+        <p:nvSpPr>
+          <p:cNvPr id="2" name="Title 1">
+            <a:extLst>
+              <a:ext uri="{FF2B5EF4-FFF2-40B4-BE49-F238E27FC236}">
+                <a16:creationId xmlns:a16="http://schemas.microsoft.com/office/drawing/2014/main" id="{2E8F5975-87ED-4A9C-B5CB-262A2E0F3906}"/>
+              </a:ext>
+            </a:extLst>
+          </p:cNvPr>
+          <p:cNvSpPr>
+            <a:spLocks noGrp="1"/>
+          </p:cNvSpPr>
+          <p:nvPr>
+            <p:ph type="title"/>
+          </p:nvPr>
+        </p:nvSpPr>
+        <p:spPr/>
+        <p:txBody>
+          <a:bodyPr/>
+          <a:lstStyle/>
+          <a:p>
+            <a:r>
+              <a:rPr lang="en-US" dirty="0">
+                <a:latin typeface="+mn-lt"/>
+              </a:rPr>
+              <a:t>Snap - Supplemental Nutrition Assistance Program - USDA</a:t>
+            </a:r>
+          </a:p>
+        </p:txBody>
+      </p:sp>
+      <p:sp>
+        <p:nvSpPr>
+          <p:cNvPr id="3" name="Content Placeholder 2">
+            <a:extLst>
+              <a:ext uri="{FF2B5EF4-FFF2-40B4-BE49-F238E27FC236}">
+                <a16:creationId xmlns:a16="http://schemas.microsoft.com/office/drawing/2014/main" id="{770A82F1-0CBD-4A4C-A646-09C9BC09A4FE}"/>
+              </a:ext>
+            </a:extLst>
+          </p:cNvPr>
+          <p:cNvSpPr>
+            <a:spLocks noGrp="1"/>
+          </p:cNvSpPr>
+          <p:nvPr>
+            <p:ph idx="1"/>
+          </p:nvPr>
+        </p:nvSpPr>
+        <p:spPr/>
+        <p:txBody>
+          <a:bodyPr>
+            <a:normAutofit/>
+          </a:bodyPr>
+          <a:lstStyle/>
+          <a:p>
+            <a:r>
+              <a:rPr lang="en-US" dirty="0"/>
+              <a:t>School Lunch program established in 1946, providing nutritionally balanced, low-cost or free lunches to children each school day</a:t>
+            </a:r>
+          </a:p>
+          <a:p>
+            <a:r>
+              <a:rPr lang="en-US" dirty="0"/>
+              <a:t>School Breakfast Program (SBP) provides reimbursement to states to operate nonprofit breakfast programs in schools and residential childcare institutions.</a:t>
+            </a:r>
+          </a:p>
+          <a:p>
+            <a:endParaRPr lang="en-US" dirty="0"/>
+          </a:p>
+          <a:p>
+            <a:r>
+              <a:rPr lang="en-US" dirty="0"/>
+              <a:t>The Special Milk Program (SMP) provides milk to children in schools and childcare institutions who do not participate in other federal meal service programs.</a:t>
+            </a:r>
+          </a:p>
+          <a:p>
+            <a:endParaRPr lang="en-US" dirty="0"/>
+          </a:p>
+          <a:p>
+            <a:r>
+              <a:rPr lang="en-US" dirty="0"/>
+              <a:t>The Child and Adult Care Food Program (CACFP) is a federal program that provides reimbursements for nutritious meals and snacks to eligible children and adults who are enrolled for care at participating child care centers, day care homes, and adult day care centers.</a:t>
+            </a:r>
+          </a:p>
+          <a:p>
+            <a:r>
+              <a:rPr lang="en-US" sz="1000" i="1" dirty="0"/>
+              <a:t>From &lt;</a:t>
+            </a:r>
+            <a:r>
+              <a:rPr lang="en-US" sz="1000" i="1" dirty="0">
+                <a:hlinkClick r:id="rId2"/>
+              </a:rPr>
+              <a:t>https://www.fns.usda.gov/cn</a:t>
+            </a:r>
+            <a:r>
+              <a:rPr lang="en-US" sz="1000" i="1" dirty="0"/>
+              <a:t>&gt; </a:t>
+            </a:r>
+            <a:endParaRPr lang="en-US" sz="1000" dirty="0"/>
+          </a:p>
+          <a:p>
+            <a:endParaRPr lang="en-US" dirty="0"/>
+          </a:p>
+        </p:txBody>
+      </p:sp>
+    </p:spTree>
+    <p:extLst>
+      <p:ext uri="{BB962C8B-B14F-4D97-AF65-F5344CB8AC3E}">
+        <p14:creationId xmlns:p14="http://schemas.microsoft.com/office/powerpoint/2010/main" val="1902242538"/>
+      </p:ext>
+    </p:extLst>
+  </p:cSld>
+  <p:clrMapOvr>
+    <a:masterClrMapping/>
+  </p:clrMapOvr>
+</p:sld>
+</file>
+
+<file path=ppt/slides/slide7.xml><?xml version="1.0" encoding="utf-8"?>
+<p:sld xmlns:a="http://schemas.openxmlformats.org/drawingml/2006/main" xmlns:r="http://schemas.openxmlformats.org/officeDocument/2006/relationships" xmlns:p="http://schemas.openxmlformats.org/presentationml/2006/main">
+  <p:cSld>
+    <p:spTree>
+      <p:nvGrpSpPr>
+        <p:cNvPr id="1" name=""/>
+        <p:cNvGrpSpPr/>
+        <p:nvPr/>
+      </p:nvGrpSpPr>
+      <p:grpSpPr>
+        <a:xfrm>
+          <a:off x="0" y="0"/>
+          <a:ext cx="0" cy="0"/>
+          <a:chOff x="0" y="0"/>
+          <a:chExt cx="0" cy="0"/>
+        </a:xfrm>
+      </p:grpSpPr>
+      <p:sp>
+        <p:nvSpPr>
+          <p:cNvPr id="2" name="Title 1">
+            <a:extLst>
+              <a:ext uri="{FF2B5EF4-FFF2-40B4-BE49-F238E27FC236}">
+                <a16:creationId xmlns:a16="http://schemas.microsoft.com/office/drawing/2014/main" id="{2E8F5975-87ED-4A9C-B5CB-262A2E0F3906}"/>
+              </a:ext>
+            </a:extLst>
+          </p:cNvPr>
+          <p:cNvSpPr>
+            <a:spLocks noGrp="1"/>
+          </p:cNvSpPr>
+          <p:nvPr>
+            <p:ph type="title"/>
+          </p:nvPr>
+        </p:nvSpPr>
+        <p:spPr/>
+        <p:txBody>
+          <a:bodyPr/>
+          <a:lstStyle/>
+          <a:p>
+            <a:r>
+              <a:rPr lang="en-US" dirty="0">
+                <a:latin typeface="+mn-lt"/>
+              </a:rPr>
+              <a:t>Snap - Supplemental Nutrition Assistance Program </a:t>
+            </a:r>
+          </a:p>
+        </p:txBody>
+      </p:sp>
+      <p:sp>
+        <p:nvSpPr>
+          <p:cNvPr id="3" name="Content Placeholder 2">
+            <a:extLst>
+              <a:ext uri="{FF2B5EF4-FFF2-40B4-BE49-F238E27FC236}">
+                <a16:creationId xmlns:a16="http://schemas.microsoft.com/office/drawing/2014/main" id="{770A82F1-0CBD-4A4C-A646-09C9BC09A4FE}"/>
+              </a:ext>
+            </a:extLst>
+          </p:cNvPr>
+          <p:cNvSpPr>
+            <a:spLocks noGrp="1"/>
+          </p:cNvSpPr>
+          <p:nvPr>
+            <p:ph idx="1"/>
+          </p:nvPr>
+        </p:nvSpPr>
+        <p:spPr/>
+        <p:txBody>
+          <a:bodyPr>
+            <a:normAutofit/>
+          </a:bodyPr>
+          <a:lstStyle/>
+          <a:p>
+            <a:endParaRPr lang="en-US" dirty="0"/>
+          </a:p>
+        </p:txBody>
+      </p:sp>
+    </p:spTree>
+    <p:extLst>
+      <p:ext uri="{BB962C8B-B14F-4D97-AF65-F5344CB8AC3E}">
+        <p14:creationId xmlns:p14="http://schemas.microsoft.com/office/powerpoint/2010/main" val="1520589437"/>
+      </p:ext>
+    </p:extLst>
+  </p:cSld>
+  <p:clrMapOvr>
+    <a:masterClrMapping/>
+  </p:clrMapOvr>
+</p:sld>
+</file>
+
+<file path=ppt/slides/slide8.xml><?xml version="1.0" encoding="utf-8"?>
+<p:sld xmlns:a="http://schemas.openxmlformats.org/drawingml/2006/main" xmlns:r="http://schemas.openxmlformats.org/officeDocument/2006/relationships" xmlns:p="http://schemas.openxmlformats.org/presentationml/2006/main">
+  <p:cSld>
+    <p:spTree>
+      <p:nvGrpSpPr>
+        <p:cNvPr id="1" name=""/>
+        <p:cNvGrpSpPr/>
+        <p:nvPr/>
+      </p:nvGrpSpPr>
+      <p:grpSpPr>
+        <a:xfrm>
+          <a:off x="0" y="0"/>
+          <a:ext cx="0" cy="0"/>
+          <a:chOff x="0" y="0"/>
+          <a:chExt cx="0" cy="0"/>
+        </a:xfrm>
+      </p:grpSpPr>
+      <p:sp>
+        <p:nvSpPr>
+          <p:cNvPr id="2" name="Title 1">
+            <a:extLst>
+              <a:ext uri="{FF2B5EF4-FFF2-40B4-BE49-F238E27FC236}">
+                <a16:creationId xmlns:a16="http://schemas.microsoft.com/office/drawing/2014/main" id="{7DCEB8B7-65B2-4961-846A-97CD75062B4E}"/>
+              </a:ext>
+            </a:extLst>
+          </p:cNvPr>
+          <p:cNvSpPr>
+            <a:spLocks noGrp="1"/>
+          </p:cNvSpPr>
+          <p:nvPr>
+            <p:ph type="title"/>
+          </p:nvPr>
+        </p:nvSpPr>
+        <p:spPr/>
+        <p:txBody>
+          <a:bodyPr/>
+          <a:lstStyle/>
+          <a:p>
+            <a:r>
+              <a:rPr lang="en-US" dirty="0"/>
               <a:t>Timeline</a:t>
             </a:r>
           </a:p>
@@ -10905,7 +11915,7 @@
     </p:spTree>
     <p:extLst>
       <p:ext uri="{BB962C8B-B14F-4D97-AF65-F5344CB8AC3E}">
-        <p14:creationId xmlns:p14="http://schemas.microsoft.com/office/powerpoint/2010/main" val="3411267927"/>
+        <p14:creationId xmlns:p14="http://schemas.microsoft.com/office/powerpoint/2010/main" val="1368700625"/>
       </p:ext>
     </p:extLst>
   </p:cSld>
@@ -10915,7 +11925,7 @@
 </p:sld>
 </file>
 
-<file path=ppt/slides/slide4.xml><?xml version="1.0" encoding="utf-8"?>
+<file path=ppt/slides/slide9.xml><?xml version="1.0" encoding="utf-8"?>
 <p:sld xmlns:a="http://schemas.openxmlformats.org/drawingml/2006/main" xmlns:r="http://schemas.openxmlformats.org/officeDocument/2006/relationships" xmlns:p="http://schemas.openxmlformats.org/presentationml/2006/main">
   <p:cSld>
     <p:spTree>
@@ -11004,301 +12014,6 @@
     <p:extLst>
       <p:ext uri="{BB962C8B-B14F-4D97-AF65-F5344CB8AC3E}">
         <p14:creationId xmlns:p14="http://schemas.microsoft.com/office/powerpoint/2010/main" val="57412028"/>
-      </p:ext>
-    </p:extLst>
-  </p:cSld>
-  <p:clrMapOvr>
-    <a:masterClrMapping/>
-  </p:clrMapOvr>
-</p:sld>
-</file>
-
-<file path=ppt/slides/slide5.xml><?xml version="1.0" encoding="utf-8"?>
-<p:sld xmlns:a="http://schemas.openxmlformats.org/drawingml/2006/main" xmlns:r="http://schemas.openxmlformats.org/officeDocument/2006/relationships" xmlns:p="http://schemas.openxmlformats.org/presentationml/2006/main">
-  <p:cSld>
-    <p:spTree>
-      <p:nvGrpSpPr>
-        <p:cNvPr id="1" name=""/>
-        <p:cNvGrpSpPr/>
-        <p:nvPr/>
-      </p:nvGrpSpPr>
-      <p:grpSpPr>
-        <a:xfrm>
-          <a:off x="0" y="0"/>
-          <a:ext cx="0" cy="0"/>
-          <a:chOff x="0" y="0"/>
-          <a:chExt cx="0" cy="0"/>
-        </a:xfrm>
-      </p:grpSpPr>
-      <p:sp>
-        <p:nvSpPr>
-          <p:cNvPr id="2" name="Title 1">
-            <a:extLst>
-              <a:ext uri="{FF2B5EF4-FFF2-40B4-BE49-F238E27FC236}">
-                <a16:creationId xmlns:a16="http://schemas.microsoft.com/office/drawing/2014/main" id="{4A7AB02A-ACDD-42E6-9D47-51BD56F57612}"/>
-              </a:ext>
-            </a:extLst>
-          </p:cNvPr>
-          <p:cNvSpPr>
-            <a:spLocks noGrp="1"/>
-          </p:cNvSpPr>
-          <p:nvPr>
-            <p:ph type="title"/>
-          </p:nvPr>
-        </p:nvSpPr>
-        <p:spPr/>
-        <p:txBody>
-          <a:bodyPr/>
-          <a:lstStyle/>
-          <a:p>
-            <a:endParaRPr lang="en-US"/>
-          </a:p>
-        </p:txBody>
-      </p:sp>
-      <p:sp>
-        <p:nvSpPr>
-          <p:cNvPr id="3" name="Content Placeholder 2">
-            <a:extLst>
-              <a:ext uri="{FF2B5EF4-FFF2-40B4-BE49-F238E27FC236}">
-                <a16:creationId xmlns:a16="http://schemas.microsoft.com/office/drawing/2014/main" id="{178A81F0-FE58-42F0-88B0-40A0B5BFF2BE}"/>
-              </a:ext>
-            </a:extLst>
-          </p:cNvPr>
-          <p:cNvSpPr>
-            <a:spLocks noGrp="1"/>
-          </p:cNvSpPr>
-          <p:nvPr>
-            <p:ph idx="1"/>
-          </p:nvPr>
-        </p:nvSpPr>
-        <p:spPr/>
-        <p:txBody>
-          <a:bodyPr/>
-          <a:lstStyle/>
-          <a:p>
-            <a:endParaRPr lang="en-US"/>
-          </a:p>
-        </p:txBody>
-      </p:sp>
-      <p:sp>
-        <p:nvSpPr>
-          <p:cNvPr id="4" name="Text Placeholder 3">
-            <a:extLst>
-              <a:ext uri="{FF2B5EF4-FFF2-40B4-BE49-F238E27FC236}">
-                <a16:creationId xmlns:a16="http://schemas.microsoft.com/office/drawing/2014/main" id="{485CD28A-E930-4564-93C2-4E02DAA529EF}"/>
-              </a:ext>
-            </a:extLst>
-          </p:cNvPr>
-          <p:cNvSpPr>
-            <a:spLocks noGrp="1"/>
-          </p:cNvSpPr>
-          <p:nvPr>
-            <p:ph type="body" sz="half" idx="2"/>
-          </p:nvPr>
-        </p:nvSpPr>
-        <p:spPr/>
-        <p:txBody>
-          <a:bodyPr/>
-          <a:lstStyle/>
-          <a:p>
-            <a:endParaRPr lang="en-US"/>
-          </a:p>
-        </p:txBody>
-      </p:sp>
-    </p:spTree>
-    <p:extLst>
-      <p:ext uri="{BB962C8B-B14F-4D97-AF65-F5344CB8AC3E}">
-        <p14:creationId xmlns:p14="http://schemas.microsoft.com/office/powerpoint/2010/main" val="1501877054"/>
-      </p:ext>
-    </p:extLst>
-  </p:cSld>
-  <p:clrMapOvr>
-    <a:masterClrMapping/>
-  </p:clrMapOvr>
-</p:sld>
-</file>
-
-<file path=ppt/slides/slide6.xml><?xml version="1.0" encoding="utf-8"?>
-<p:sld xmlns:a="http://schemas.openxmlformats.org/drawingml/2006/main" xmlns:r="http://schemas.openxmlformats.org/officeDocument/2006/relationships" xmlns:p="http://schemas.openxmlformats.org/presentationml/2006/main">
-  <p:cSld>
-    <p:spTree>
-      <p:nvGrpSpPr>
-        <p:cNvPr id="1" name=""/>
-        <p:cNvGrpSpPr/>
-        <p:nvPr/>
-      </p:nvGrpSpPr>
-      <p:grpSpPr>
-        <a:xfrm>
-          <a:off x="0" y="0"/>
-          <a:ext cx="0" cy="0"/>
-          <a:chOff x="0" y="0"/>
-          <a:chExt cx="0" cy="0"/>
-        </a:xfrm>
-      </p:grpSpPr>
-      <p:sp>
-        <p:nvSpPr>
-          <p:cNvPr id="2" name="Title 1">
-            <a:extLst>
-              <a:ext uri="{FF2B5EF4-FFF2-40B4-BE49-F238E27FC236}">
-                <a16:creationId xmlns:a16="http://schemas.microsoft.com/office/drawing/2014/main" id="{2E8F5975-87ED-4A9C-B5CB-262A2E0F3906}"/>
-              </a:ext>
-            </a:extLst>
-          </p:cNvPr>
-          <p:cNvSpPr>
-            <a:spLocks noGrp="1"/>
-          </p:cNvSpPr>
-          <p:nvPr>
-            <p:ph type="title"/>
-          </p:nvPr>
-        </p:nvSpPr>
-        <p:spPr/>
-        <p:txBody>
-          <a:bodyPr/>
-          <a:lstStyle/>
-          <a:p>
-            <a:r>
-              <a:rPr lang="en-US" dirty="0"/>
-              <a:t>Sources</a:t>
-            </a:r>
-          </a:p>
-        </p:txBody>
-      </p:sp>
-      <p:sp>
-        <p:nvSpPr>
-          <p:cNvPr id="3" name="Content Placeholder 2">
-            <a:extLst>
-              <a:ext uri="{FF2B5EF4-FFF2-40B4-BE49-F238E27FC236}">
-                <a16:creationId xmlns:a16="http://schemas.microsoft.com/office/drawing/2014/main" id="{770A82F1-0CBD-4A4C-A646-09C9BC09A4FE}"/>
-              </a:ext>
-            </a:extLst>
-          </p:cNvPr>
-          <p:cNvSpPr>
-            <a:spLocks noGrp="1"/>
-          </p:cNvSpPr>
-          <p:nvPr>
-            <p:ph idx="1"/>
-          </p:nvPr>
-        </p:nvSpPr>
-        <p:spPr/>
-        <p:txBody>
-          <a:bodyPr/>
-          <a:lstStyle/>
-          <a:p>
-            <a:endParaRPr lang="en-US" dirty="0"/>
-          </a:p>
-        </p:txBody>
-      </p:sp>
-    </p:spTree>
-    <p:extLst>
-      <p:ext uri="{BB962C8B-B14F-4D97-AF65-F5344CB8AC3E}">
-        <p14:creationId xmlns:p14="http://schemas.microsoft.com/office/powerpoint/2010/main" val="1887844965"/>
-      </p:ext>
-    </p:extLst>
-  </p:cSld>
-  <p:clrMapOvr>
-    <a:masterClrMapping/>
-  </p:clrMapOvr>
-</p:sld>
-</file>
-
-<file path=ppt/slides/slide7.xml><?xml version="1.0" encoding="utf-8"?>
-<p:sld xmlns:a="http://schemas.openxmlformats.org/drawingml/2006/main" xmlns:r="http://schemas.openxmlformats.org/officeDocument/2006/relationships" xmlns:p="http://schemas.openxmlformats.org/presentationml/2006/main">
-  <p:cSld>
-    <p:spTree>
-      <p:nvGrpSpPr>
-        <p:cNvPr id="1" name=""/>
-        <p:cNvGrpSpPr/>
-        <p:nvPr/>
-      </p:nvGrpSpPr>
-      <p:grpSpPr>
-        <a:xfrm>
-          <a:off x="0" y="0"/>
-          <a:ext cx="0" cy="0"/>
-          <a:chOff x="0" y="0"/>
-          <a:chExt cx="0" cy="0"/>
-        </a:xfrm>
-      </p:grpSpPr>
-      <p:sp>
-        <p:nvSpPr>
-          <p:cNvPr id="2" name="Rectangle 1">
-            <a:extLst>
-              <a:ext uri="{FF2B5EF4-FFF2-40B4-BE49-F238E27FC236}">
-                <a16:creationId xmlns:a16="http://schemas.microsoft.com/office/drawing/2014/main" id="{7056825A-6957-4AF0-B29B-F9DED036DFE4}"/>
-              </a:ext>
-            </a:extLst>
-          </p:cNvPr>
-          <p:cNvSpPr/>
-          <p:nvPr/>
-        </p:nvSpPr>
-        <p:spPr>
-          <a:xfrm>
-            <a:off x="850006" y="2485623"/>
-            <a:ext cx="8293994" cy="2559204"/>
-          </a:xfrm>
-          <a:prstGeom prst="rect">
-            <a:avLst/>
-          </a:prstGeom>
-        </p:spPr>
-        <p:txBody>
-          <a:bodyPr wrap="square">
-            <a:spAutoFit/>
-          </a:bodyPr>
-          <a:lstStyle/>
-          <a:p>
-            <a:r>
-              <a:rPr lang="en-US" dirty="0">
-                <a:latin typeface="Calibri" panose="020F0502020204030204" pitchFamily="34" charset="0"/>
-              </a:rPr>
-              <a:t>CRISPR-Cas9 is a method for quickly and accurately editing the genome of virtually any living thing. Using custom-built guide RNA paired with a cutting enzyme (Cas9), it can find and snip a selected sequence of DNA or RNA, eliminating or replacing a “bad” gene. Since it was first described, in late 2012, CRISPR has drastically accelerated the scope of research and moved into practical applications in medicine. So far in 2020, there are 15 trials underway. In medicine, where new drugs take a decade or more to develop, that’s game changing.</a:t>
-            </a:r>
-          </a:p>
-          <a:p>
-            <a:r>
-              <a:rPr lang="en-US" dirty="0">
-                <a:latin typeface="Calibri" panose="020F0502020204030204" pitchFamily="34" charset="0"/>
-              </a:rPr>
-              <a:t> </a:t>
-            </a:r>
-          </a:p>
-          <a:p>
-            <a:r>
-              <a:rPr lang="en-US" sz="1200" i="1" dirty="0">
-                <a:solidFill>
-                  <a:srgbClr val="595959"/>
-                </a:solidFill>
-                <a:latin typeface="Calibri" panose="020F0502020204030204" pitchFamily="34" charset="0"/>
-              </a:rPr>
-              <a:t>From &lt;</a:t>
-            </a:r>
-            <a:r>
-              <a:rPr lang="en-US" sz="1200" i="1" dirty="0">
-                <a:solidFill>
-                  <a:srgbClr val="595959"/>
-                </a:solidFill>
-                <a:latin typeface="Calibri" panose="020F0502020204030204" pitchFamily="34" charset="0"/>
-                <a:hlinkClick r:id="rId2"/>
-              </a:rPr>
-              <a:t>https://geneticliteracyproject.org/2020/06/12/infographic-what-crispr-is-curing-in-2020/</a:t>
-            </a:r>
-            <a:r>
-              <a:rPr lang="en-US" sz="1200" i="1" dirty="0">
-                <a:solidFill>
-                  <a:srgbClr val="595959"/>
-                </a:solidFill>
-                <a:latin typeface="Calibri" panose="020F0502020204030204" pitchFamily="34" charset="0"/>
-              </a:rPr>
-              <a:t>&gt; </a:t>
-            </a:r>
-            <a:endParaRPr lang="en-US" dirty="0">
-              <a:latin typeface="Calibri" panose="020F0502020204030204" pitchFamily="34" charset="0"/>
-            </a:endParaRPr>
-          </a:p>
-        </p:txBody>
-      </p:sp>
-    </p:spTree>
-    <p:extLst>
-      <p:ext uri="{BB962C8B-B14F-4D97-AF65-F5344CB8AC3E}">
-        <p14:creationId xmlns:p14="http://schemas.microsoft.com/office/powerpoint/2010/main" val="3818359876"/>
       </p:ext>
     </p:extLst>
   </p:cSld>

</xml_diff>

<commit_message>
updated Tableau and Power Point in progress
</commit_message>
<xml_diff>
--- a/NSS Capstone Ann Rumsey.pptx
+++ b/NSS Capstone Ann Rumsey.pptx
@@ -13,10 +13,13 @@
     <p:sldId id="270" r:id="rId10"/>
     <p:sldId id="269" r:id="rId11"/>
     <p:sldId id="267" r:id="rId12"/>
-    <p:sldId id="263" r:id="rId13"/>
-    <p:sldId id="264" r:id="rId14"/>
-    <p:sldId id="265" r:id="rId15"/>
-    <p:sldId id="266" r:id="rId16"/>
+    <p:sldId id="274" r:id="rId13"/>
+    <p:sldId id="263" r:id="rId14"/>
+    <p:sldId id="264" r:id="rId15"/>
+    <p:sldId id="265" r:id="rId16"/>
+    <p:sldId id="272" r:id="rId17"/>
+    <p:sldId id="273" r:id="rId18"/>
+    <p:sldId id="266" r:id="rId19"/>
   </p:sldIdLst>
   <p:sldSz cx="12192000" cy="6858000"/>
   <p:notesSz cx="6858000" cy="9144000"/>
@@ -121,3508 +124,6 @@
     </p:ext>
   </p:extLst>
 </p:presentation>
-</file>
-
-<file path=ppt/charts/chart1.xml><?xml version="1.0" encoding="utf-8"?>
-<c:chartSpace xmlns:c="http://schemas.openxmlformats.org/drawingml/2006/chart" xmlns:a="http://schemas.openxmlformats.org/drawingml/2006/main" xmlns:r="http://schemas.openxmlformats.org/officeDocument/2006/relationships" xmlns:c16r2="http://schemas.microsoft.com/office/drawing/2015/06/chart">
-  <c:date1904 val="0"/>
-  <c:lang val="en-US"/>
-  <c:roundedCorners val="0"/>
-  <mc:AlternateContent xmlns:mc="http://schemas.openxmlformats.org/markup-compatibility/2006">
-    <mc:Choice xmlns:c14="http://schemas.microsoft.com/office/drawing/2007/8/2/chart" Requires="c14">
-      <c14:style val="102"/>
-    </mc:Choice>
-    <mc:Fallback>
-      <c:style val="2"/>
-    </mc:Fallback>
-  </mc:AlternateContent>
-  <c:chart>
-    <c:autoTitleDeleted val="0"/>
-    <c:plotArea>
-      <c:layout/>
-      <c:scatterChart>
-        <c:scatterStyle val="lineMarker"/>
-        <c:varyColors val="0"/>
-        <c:ser>
-          <c:idx val="0"/>
-          <c:order val="0"/>
-          <c:spPr>
-            <a:ln w="19050" cap="rnd">
-              <a:noFill/>
-              <a:round/>
-            </a:ln>
-            <a:effectLst/>
-          </c:spPr>
-          <c:marker>
-            <c:symbol val="circle"/>
-            <c:size val="5"/>
-            <c:spPr>
-              <a:solidFill>
-                <a:schemeClr val="accent1"/>
-              </a:solidFill>
-              <a:ln w="9525">
-                <a:solidFill>
-                  <a:schemeClr val="accent1"/>
-                </a:solidFill>
-              </a:ln>
-              <a:effectLst/>
-            </c:spPr>
-          </c:marker>
-          <c:dLbls>
-            <c:dLbl>
-              <c:idx val="0"/>
-              <c:tx>
-                <c:rich>
-                  <a:bodyPr/>
-                  <a:lstStyle/>
-                  <a:p>
-                    <a:fld id="{FB4A12AF-9100-43CD-8058-62E5327470D8}" type="CELLRANGE">
-                      <a:rPr lang="en-US"/>
-                      <a:pPr/>
-                      <a:t>[CELLRANGE]</a:t>
-                    </a:fld>
-                    <a:endParaRPr lang="en-US"/>
-                  </a:p>
-                </c:rich>
-              </c:tx>
-              <c:dLblPos val="r"/>
-              <c:showLegendKey val="0"/>
-              <c:showVal val="0"/>
-              <c:showCatName val="0"/>
-              <c:showSerName val="0"/>
-              <c:showPercent val="0"/>
-              <c:showBubbleSize val="0"/>
-              <c:extLst>
-                <c:ext xmlns:c15="http://schemas.microsoft.com/office/drawing/2012/chart" uri="{CE6537A1-D6FC-4f65-9D91-7224C49458BB}">
-                  <c15:dlblFieldTable/>
-                  <c15:xForSave val="1"/>
-                  <c15:showDataLabelsRange val="1"/>
-                </c:ext>
-                <c:ext xmlns:c16="http://schemas.microsoft.com/office/drawing/2014/chart" uri="{C3380CC4-5D6E-409C-BE32-E72D297353CC}">
-                  <c16:uniqueId val="{00000000-41A1-450A-8E98-2BC932F38472}"/>
-                </c:ext>
-              </c:extLst>
-            </c:dLbl>
-            <c:dLbl>
-              <c:idx val="1"/>
-              <c:tx>
-                <c:rich>
-                  <a:bodyPr/>
-                  <a:lstStyle/>
-                  <a:p>
-                    <a:fld id="{F6961B57-C1A9-4331-8B00-103082DB8311}" type="CELLRANGE">
-                      <a:rPr lang="en-US"/>
-                      <a:pPr/>
-                      <a:t>[CELLRANGE]</a:t>
-                    </a:fld>
-                    <a:endParaRPr lang="en-US"/>
-                  </a:p>
-                </c:rich>
-              </c:tx>
-              <c:dLblPos val="r"/>
-              <c:showLegendKey val="0"/>
-              <c:showVal val="0"/>
-              <c:showCatName val="0"/>
-              <c:showSerName val="0"/>
-              <c:showPercent val="0"/>
-              <c:showBubbleSize val="0"/>
-              <c:extLst>
-                <c:ext xmlns:c15="http://schemas.microsoft.com/office/drawing/2012/chart" uri="{CE6537A1-D6FC-4f65-9D91-7224C49458BB}">
-                  <c15:dlblFieldTable/>
-                  <c15:xForSave val="1"/>
-                  <c15:showDataLabelsRange val="1"/>
-                </c:ext>
-                <c:ext xmlns:c16="http://schemas.microsoft.com/office/drawing/2014/chart" uri="{C3380CC4-5D6E-409C-BE32-E72D297353CC}">
-                  <c16:uniqueId val="{00000001-41A1-450A-8E98-2BC932F38472}"/>
-                </c:ext>
-              </c:extLst>
-            </c:dLbl>
-            <c:dLbl>
-              <c:idx val="2"/>
-              <c:tx>
-                <c:rich>
-                  <a:bodyPr/>
-                  <a:lstStyle/>
-                  <a:p>
-                    <a:fld id="{52EF42F2-BDB2-46FB-9EFF-D017EC6B6BE7}" type="CELLRANGE">
-                      <a:rPr lang="en-US"/>
-                      <a:pPr/>
-                      <a:t>[CELLRANGE]</a:t>
-                    </a:fld>
-                    <a:endParaRPr lang="en-US"/>
-                  </a:p>
-                </c:rich>
-              </c:tx>
-              <c:dLblPos val="r"/>
-              <c:showLegendKey val="0"/>
-              <c:showVal val="0"/>
-              <c:showCatName val="0"/>
-              <c:showSerName val="0"/>
-              <c:showPercent val="0"/>
-              <c:showBubbleSize val="0"/>
-              <c:extLst>
-                <c:ext xmlns:c15="http://schemas.microsoft.com/office/drawing/2012/chart" uri="{CE6537A1-D6FC-4f65-9D91-7224C49458BB}">
-                  <c15:dlblFieldTable/>
-                  <c15:xForSave val="1"/>
-                  <c15:showDataLabelsRange val="1"/>
-                </c:ext>
-                <c:ext xmlns:c16="http://schemas.microsoft.com/office/drawing/2014/chart" uri="{C3380CC4-5D6E-409C-BE32-E72D297353CC}">
-                  <c16:uniqueId val="{00000002-41A1-450A-8E98-2BC932F38472}"/>
-                </c:ext>
-              </c:extLst>
-            </c:dLbl>
-            <c:dLbl>
-              <c:idx val="3"/>
-              <c:tx>
-                <c:rich>
-                  <a:bodyPr/>
-                  <a:lstStyle/>
-                  <a:p>
-                    <a:fld id="{96E302C3-29DF-4569-BFFA-54627E662BB9}" type="CELLRANGE">
-                      <a:rPr lang="en-US"/>
-                      <a:pPr/>
-                      <a:t>[CELLRANGE]</a:t>
-                    </a:fld>
-                    <a:endParaRPr lang="en-US"/>
-                  </a:p>
-                </c:rich>
-              </c:tx>
-              <c:dLblPos val="r"/>
-              <c:showLegendKey val="0"/>
-              <c:showVal val="0"/>
-              <c:showCatName val="0"/>
-              <c:showSerName val="0"/>
-              <c:showPercent val="0"/>
-              <c:showBubbleSize val="0"/>
-              <c:extLst>
-                <c:ext xmlns:c15="http://schemas.microsoft.com/office/drawing/2012/chart" uri="{CE6537A1-D6FC-4f65-9D91-7224C49458BB}">
-                  <c15:dlblFieldTable/>
-                  <c15:xForSave val="1"/>
-                  <c15:showDataLabelsRange val="1"/>
-                </c:ext>
-                <c:ext xmlns:c16="http://schemas.microsoft.com/office/drawing/2014/chart" uri="{C3380CC4-5D6E-409C-BE32-E72D297353CC}">
-                  <c16:uniqueId val="{00000003-41A1-450A-8E98-2BC932F38472}"/>
-                </c:ext>
-              </c:extLst>
-            </c:dLbl>
-            <c:dLbl>
-              <c:idx val="4"/>
-              <c:tx>
-                <c:rich>
-                  <a:bodyPr/>
-                  <a:lstStyle/>
-                  <a:p>
-                    <a:fld id="{86EC1849-C110-420A-BBE6-4AEDE57AFC6A}" type="CELLRANGE">
-                      <a:rPr lang="en-US"/>
-                      <a:pPr/>
-                      <a:t>[CELLRANGE]</a:t>
-                    </a:fld>
-                    <a:endParaRPr lang="en-US"/>
-                  </a:p>
-                </c:rich>
-              </c:tx>
-              <c:dLblPos val="r"/>
-              <c:showLegendKey val="0"/>
-              <c:showVal val="0"/>
-              <c:showCatName val="0"/>
-              <c:showSerName val="0"/>
-              <c:showPercent val="0"/>
-              <c:showBubbleSize val="0"/>
-              <c:extLst>
-                <c:ext xmlns:c15="http://schemas.microsoft.com/office/drawing/2012/chart" uri="{CE6537A1-D6FC-4f65-9D91-7224C49458BB}">
-                  <c15:dlblFieldTable/>
-                  <c15:xForSave val="1"/>
-                  <c15:showDataLabelsRange val="1"/>
-                </c:ext>
-                <c:ext xmlns:c16="http://schemas.microsoft.com/office/drawing/2014/chart" uri="{C3380CC4-5D6E-409C-BE32-E72D297353CC}">
-                  <c16:uniqueId val="{00000004-41A1-450A-8E98-2BC932F38472}"/>
-                </c:ext>
-              </c:extLst>
-            </c:dLbl>
-            <c:dLbl>
-              <c:idx val="5"/>
-              <c:tx>
-                <c:rich>
-                  <a:bodyPr/>
-                  <a:lstStyle/>
-                  <a:p>
-                    <a:fld id="{DF2B8D4A-6D24-4057-B113-F4F38988A9EC}" type="CELLRANGE">
-                      <a:rPr lang="en-US"/>
-                      <a:pPr/>
-                      <a:t>[CELLRANGE]</a:t>
-                    </a:fld>
-                    <a:endParaRPr lang="en-US"/>
-                  </a:p>
-                </c:rich>
-              </c:tx>
-              <c:dLblPos val="r"/>
-              <c:showLegendKey val="0"/>
-              <c:showVal val="0"/>
-              <c:showCatName val="0"/>
-              <c:showSerName val="0"/>
-              <c:showPercent val="0"/>
-              <c:showBubbleSize val="0"/>
-              <c:extLst>
-                <c:ext xmlns:c15="http://schemas.microsoft.com/office/drawing/2012/chart" uri="{CE6537A1-D6FC-4f65-9D91-7224C49458BB}">
-                  <c15:dlblFieldTable/>
-                  <c15:xForSave val="1"/>
-                  <c15:showDataLabelsRange val="1"/>
-                </c:ext>
-                <c:ext xmlns:c16="http://schemas.microsoft.com/office/drawing/2014/chart" uri="{C3380CC4-5D6E-409C-BE32-E72D297353CC}">
-                  <c16:uniqueId val="{00000005-41A1-450A-8E98-2BC932F38472}"/>
-                </c:ext>
-              </c:extLst>
-            </c:dLbl>
-            <c:dLbl>
-              <c:idx val="6"/>
-              <c:tx>
-                <c:rich>
-                  <a:bodyPr/>
-                  <a:lstStyle/>
-                  <a:p>
-                    <a:fld id="{563B4982-C5B0-460D-9F7E-67C51D6DD32A}" type="CELLRANGE">
-                      <a:rPr lang="en-US"/>
-                      <a:pPr/>
-                      <a:t>[CELLRANGE]</a:t>
-                    </a:fld>
-                    <a:endParaRPr lang="en-US"/>
-                  </a:p>
-                </c:rich>
-              </c:tx>
-              <c:dLblPos val="r"/>
-              <c:showLegendKey val="0"/>
-              <c:showVal val="0"/>
-              <c:showCatName val="0"/>
-              <c:showSerName val="0"/>
-              <c:showPercent val="0"/>
-              <c:showBubbleSize val="0"/>
-              <c:extLst>
-                <c:ext xmlns:c15="http://schemas.microsoft.com/office/drawing/2012/chart" uri="{CE6537A1-D6FC-4f65-9D91-7224C49458BB}">
-                  <c15:dlblFieldTable/>
-                  <c15:xForSave val="1"/>
-                  <c15:showDataLabelsRange val="1"/>
-                </c:ext>
-                <c:ext xmlns:c16="http://schemas.microsoft.com/office/drawing/2014/chart" uri="{C3380CC4-5D6E-409C-BE32-E72D297353CC}">
-                  <c16:uniqueId val="{00000006-41A1-450A-8E98-2BC932F38472}"/>
-                </c:ext>
-              </c:extLst>
-            </c:dLbl>
-            <c:dLbl>
-              <c:idx val="7"/>
-              <c:tx>
-                <c:rich>
-                  <a:bodyPr/>
-                  <a:lstStyle/>
-                  <a:p>
-                    <a:fld id="{8AF05BD5-5184-4DBE-8210-5F865870D10B}" type="CELLRANGE">
-                      <a:rPr lang="en-US"/>
-                      <a:pPr/>
-                      <a:t>[CELLRANGE]</a:t>
-                    </a:fld>
-                    <a:endParaRPr lang="en-US"/>
-                  </a:p>
-                </c:rich>
-              </c:tx>
-              <c:dLblPos val="r"/>
-              <c:showLegendKey val="0"/>
-              <c:showVal val="0"/>
-              <c:showCatName val="0"/>
-              <c:showSerName val="0"/>
-              <c:showPercent val="0"/>
-              <c:showBubbleSize val="0"/>
-              <c:extLst>
-                <c:ext xmlns:c15="http://schemas.microsoft.com/office/drawing/2012/chart" uri="{CE6537A1-D6FC-4f65-9D91-7224C49458BB}">
-                  <c15:dlblFieldTable/>
-                  <c15:xForSave val="1"/>
-                  <c15:showDataLabelsRange val="1"/>
-                </c:ext>
-                <c:ext xmlns:c16="http://schemas.microsoft.com/office/drawing/2014/chart" uri="{C3380CC4-5D6E-409C-BE32-E72D297353CC}">
-                  <c16:uniqueId val="{00000007-41A1-450A-8E98-2BC932F38472}"/>
-                </c:ext>
-              </c:extLst>
-            </c:dLbl>
-            <c:dLbl>
-              <c:idx val="8"/>
-              <c:tx>
-                <c:rich>
-                  <a:bodyPr/>
-                  <a:lstStyle/>
-                  <a:p>
-                    <a:fld id="{A8DD1AB2-B018-4F0A-BF6F-8EFFBACC48FF}" type="CELLRANGE">
-                      <a:rPr lang="en-US"/>
-                      <a:pPr/>
-                      <a:t>[CELLRANGE]</a:t>
-                    </a:fld>
-                    <a:endParaRPr lang="en-US"/>
-                  </a:p>
-                </c:rich>
-              </c:tx>
-              <c:dLblPos val="r"/>
-              <c:showLegendKey val="0"/>
-              <c:showVal val="0"/>
-              <c:showCatName val="0"/>
-              <c:showSerName val="0"/>
-              <c:showPercent val="0"/>
-              <c:showBubbleSize val="0"/>
-              <c:extLst>
-                <c:ext xmlns:c15="http://schemas.microsoft.com/office/drawing/2012/chart" uri="{CE6537A1-D6FC-4f65-9D91-7224C49458BB}">
-                  <c15:dlblFieldTable/>
-                  <c15:xForSave val="1"/>
-                  <c15:showDataLabelsRange val="1"/>
-                </c:ext>
-                <c:ext xmlns:c16="http://schemas.microsoft.com/office/drawing/2014/chart" uri="{C3380CC4-5D6E-409C-BE32-E72D297353CC}">
-                  <c16:uniqueId val="{00000008-41A1-450A-8E98-2BC932F38472}"/>
-                </c:ext>
-              </c:extLst>
-            </c:dLbl>
-            <c:dLbl>
-              <c:idx val="9"/>
-              <c:tx>
-                <c:rich>
-                  <a:bodyPr/>
-                  <a:lstStyle/>
-                  <a:p>
-                    <a:fld id="{C99BAA3D-C70F-4BF7-8C0B-C2BF3A054233}" type="CELLRANGE">
-                      <a:rPr lang="en-US"/>
-                      <a:pPr/>
-                      <a:t>[CELLRANGE]</a:t>
-                    </a:fld>
-                    <a:endParaRPr lang="en-US"/>
-                  </a:p>
-                </c:rich>
-              </c:tx>
-              <c:dLblPos val="r"/>
-              <c:showLegendKey val="0"/>
-              <c:showVal val="0"/>
-              <c:showCatName val="0"/>
-              <c:showSerName val="0"/>
-              <c:showPercent val="0"/>
-              <c:showBubbleSize val="0"/>
-              <c:extLst>
-                <c:ext xmlns:c15="http://schemas.microsoft.com/office/drawing/2012/chart" uri="{CE6537A1-D6FC-4f65-9D91-7224C49458BB}">
-                  <c15:dlblFieldTable/>
-                  <c15:xForSave val="1"/>
-                  <c15:showDataLabelsRange val="1"/>
-                </c:ext>
-                <c:ext xmlns:c16="http://schemas.microsoft.com/office/drawing/2014/chart" uri="{C3380CC4-5D6E-409C-BE32-E72D297353CC}">
-                  <c16:uniqueId val="{00000009-41A1-450A-8E98-2BC932F38472}"/>
-                </c:ext>
-              </c:extLst>
-            </c:dLbl>
-            <c:dLbl>
-              <c:idx val="10"/>
-              <c:tx>
-                <c:rich>
-                  <a:bodyPr/>
-                  <a:lstStyle/>
-                  <a:p>
-                    <a:fld id="{232B7251-1EB5-4A6D-B5DF-CE926C3F1DEC}" type="CELLRANGE">
-                      <a:rPr lang="en-US"/>
-                      <a:pPr/>
-                      <a:t>[CELLRANGE]</a:t>
-                    </a:fld>
-                    <a:endParaRPr lang="en-US"/>
-                  </a:p>
-                </c:rich>
-              </c:tx>
-              <c:dLblPos val="r"/>
-              <c:showLegendKey val="0"/>
-              <c:showVal val="0"/>
-              <c:showCatName val="0"/>
-              <c:showSerName val="0"/>
-              <c:showPercent val="0"/>
-              <c:showBubbleSize val="0"/>
-              <c:extLst>
-                <c:ext xmlns:c15="http://schemas.microsoft.com/office/drawing/2012/chart" uri="{CE6537A1-D6FC-4f65-9D91-7224C49458BB}">
-                  <c15:dlblFieldTable/>
-                  <c15:xForSave val="1"/>
-                  <c15:showDataLabelsRange val="1"/>
-                </c:ext>
-                <c:ext xmlns:c16="http://schemas.microsoft.com/office/drawing/2014/chart" uri="{C3380CC4-5D6E-409C-BE32-E72D297353CC}">
-                  <c16:uniqueId val="{0000000A-41A1-450A-8E98-2BC932F38472}"/>
-                </c:ext>
-              </c:extLst>
-            </c:dLbl>
-            <c:dLbl>
-              <c:idx val="11"/>
-              <c:tx>
-                <c:rich>
-                  <a:bodyPr/>
-                  <a:lstStyle/>
-                  <a:p>
-                    <a:fld id="{7951147D-C4D9-49E9-9297-D8D207CC3CA2}" type="CELLRANGE">
-                      <a:rPr lang="en-US"/>
-                      <a:pPr/>
-                      <a:t>[CELLRANGE]</a:t>
-                    </a:fld>
-                    <a:endParaRPr lang="en-US"/>
-                  </a:p>
-                </c:rich>
-              </c:tx>
-              <c:dLblPos val="r"/>
-              <c:showLegendKey val="0"/>
-              <c:showVal val="0"/>
-              <c:showCatName val="0"/>
-              <c:showSerName val="0"/>
-              <c:showPercent val="0"/>
-              <c:showBubbleSize val="0"/>
-              <c:extLst>
-                <c:ext xmlns:c15="http://schemas.microsoft.com/office/drawing/2012/chart" uri="{CE6537A1-D6FC-4f65-9D91-7224C49458BB}">
-                  <c15:dlblFieldTable/>
-                  <c15:xForSave val="1"/>
-                  <c15:showDataLabelsRange val="1"/>
-                </c:ext>
-                <c:ext xmlns:c16="http://schemas.microsoft.com/office/drawing/2014/chart" uri="{C3380CC4-5D6E-409C-BE32-E72D297353CC}">
-                  <c16:uniqueId val="{0000000B-41A1-450A-8E98-2BC932F38472}"/>
-                </c:ext>
-              </c:extLst>
-            </c:dLbl>
-            <c:dLbl>
-              <c:idx val="12"/>
-              <c:tx>
-                <c:rich>
-                  <a:bodyPr/>
-                  <a:lstStyle/>
-                  <a:p>
-                    <a:fld id="{812337AD-8AE7-4476-9F4A-9C07831BA14E}" type="CELLRANGE">
-                      <a:rPr lang="en-US"/>
-                      <a:pPr/>
-                      <a:t>[CELLRANGE]</a:t>
-                    </a:fld>
-                    <a:endParaRPr lang="en-US"/>
-                  </a:p>
-                </c:rich>
-              </c:tx>
-              <c:dLblPos val="r"/>
-              <c:showLegendKey val="0"/>
-              <c:showVal val="0"/>
-              <c:showCatName val="0"/>
-              <c:showSerName val="0"/>
-              <c:showPercent val="0"/>
-              <c:showBubbleSize val="0"/>
-              <c:extLst>
-                <c:ext xmlns:c15="http://schemas.microsoft.com/office/drawing/2012/chart" uri="{CE6537A1-D6FC-4f65-9D91-7224C49458BB}">
-                  <c15:dlblFieldTable/>
-                  <c15:xForSave val="1"/>
-                  <c15:showDataLabelsRange val="1"/>
-                </c:ext>
-                <c:ext xmlns:c16="http://schemas.microsoft.com/office/drawing/2014/chart" uri="{C3380CC4-5D6E-409C-BE32-E72D297353CC}">
-                  <c16:uniqueId val="{0000000C-41A1-450A-8E98-2BC932F38472}"/>
-                </c:ext>
-              </c:extLst>
-            </c:dLbl>
-            <c:dLbl>
-              <c:idx val="13"/>
-              <c:tx>
-                <c:rich>
-                  <a:bodyPr/>
-                  <a:lstStyle/>
-                  <a:p>
-                    <a:fld id="{201D9504-3B03-4969-84B0-1B45719DF5DE}" type="CELLRANGE">
-                      <a:rPr lang="en-US"/>
-                      <a:pPr/>
-                      <a:t>[CELLRANGE]</a:t>
-                    </a:fld>
-                    <a:endParaRPr lang="en-US"/>
-                  </a:p>
-                </c:rich>
-              </c:tx>
-              <c:dLblPos val="r"/>
-              <c:showLegendKey val="0"/>
-              <c:showVal val="0"/>
-              <c:showCatName val="0"/>
-              <c:showSerName val="0"/>
-              <c:showPercent val="0"/>
-              <c:showBubbleSize val="0"/>
-              <c:extLst>
-                <c:ext xmlns:c15="http://schemas.microsoft.com/office/drawing/2012/chart" uri="{CE6537A1-D6FC-4f65-9D91-7224C49458BB}">
-                  <c15:dlblFieldTable/>
-                  <c15:xForSave val="1"/>
-                  <c15:showDataLabelsRange val="1"/>
-                </c:ext>
-                <c:ext xmlns:c16="http://schemas.microsoft.com/office/drawing/2014/chart" uri="{C3380CC4-5D6E-409C-BE32-E72D297353CC}">
-                  <c16:uniqueId val="{0000000D-41A1-450A-8E98-2BC932F38472}"/>
-                </c:ext>
-              </c:extLst>
-            </c:dLbl>
-            <c:dLbl>
-              <c:idx val="14"/>
-              <c:tx>
-                <c:rich>
-                  <a:bodyPr/>
-                  <a:lstStyle/>
-                  <a:p>
-                    <a:fld id="{42F35E4C-4FCC-4354-8A8E-7287C294832E}" type="CELLRANGE">
-                      <a:rPr lang="en-US"/>
-                      <a:pPr/>
-                      <a:t>[CELLRANGE]</a:t>
-                    </a:fld>
-                    <a:endParaRPr lang="en-US"/>
-                  </a:p>
-                </c:rich>
-              </c:tx>
-              <c:dLblPos val="r"/>
-              <c:showLegendKey val="0"/>
-              <c:showVal val="0"/>
-              <c:showCatName val="0"/>
-              <c:showSerName val="0"/>
-              <c:showPercent val="0"/>
-              <c:showBubbleSize val="0"/>
-              <c:extLst>
-                <c:ext xmlns:c15="http://schemas.microsoft.com/office/drawing/2012/chart" uri="{CE6537A1-D6FC-4f65-9D91-7224C49458BB}">
-                  <c15:dlblFieldTable/>
-                  <c15:xForSave val="1"/>
-                  <c15:showDataLabelsRange val="1"/>
-                </c:ext>
-                <c:ext xmlns:c16="http://schemas.microsoft.com/office/drawing/2014/chart" uri="{C3380CC4-5D6E-409C-BE32-E72D297353CC}">
-                  <c16:uniqueId val="{0000000E-41A1-450A-8E98-2BC932F38472}"/>
-                </c:ext>
-              </c:extLst>
-            </c:dLbl>
-            <c:dLbl>
-              <c:idx val="15"/>
-              <c:tx>
-                <c:rich>
-                  <a:bodyPr/>
-                  <a:lstStyle/>
-                  <a:p>
-                    <a:fld id="{5E337AD0-FFD9-44BD-8BB9-3D628C2EE3EE}" type="CELLRANGE">
-                      <a:rPr lang="en-US"/>
-                      <a:pPr/>
-                      <a:t>[CELLRANGE]</a:t>
-                    </a:fld>
-                    <a:endParaRPr lang="en-US"/>
-                  </a:p>
-                </c:rich>
-              </c:tx>
-              <c:dLblPos val="r"/>
-              <c:showLegendKey val="0"/>
-              <c:showVal val="0"/>
-              <c:showCatName val="0"/>
-              <c:showSerName val="0"/>
-              <c:showPercent val="0"/>
-              <c:showBubbleSize val="0"/>
-              <c:extLst>
-                <c:ext xmlns:c15="http://schemas.microsoft.com/office/drawing/2012/chart" uri="{CE6537A1-D6FC-4f65-9D91-7224C49458BB}">
-                  <c15:dlblFieldTable/>
-                  <c15:xForSave val="1"/>
-                  <c15:showDataLabelsRange val="1"/>
-                </c:ext>
-                <c:ext xmlns:c16="http://schemas.microsoft.com/office/drawing/2014/chart" uri="{C3380CC4-5D6E-409C-BE32-E72D297353CC}">
-                  <c16:uniqueId val="{0000000F-41A1-450A-8E98-2BC932F38472}"/>
-                </c:ext>
-              </c:extLst>
-            </c:dLbl>
-            <c:dLbl>
-              <c:idx val="16"/>
-              <c:tx>
-                <c:rich>
-                  <a:bodyPr/>
-                  <a:lstStyle/>
-                  <a:p>
-                    <a:fld id="{7780ACC9-B442-474D-AC40-0EACC227F849}" type="CELLRANGE">
-                      <a:rPr lang="en-US"/>
-                      <a:pPr/>
-                      <a:t>[CELLRANGE]</a:t>
-                    </a:fld>
-                    <a:endParaRPr lang="en-US"/>
-                  </a:p>
-                </c:rich>
-              </c:tx>
-              <c:dLblPos val="r"/>
-              <c:showLegendKey val="0"/>
-              <c:showVal val="0"/>
-              <c:showCatName val="0"/>
-              <c:showSerName val="0"/>
-              <c:showPercent val="0"/>
-              <c:showBubbleSize val="0"/>
-              <c:extLst>
-                <c:ext xmlns:c15="http://schemas.microsoft.com/office/drawing/2012/chart" uri="{CE6537A1-D6FC-4f65-9D91-7224C49458BB}">
-                  <c15:dlblFieldTable/>
-                  <c15:xForSave val="1"/>
-                  <c15:showDataLabelsRange val="1"/>
-                </c:ext>
-                <c:ext xmlns:c16="http://schemas.microsoft.com/office/drawing/2014/chart" uri="{C3380CC4-5D6E-409C-BE32-E72D297353CC}">
-                  <c16:uniqueId val="{00000010-41A1-450A-8E98-2BC932F38472}"/>
-                </c:ext>
-              </c:extLst>
-            </c:dLbl>
-            <c:dLbl>
-              <c:idx val="17"/>
-              <c:tx>
-                <c:rich>
-                  <a:bodyPr/>
-                  <a:lstStyle/>
-                  <a:p>
-                    <a:fld id="{ACD10A03-25CD-47B2-8164-5A70228779C2}" type="CELLRANGE">
-                      <a:rPr lang="en-US"/>
-                      <a:pPr/>
-                      <a:t>[CELLRANGE]</a:t>
-                    </a:fld>
-                    <a:endParaRPr lang="en-US"/>
-                  </a:p>
-                </c:rich>
-              </c:tx>
-              <c:dLblPos val="r"/>
-              <c:showLegendKey val="0"/>
-              <c:showVal val="0"/>
-              <c:showCatName val="0"/>
-              <c:showSerName val="0"/>
-              <c:showPercent val="0"/>
-              <c:showBubbleSize val="0"/>
-              <c:extLst>
-                <c:ext xmlns:c15="http://schemas.microsoft.com/office/drawing/2012/chart" uri="{CE6537A1-D6FC-4f65-9D91-7224C49458BB}">
-                  <c15:dlblFieldTable/>
-                  <c15:xForSave val="1"/>
-                  <c15:showDataLabelsRange val="1"/>
-                </c:ext>
-                <c:ext xmlns:c16="http://schemas.microsoft.com/office/drawing/2014/chart" uri="{C3380CC4-5D6E-409C-BE32-E72D297353CC}">
-                  <c16:uniqueId val="{00000011-41A1-450A-8E98-2BC932F38472}"/>
-                </c:ext>
-              </c:extLst>
-            </c:dLbl>
-            <c:dLbl>
-              <c:idx val="18"/>
-              <c:tx>
-                <c:rich>
-                  <a:bodyPr/>
-                  <a:lstStyle/>
-                  <a:p>
-                    <a:fld id="{7484B10A-7087-4523-B175-DC821864D365}" type="CELLRANGE">
-                      <a:rPr lang="en-US"/>
-                      <a:pPr/>
-                      <a:t>[CELLRANGE]</a:t>
-                    </a:fld>
-                    <a:endParaRPr lang="en-US"/>
-                  </a:p>
-                </c:rich>
-              </c:tx>
-              <c:dLblPos val="r"/>
-              <c:showLegendKey val="0"/>
-              <c:showVal val="0"/>
-              <c:showCatName val="0"/>
-              <c:showSerName val="0"/>
-              <c:showPercent val="0"/>
-              <c:showBubbleSize val="0"/>
-              <c:extLst>
-                <c:ext xmlns:c15="http://schemas.microsoft.com/office/drawing/2012/chart" uri="{CE6537A1-D6FC-4f65-9D91-7224C49458BB}">
-                  <c15:dlblFieldTable/>
-                  <c15:xForSave val="1"/>
-                  <c15:showDataLabelsRange val="1"/>
-                </c:ext>
-                <c:ext xmlns:c16="http://schemas.microsoft.com/office/drawing/2014/chart" uri="{C3380CC4-5D6E-409C-BE32-E72D297353CC}">
-                  <c16:uniqueId val="{00000012-41A1-450A-8E98-2BC932F38472}"/>
-                </c:ext>
-              </c:extLst>
-            </c:dLbl>
-            <c:dLbl>
-              <c:idx val="19"/>
-              <c:tx>
-                <c:rich>
-                  <a:bodyPr/>
-                  <a:lstStyle/>
-                  <a:p>
-                    <a:fld id="{4FBD49DD-3424-48F8-B50B-681BD669BE4B}" type="CELLRANGE">
-                      <a:rPr lang="en-US"/>
-                      <a:pPr/>
-                      <a:t>[CELLRANGE]</a:t>
-                    </a:fld>
-                    <a:endParaRPr lang="en-US"/>
-                  </a:p>
-                </c:rich>
-              </c:tx>
-              <c:dLblPos val="r"/>
-              <c:showLegendKey val="0"/>
-              <c:showVal val="0"/>
-              <c:showCatName val="0"/>
-              <c:showSerName val="0"/>
-              <c:showPercent val="0"/>
-              <c:showBubbleSize val="0"/>
-              <c:extLst>
-                <c:ext xmlns:c15="http://schemas.microsoft.com/office/drawing/2012/chart" uri="{CE6537A1-D6FC-4f65-9D91-7224C49458BB}">
-                  <c15:dlblFieldTable/>
-                  <c15:xForSave val="1"/>
-                  <c15:showDataLabelsRange val="1"/>
-                </c:ext>
-                <c:ext xmlns:c16="http://schemas.microsoft.com/office/drawing/2014/chart" uri="{C3380CC4-5D6E-409C-BE32-E72D297353CC}">
-                  <c16:uniqueId val="{00000013-41A1-450A-8E98-2BC932F38472}"/>
-                </c:ext>
-              </c:extLst>
-            </c:dLbl>
-            <c:dLbl>
-              <c:idx val="20"/>
-              <c:tx>
-                <c:rich>
-                  <a:bodyPr/>
-                  <a:lstStyle/>
-                  <a:p>
-                    <a:fld id="{174C7F46-F0AC-4080-AB53-E003E4C65943}" type="CELLRANGE">
-                      <a:rPr lang="en-US"/>
-                      <a:pPr/>
-                      <a:t>[CELLRANGE]</a:t>
-                    </a:fld>
-                    <a:endParaRPr lang="en-US"/>
-                  </a:p>
-                </c:rich>
-              </c:tx>
-              <c:dLblPos val="r"/>
-              <c:showLegendKey val="0"/>
-              <c:showVal val="0"/>
-              <c:showCatName val="0"/>
-              <c:showSerName val="0"/>
-              <c:showPercent val="0"/>
-              <c:showBubbleSize val="0"/>
-              <c:extLst>
-                <c:ext xmlns:c15="http://schemas.microsoft.com/office/drawing/2012/chart" uri="{CE6537A1-D6FC-4f65-9D91-7224C49458BB}">
-                  <c15:dlblFieldTable/>
-                  <c15:xForSave val="1"/>
-                  <c15:showDataLabelsRange val="1"/>
-                </c:ext>
-                <c:ext xmlns:c16="http://schemas.microsoft.com/office/drawing/2014/chart" uri="{C3380CC4-5D6E-409C-BE32-E72D297353CC}">
-                  <c16:uniqueId val="{00000014-41A1-450A-8E98-2BC932F38472}"/>
-                </c:ext>
-              </c:extLst>
-            </c:dLbl>
-            <c:dLbl>
-              <c:idx val="21"/>
-              <c:tx>
-                <c:rich>
-                  <a:bodyPr/>
-                  <a:lstStyle/>
-                  <a:p>
-                    <a:fld id="{D349FDC8-BAB0-475B-9419-02D5F65F0586}" type="CELLRANGE">
-                      <a:rPr lang="en-US"/>
-                      <a:pPr/>
-                      <a:t>[CELLRANGE]</a:t>
-                    </a:fld>
-                    <a:endParaRPr lang="en-US"/>
-                  </a:p>
-                </c:rich>
-              </c:tx>
-              <c:dLblPos val="r"/>
-              <c:showLegendKey val="0"/>
-              <c:showVal val="0"/>
-              <c:showCatName val="0"/>
-              <c:showSerName val="0"/>
-              <c:showPercent val="0"/>
-              <c:showBubbleSize val="0"/>
-              <c:extLst>
-                <c:ext xmlns:c15="http://schemas.microsoft.com/office/drawing/2012/chart" uri="{CE6537A1-D6FC-4f65-9D91-7224C49458BB}">
-                  <c15:dlblFieldTable/>
-                  <c15:xForSave val="1"/>
-                  <c15:showDataLabelsRange val="1"/>
-                </c:ext>
-                <c:ext xmlns:c16="http://schemas.microsoft.com/office/drawing/2014/chart" uri="{C3380CC4-5D6E-409C-BE32-E72D297353CC}">
-                  <c16:uniqueId val="{00000015-41A1-450A-8E98-2BC932F38472}"/>
-                </c:ext>
-              </c:extLst>
-            </c:dLbl>
-            <c:dLbl>
-              <c:idx val="22"/>
-              <c:tx>
-                <c:rich>
-                  <a:bodyPr/>
-                  <a:lstStyle/>
-                  <a:p>
-                    <a:fld id="{14951565-D6AB-4EEE-A96A-19C9E31C949B}" type="CELLRANGE">
-                      <a:rPr lang="en-US"/>
-                      <a:pPr/>
-                      <a:t>[CELLRANGE]</a:t>
-                    </a:fld>
-                    <a:endParaRPr lang="en-US"/>
-                  </a:p>
-                </c:rich>
-              </c:tx>
-              <c:dLblPos val="r"/>
-              <c:showLegendKey val="0"/>
-              <c:showVal val="0"/>
-              <c:showCatName val="0"/>
-              <c:showSerName val="0"/>
-              <c:showPercent val="0"/>
-              <c:showBubbleSize val="0"/>
-              <c:extLst>
-                <c:ext xmlns:c15="http://schemas.microsoft.com/office/drawing/2012/chart" uri="{CE6537A1-D6FC-4f65-9D91-7224C49458BB}">
-                  <c15:dlblFieldTable/>
-                  <c15:xForSave val="1"/>
-                  <c15:showDataLabelsRange val="1"/>
-                </c:ext>
-                <c:ext xmlns:c16="http://schemas.microsoft.com/office/drawing/2014/chart" uri="{C3380CC4-5D6E-409C-BE32-E72D297353CC}">
-                  <c16:uniqueId val="{00000016-41A1-450A-8E98-2BC932F38472}"/>
-                </c:ext>
-              </c:extLst>
-            </c:dLbl>
-            <c:dLbl>
-              <c:idx val="23"/>
-              <c:tx>
-                <c:rich>
-                  <a:bodyPr/>
-                  <a:lstStyle/>
-                  <a:p>
-                    <a:fld id="{8F6BFF00-E18E-4E38-970A-FC7BED213DA5}" type="CELLRANGE">
-                      <a:rPr lang="en-US"/>
-                      <a:pPr/>
-                      <a:t>[CELLRANGE]</a:t>
-                    </a:fld>
-                    <a:endParaRPr lang="en-US"/>
-                  </a:p>
-                </c:rich>
-              </c:tx>
-              <c:dLblPos val="r"/>
-              <c:showLegendKey val="0"/>
-              <c:showVal val="0"/>
-              <c:showCatName val="0"/>
-              <c:showSerName val="0"/>
-              <c:showPercent val="0"/>
-              <c:showBubbleSize val="0"/>
-              <c:extLst>
-                <c:ext xmlns:c15="http://schemas.microsoft.com/office/drawing/2012/chart" uri="{CE6537A1-D6FC-4f65-9D91-7224C49458BB}">
-                  <c15:dlblFieldTable/>
-                  <c15:xForSave val="1"/>
-                  <c15:showDataLabelsRange val="1"/>
-                </c:ext>
-                <c:ext xmlns:c16="http://schemas.microsoft.com/office/drawing/2014/chart" uri="{C3380CC4-5D6E-409C-BE32-E72D297353CC}">
-                  <c16:uniqueId val="{00000017-41A1-450A-8E98-2BC932F38472}"/>
-                </c:ext>
-              </c:extLst>
-            </c:dLbl>
-            <c:dLbl>
-              <c:idx val="24"/>
-              <c:tx>
-                <c:rich>
-                  <a:bodyPr/>
-                  <a:lstStyle/>
-                  <a:p>
-                    <a:fld id="{E9C83FD8-268F-4D61-ABC9-08833AB8B121}" type="CELLRANGE">
-                      <a:rPr lang="en-US"/>
-                      <a:pPr/>
-                      <a:t>[CELLRANGE]</a:t>
-                    </a:fld>
-                    <a:endParaRPr lang="en-US"/>
-                  </a:p>
-                </c:rich>
-              </c:tx>
-              <c:dLblPos val="r"/>
-              <c:showLegendKey val="0"/>
-              <c:showVal val="0"/>
-              <c:showCatName val="0"/>
-              <c:showSerName val="0"/>
-              <c:showPercent val="0"/>
-              <c:showBubbleSize val="0"/>
-              <c:extLst>
-                <c:ext xmlns:c15="http://schemas.microsoft.com/office/drawing/2012/chart" uri="{CE6537A1-D6FC-4f65-9D91-7224C49458BB}">
-                  <c15:dlblFieldTable/>
-                  <c15:xForSave val="1"/>
-                  <c15:showDataLabelsRange val="1"/>
-                </c:ext>
-                <c:ext xmlns:c16="http://schemas.microsoft.com/office/drawing/2014/chart" uri="{C3380CC4-5D6E-409C-BE32-E72D297353CC}">
-                  <c16:uniqueId val="{00000018-41A1-450A-8E98-2BC932F38472}"/>
-                </c:ext>
-              </c:extLst>
-            </c:dLbl>
-            <c:dLbl>
-              <c:idx val="25"/>
-              <c:tx>
-                <c:rich>
-                  <a:bodyPr/>
-                  <a:lstStyle/>
-                  <a:p>
-                    <a:fld id="{677C65DF-DCD4-483B-A8BA-B560D7B0FE4C}" type="CELLRANGE">
-                      <a:rPr lang="en-US"/>
-                      <a:pPr/>
-                      <a:t>[CELLRANGE]</a:t>
-                    </a:fld>
-                    <a:endParaRPr lang="en-US"/>
-                  </a:p>
-                </c:rich>
-              </c:tx>
-              <c:dLblPos val="r"/>
-              <c:showLegendKey val="0"/>
-              <c:showVal val="0"/>
-              <c:showCatName val="0"/>
-              <c:showSerName val="0"/>
-              <c:showPercent val="0"/>
-              <c:showBubbleSize val="0"/>
-              <c:extLst>
-                <c:ext xmlns:c15="http://schemas.microsoft.com/office/drawing/2012/chart" uri="{CE6537A1-D6FC-4f65-9D91-7224C49458BB}">
-                  <c15:dlblFieldTable/>
-                  <c15:xForSave val="1"/>
-                  <c15:showDataLabelsRange val="1"/>
-                </c:ext>
-                <c:ext xmlns:c16="http://schemas.microsoft.com/office/drawing/2014/chart" uri="{C3380CC4-5D6E-409C-BE32-E72D297353CC}">
-                  <c16:uniqueId val="{00000019-41A1-450A-8E98-2BC932F38472}"/>
-                </c:ext>
-              </c:extLst>
-            </c:dLbl>
-            <c:dLbl>
-              <c:idx val="26"/>
-              <c:tx>
-                <c:rich>
-                  <a:bodyPr/>
-                  <a:lstStyle/>
-                  <a:p>
-                    <a:fld id="{1E47367E-6677-4C38-9CF1-9153267C2CAB}" type="CELLRANGE">
-                      <a:rPr lang="en-US"/>
-                      <a:pPr/>
-                      <a:t>[CELLRANGE]</a:t>
-                    </a:fld>
-                    <a:endParaRPr lang="en-US"/>
-                  </a:p>
-                </c:rich>
-              </c:tx>
-              <c:dLblPos val="r"/>
-              <c:showLegendKey val="0"/>
-              <c:showVal val="0"/>
-              <c:showCatName val="0"/>
-              <c:showSerName val="0"/>
-              <c:showPercent val="0"/>
-              <c:showBubbleSize val="0"/>
-              <c:extLst>
-                <c:ext xmlns:c15="http://schemas.microsoft.com/office/drawing/2012/chart" uri="{CE6537A1-D6FC-4f65-9D91-7224C49458BB}">
-                  <c15:dlblFieldTable/>
-                  <c15:xForSave val="1"/>
-                  <c15:showDataLabelsRange val="1"/>
-                </c:ext>
-                <c:ext xmlns:c16="http://schemas.microsoft.com/office/drawing/2014/chart" uri="{C3380CC4-5D6E-409C-BE32-E72D297353CC}">
-                  <c16:uniqueId val="{0000001A-41A1-450A-8E98-2BC932F38472}"/>
-                </c:ext>
-              </c:extLst>
-            </c:dLbl>
-            <c:dLbl>
-              <c:idx val="27"/>
-              <c:tx>
-                <c:rich>
-                  <a:bodyPr/>
-                  <a:lstStyle/>
-                  <a:p>
-                    <a:fld id="{BA68B868-97D5-4AEE-AEA3-0EBF4F1E6841}" type="CELLRANGE">
-                      <a:rPr lang="en-US"/>
-                      <a:pPr/>
-                      <a:t>[CELLRANGE]</a:t>
-                    </a:fld>
-                    <a:endParaRPr lang="en-US"/>
-                  </a:p>
-                </c:rich>
-              </c:tx>
-              <c:dLblPos val="r"/>
-              <c:showLegendKey val="0"/>
-              <c:showVal val="0"/>
-              <c:showCatName val="0"/>
-              <c:showSerName val="0"/>
-              <c:showPercent val="0"/>
-              <c:showBubbleSize val="0"/>
-              <c:extLst>
-                <c:ext xmlns:c15="http://schemas.microsoft.com/office/drawing/2012/chart" uri="{CE6537A1-D6FC-4f65-9D91-7224C49458BB}">
-                  <c15:dlblFieldTable/>
-                  <c15:xForSave val="1"/>
-                  <c15:showDataLabelsRange val="1"/>
-                </c:ext>
-                <c:ext xmlns:c16="http://schemas.microsoft.com/office/drawing/2014/chart" uri="{C3380CC4-5D6E-409C-BE32-E72D297353CC}">
-                  <c16:uniqueId val="{0000001B-41A1-450A-8E98-2BC932F38472}"/>
-                </c:ext>
-              </c:extLst>
-            </c:dLbl>
-            <c:dLbl>
-              <c:idx val="28"/>
-              <c:tx>
-                <c:rich>
-                  <a:bodyPr/>
-                  <a:lstStyle/>
-                  <a:p>
-                    <a:fld id="{8E7C3F5F-EBC7-4930-89C9-3E0E4CEF326D}" type="CELLRANGE">
-                      <a:rPr lang="en-US"/>
-                      <a:pPr/>
-                      <a:t>[CELLRANGE]</a:t>
-                    </a:fld>
-                    <a:endParaRPr lang="en-US"/>
-                  </a:p>
-                </c:rich>
-              </c:tx>
-              <c:dLblPos val="r"/>
-              <c:showLegendKey val="0"/>
-              <c:showVal val="0"/>
-              <c:showCatName val="0"/>
-              <c:showSerName val="0"/>
-              <c:showPercent val="0"/>
-              <c:showBubbleSize val="0"/>
-              <c:extLst>
-                <c:ext xmlns:c15="http://schemas.microsoft.com/office/drawing/2012/chart" uri="{CE6537A1-D6FC-4f65-9D91-7224C49458BB}">
-                  <c15:dlblFieldTable/>
-                  <c15:xForSave val="1"/>
-                  <c15:showDataLabelsRange val="1"/>
-                </c:ext>
-                <c:ext xmlns:c16="http://schemas.microsoft.com/office/drawing/2014/chart" uri="{C3380CC4-5D6E-409C-BE32-E72D297353CC}">
-                  <c16:uniqueId val="{0000001C-41A1-450A-8E98-2BC932F38472}"/>
-                </c:ext>
-              </c:extLst>
-            </c:dLbl>
-            <c:dLbl>
-              <c:idx val="29"/>
-              <c:tx>
-                <c:rich>
-                  <a:bodyPr/>
-                  <a:lstStyle/>
-                  <a:p>
-                    <a:fld id="{B1956448-1A36-4587-91A5-B2E64687FB2C}" type="CELLRANGE">
-                      <a:rPr lang="en-US"/>
-                      <a:pPr/>
-                      <a:t>[CELLRANGE]</a:t>
-                    </a:fld>
-                    <a:endParaRPr lang="en-US"/>
-                  </a:p>
-                </c:rich>
-              </c:tx>
-              <c:dLblPos val="r"/>
-              <c:showLegendKey val="0"/>
-              <c:showVal val="0"/>
-              <c:showCatName val="0"/>
-              <c:showSerName val="0"/>
-              <c:showPercent val="0"/>
-              <c:showBubbleSize val="0"/>
-              <c:extLst>
-                <c:ext xmlns:c15="http://schemas.microsoft.com/office/drawing/2012/chart" uri="{CE6537A1-D6FC-4f65-9D91-7224C49458BB}">
-                  <c15:dlblFieldTable/>
-                  <c15:xForSave val="1"/>
-                  <c15:showDataLabelsRange val="1"/>
-                </c:ext>
-                <c:ext xmlns:c16="http://schemas.microsoft.com/office/drawing/2014/chart" uri="{C3380CC4-5D6E-409C-BE32-E72D297353CC}">
-                  <c16:uniqueId val="{0000001D-41A1-450A-8E98-2BC932F38472}"/>
-                </c:ext>
-              </c:extLst>
-            </c:dLbl>
-            <c:dLbl>
-              <c:idx val="30"/>
-              <c:tx>
-                <c:rich>
-                  <a:bodyPr/>
-                  <a:lstStyle/>
-                  <a:p>
-                    <a:fld id="{B2EA6A63-3EF5-47C5-B069-981854D6BE4F}" type="CELLRANGE">
-                      <a:rPr lang="en-US"/>
-                      <a:pPr/>
-                      <a:t>[CELLRANGE]</a:t>
-                    </a:fld>
-                    <a:endParaRPr lang="en-US"/>
-                  </a:p>
-                </c:rich>
-              </c:tx>
-              <c:dLblPos val="r"/>
-              <c:showLegendKey val="0"/>
-              <c:showVal val="0"/>
-              <c:showCatName val="0"/>
-              <c:showSerName val="0"/>
-              <c:showPercent val="0"/>
-              <c:showBubbleSize val="0"/>
-              <c:extLst>
-                <c:ext xmlns:c15="http://schemas.microsoft.com/office/drawing/2012/chart" uri="{CE6537A1-D6FC-4f65-9D91-7224C49458BB}">
-                  <c15:dlblFieldTable/>
-                  <c15:xForSave val="1"/>
-                  <c15:showDataLabelsRange val="1"/>
-                </c:ext>
-                <c:ext xmlns:c16="http://schemas.microsoft.com/office/drawing/2014/chart" uri="{C3380CC4-5D6E-409C-BE32-E72D297353CC}">
-                  <c16:uniqueId val="{0000001E-41A1-450A-8E98-2BC932F38472}"/>
-                </c:ext>
-              </c:extLst>
-            </c:dLbl>
-            <c:dLbl>
-              <c:idx val="31"/>
-              <c:tx>
-                <c:rich>
-                  <a:bodyPr/>
-                  <a:lstStyle/>
-                  <a:p>
-                    <a:fld id="{D9888201-7F48-417E-8087-A62B520F0DF9}" type="CELLRANGE">
-                      <a:rPr lang="en-US"/>
-                      <a:pPr/>
-                      <a:t>[CELLRANGE]</a:t>
-                    </a:fld>
-                    <a:endParaRPr lang="en-US"/>
-                  </a:p>
-                </c:rich>
-              </c:tx>
-              <c:dLblPos val="r"/>
-              <c:showLegendKey val="0"/>
-              <c:showVal val="0"/>
-              <c:showCatName val="0"/>
-              <c:showSerName val="0"/>
-              <c:showPercent val="0"/>
-              <c:showBubbleSize val="0"/>
-              <c:extLst>
-                <c:ext xmlns:c15="http://schemas.microsoft.com/office/drawing/2012/chart" uri="{CE6537A1-D6FC-4f65-9D91-7224C49458BB}">
-                  <c15:dlblFieldTable/>
-                  <c15:xForSave val="1"/>
-                  <c15:showDataLabelsRange val="1"/>
-                </c:ext>
-                <c:ext xmlns:c16="http://schemas.microsoft.com/office/drawing/2014/chart" uri="{C3380CC4-5D6E-409C-BE32-E72D297353CC}">
-                  <c16:uniqueId val="{0000001F-41A1-450A-8E98-2BC932F38472}"/>
-                </c:ext>
-              </c:extLst>
-            </c:dLbl>
-            <c:dLbl>
-              <c:idx val="32"/>
-              <c:tx>
-                <c:rich>
-                  <a:bodyPr/>
-                  <a:lstStyle/>
-                  <a:p>
-                    <a:fld id="{B7901D5F-102A-4BA4-AE2F-4ED9C6C3C319}" type="CELLRANGE">
-                      <a:rPr lang="en-US"/>
-                      <a:pPr/>
-                      <a:t>[CELLRANGE]</a:t>
-                    </a:fld>
-                    <a:endParaRPr lang="en-US"/>
-                  </a:p>
-                </c:rich>
-              </c:tx>
-              <c:dLblPos val="r"/>
-              <c:showLegendKey val="0"/>
-              <c:showVal val="0"/>
-              <c:showCatName val="0"/>
-              <c:showSerName val="0"/>
-              <c:showPercent val="0"/>
-              <c:showBubbleSize val="0"/>
-              <c:extLst>
-                <c:ext xmlns:c15="http://schemas.microsoft.com/office/drawing/2012/chart" uri="{CE6537A1-D6FC-4f65-9D91-7224C49458BB}">
-                  <c15:dlblFieldTable/>
-                  <c15:xForSave val="1"/>
-                  <c15:showDataLabelsRange val="1"/>
-                </c:ext>
-                <c:ext xmlns:c16="http://schemas.microsoft.com/office/drawing/2014/chart" uri="{C3380CC4-5D6E-409C-BE32-E72D297353CC}">
-                  <c16:uniqueId val="{00000020-41A1-450A-8E98-2BC932F38472}"/>
-                </c:ext>
-              </c:extLst>
-            </c:dLbl>
-            <c:dLbl>
-              <c:idx val="33"/>
-              <c:tx>
-                <c:rich>
-                  <a:bodyPr/>
-                  <a:lstStyle/>
-                  <a:p>
-                    <a:fld id="{19B9C2DF-ABE5-494E-9690-8B19FBCD96A3}" type="CELLRANGE">
-                      <a:rPr lang="en-US"/>
-                      <a:pPr/>
-                      <a:t>[CELLRANGE]</a:t>
-                    </a:fld>
-                    <a:endParaRPr lang="en-US"/>
-                  </a:p>
-                </c:rich>
-              </c:tx>
-              <c:dLblPos val="r"/>
-              <c:showLegendKey val="0"/>
-              <c:showVal val="0"/>
-              <c:showCatName val="0"/>
-              <c:showSerName val="0"/>
-              <c:showPercent val="0"/>
-              <c:showBubbleSize val="0"/>
-              <c:extLst>
-                <c:ext xmlns:c15="http://schemas.microsoft.com/office/drawing/2012/chart" uri="{CE6537A1-D6FC-4f65-9D91-7224C49458BB}">
-                  <c15:dlblFieldTable/>
-                  <c15:xForSave val="1"/>
-                  <c15:showDataLabelsRange val="1"/>
-                </c:ext>
-                <c:ext xmlns:c16="http://schemas.microsoft.com/office/drawing/2014/chart" uri="{C3380CC4-5D6E-409C-BE32-E72D297353CC}">
-                  <c16:uniqueId val="{00000021-41A1-450A-8E98-2BC932F38472}"/>
-                </c:ext>
-              </c:extLst>
-            </c:dLbl>
-            <c:dLbl>
-              <c:idx val="34"/>
-              <c:tx>
-                <c:rich>
-                  <a:bodyPr/>
-                  <a:lstStyle/>
-                  <a:p>
-                    <a:fld id="{21496302-FC26-4F18-BE3B-2905BE365938}" type="CELLRANGE">
-                      <a:rPr lang="en-US"/>
-                      <a:pPr/>
-                      <a:t>[CELLRANGE]</a:t>
-                    </a:fld>
-                    <a:endParaRPr lang="en-US"/>
-                  </a:p>
-                </c:rich>
-              </c:tx>
-              <c:dLblPos val="r"/>
-              <c:showLegendKey val="0"/>
-              <c:showVal val="0"/>
-              <c:showCatName val="0"/>
-              <c:showSerName val="0"/>
-              <c:showPercent val="0"/>
-              <c:showBubbleSize val="0"/>
-              <c:extLst>
-                <c:ext xmlns:c15="http://schemas.microsoft.com/office/drawing/2012/chart" uri="{CE6537A1-D6FC-4f65-9D91-7224C49458BB}">
-                  <c15:dlblFieldTable/>
-                  <c15:xForSave val="1"/>
-                  <c15:showDataLabelsRange val="1"/>
-                </c:ext>
-                <c:ext xmlns:c16="http://schemas.microsoft.com/office/drawing/2014/chart" uri="{C3380CC4-5D6E-409C-BE32-E72D297353CC}">
-                  <c16:uniqueId val="{00000022-41A1-450A-8E98-2BC932F38472}"/>
-                </c:ext>
-              </c:extLst>
-            </c:dLbl>
-            <c:dLbl>
-              <c:idx val="35"/>
-              <c:tx>
-                <c:rich>
-                  <a:bodyPr/>
-                  <a:lstStyle/>
-                  <a:p>
-                    <a:fld id="{F29BC5D8-7075-45F2-9D79-7FAE4B0A0F7F}" type="CELLRANGE">
-                      <a:rPr lang="en-US"/>
-                      <a:pPr/>
-                      <a:t>[CELLRANGE]</a:t>
-                    </a:fld>
-                    <a:endParaRPr lang="en-US"/>
-                  </a:p>
-                </c:rich>
-              </c:tx>
-              <c:dLblPos val="r"/>
-              <c:showLegendKey val="0"/>
-              <c:showVal val="0"/>
-              <c:showCatName val="0"/>
-              <c:showSerName val="0"/>
-              <c:showPercent val="0"/>
-              <c:showBubbleSize val="0"/>
-              <c:extLst>
-                <c:ext xmlns:c15="http://schemas.microsoft.com/office/drawing/2012/chart" uri="{CE6537A1-D6FC-4f65-9D91-7224C49458BB}">
-                  <c15:dlblFieldTable/>
-                  <c15:xForSave val="1"/>
-                  <c15:showDataLabelsRange val="1"/>
-                </c:ext>
-                <c:ext xmlns:c16="http://schemas.microsoft.com/office/drawing/2014/chart" uri="{C3380CC4-5D6E-409C-BE32-E72D297353CC}">
-                  <c16:uniqueId val="{00000023-41A1-450A-8E98-2BC932F38472}"/>
-                </c:ext>
-              </c:extLst>
-            </c:dLbl>
-            <c:dLbl>
-              <c:idx val="36"/>
-              <c:tx>
-                <c:rich>
-                  <a:bodyPr/>
-                  <a:lstStyle/>
-                  <a:p>
-                    <a:fld id="{F0FCDB62-2857-428C-B765-2792DD9F96B5}" type="CELLRANGE">
-                      <a:rPr lang="en-US"/>
-                      <a:pPr/>
-                      <a:t>[CELLRANGE]</a:t>
-                    </a:fld>
-                    <a:endParaRPr lang="en-US"/>
-                  </a:p>
-                </c:rich>
-              </c:tx>
-              <c:dLblPos val="r"/>
-              <c:showLegendKey val="0"/>
-              <c:showVal val="0"/>
-              <c:showCatName val="0"/>
-              <c:showSerName val="0"/>
-              <c:showPercent val="0"/>
-              <c:showBubbleSize val="0"/>
-              <c:extLst>
-                <c:ext xmlns:c15="http://schemas.microsoft.com/office/drawing/2012/chart" uri="{CE6537A1-D6FC-4f65-9D91-7224C49458BB}">
-                  <c15:dlblFieldTable/>
-                  <c15:xForSave val="1"/>
-                  <c15:showDataLabelsRange val="1"/>
-                </c:ext>
-                <c:ext xmlns:c16="http://schemas.microsoft.com/office/drawing/2014/chart" uri="{C3380CC4-5D6E-409C-BE32-E72D297353CC}">
-                  <c16:uniqueId val="{00000024-41A1-450A-8E98-2BC932F38472}"/>
-                </c:ext>
-              </c:extLst>
-            </c:dLbl>
-            <c:dLbl>
-              <c:idx val="37"/>
-              <c:tx>
-                <c:rich>
-                  <a:bodyPr/>
-                  <a:lstStyle/>
-                  <a:p>
-                    <a:fld id="{578731A4-87A5-4741-A4E1-55D9750E39A4}" type="CELLRANGE">
-                      <a:rPr lang="en-US"/>
-                      <a:pPr/>
-                      <a:t>[CELLRANGE]</a:t>
-                    </a:fld>
-                    <a:endParaRPr lang="en-US"/>
-                  </a:p>
-                </c:rich>
-              </c:tx>
-              <c:dLblPos val="r"/>
-              <c:showLegendKey val="0"/>
-              <c:showVal val="0"/>
-              <c:showCatName val="0"/>
-              <c:showSerName val="0"/>
-              <c:showPercent val="0"/>
-              <c:showBubbleSize val="0"/>
-              <c:extLst>
-                <c:ext xmlns:c15="http://schemas.microsoft.com/office/drawing/2012/chart" uri="{CE6537A1-D6FC-4f65-9D91-7224C49458BB}">
-                  <c15:dlblFieldTable/>
-                  <c15:xForSave val="1"/>
-                  <c15:showDataLabelsRange val="1"/>
-                </c:ext>
-                <c:ext xmlns:c16="http://schemas.microsoft.com/office/drawing/2014/chart" uri="{C3380CC4-5D6E-409C-BE32-E72D297353CC}">
-                  <c16:uniqueId val="{00000025-41A1-450A-8E98-2BC932F38472}"/>
-                </c:ext>
-              </c:extLst>
-            </c:dLbl>
-            <c:dLbl>
-              <c:idx val="38"/>
-              <c:tx>
-                <c:rich>
-                  <a:bodyPr/>
-                  <a:lstStyle/>
-                  <a:p>
-                    <a:fld id="{B96F25FE-5539-4134-AD9F-C1C9746F5BC2}" type="CELLRANGE">
-                      <a:rPr lang="en-US"/>
-                      <a:pPr/>
-                      <a:t>[CELLRANGE]</a:t>
-                    </a:fld>
-                    <a:endParaRPr lang="en-US"/>
-                  </a:p>
-                </c:rich>
-              </c:tx>
-              <c:dLblPos val="r"/>
-              <c:showLegendKey val="0"/>
-              <c:showVal val="0"/>
-              <c:showCatName val="0"/>
-              <c:showSerName val="0"/>
-              <c:showPercent val="0"/>
-              <c:showBubbleSize val="0"/>
-              <c:extLst>
-                <c:ext xmlns:c15="http://schemas.microsoft.com/office/drawing/2012/chart" uri="{CE6537A1-D6FC-4f65-9D91-7224C49458BB}">
-                  <c15:dlblFieldTable/>
-                  <c15:xForSave val="1"/>
-                  <c15:showDataLabelsRange val="1"/>
-                </c:ext>
-                <c:ext xmlns:c16="http://schemas.microsoft.com/office/drawing/2014/chart" uri="{C3380CC4-5D6E-409C-BE32-E72D297353CC}">
-                  <c16:uniqueId val="{00000026-41A1-450A-8E98-2BC932F38472}"/>
-                </c:ext>
-              </c:extLst>
-            </c:dLbl>
-            <c:dLbl>
-              <c:idx val="39"/>
-              <c:tx>
-                <c:rich>
-                  <a:bodyPr/>
-                  <a:lstStyle/>
-                  <a:p>
-                    <a:fld id="{B45CBD68-CC70-49DF-9758-2F7F6BA327AC}" type="CELLRANGE">
-                      <a:rPr lang="en-US"/>
-                      <a:pPr/>
-                      <a:t>[CELLRANGE]</a:t>
-                    </a:fld>
-                    <a:endParaRPr lang="en-US"/>
-                  </a:p>
-                </c:rich>
-              </c:tx>
-              <c:dLblPos val="r"/>
-              <c:showLegendKey val="0"/>
-              <c:showVal val="0"/>
-              <c:showCatName val="0"/>
-              <c:showSerName val="0"/>
-              <c:showPercent val="0"/>
-              <c:showBubbleSize val="0"/>
-              <c:extLst>
-                <c:ext xmlns:c15="http://schemas.microsoft.com/office/drawing/2012/chart" uri="{CE6537A1-D6FC-4f65-9D91-7224C49458BB}">
-                  <c15:dlblFieldTable/>
-                  <c15:xForSave val="1"/>
-                  <c15:showDataLabelsRange val="1"/>
-                </c:ext>
-                <c:ext xmlns:c16="http://schemas.microsoft.com/office/drawing/2014/chart" uri="{C3380CC4-5D6E-409C-BE32-E72D297353CC}">
-                  <c16:uniqueId val="{00000027-41A1-450A-8E98-2BC932F38472}"/>
-                </c:ext>
-              </c:extLst>
-            </c:dLbl>
-            <c:dLbl>
-              <c:idx val="40"/>
-              <c:tx>
-                <c:rich>
-                  <a:bodyPr/>
-                  <a:lstStyle/>
-                  <a:p>
-                    <a:fld id="{A4F99A87-2521-4E1A-8A39-B57A1D96A644}" type="CELLRANGE">
-                      <a:rPr lang="en-US"/>
-                      <a:pPr/>
-                      <a:t>[CELLRANGE]</a:t>
-                    </a:fld>
-                    <a:endParaRPr lang="en-US"/>
-                  </a:p>
-                </c:rich>
-              </c:tx>
-              <c:dLblPos val="r"/>
-              <c:showLegendKey val="0"/>
-              <c:showVal val="0"/>
-              <c:showCatName val="0"/>
-              <c:showSerName val="0"/>
-              <c:showPercent val="0"/>
-              <c:showBubbleSize val="0"/>
-              <c:extLst>
-                <c:ext xmlns:c15="http://schemas.microsoft.com/office/drawing/2012/chart" uri="{CE6537A1-D6FC-4f65-9D91-7224C49458BB}">
-                  <c15:dlblFieldTable/>
-                  <c15:xForSave val="1"/>
-                  <c15:showDataLabelsRange val="1"/>
-                </c:ext>
-                <c:ext xmlns:c16="http://schemas.microsoft.com/office/drawing/2014/chart" uri="{C3380CC4-5D6E-409C-BE32-E72D297353CC}">
-                  <c16:uniqueId val="{00000028-41A1-450A-8E98-2BC932F38472}"/>
-                </c:ext>
-              </c:extLst>
-            </c:dLbl>
-            <c:dLbl>
-              <c:idx val="41"/>
-              <c:tx>
-                <c:rich>
-                  <a:bodyPr/>
-                  <a:lstStyle/>
-                  <a:p>
-                    <a:fld id="{2BE7F44C-E533-4AD6-95DA-E45CFCE67AF8}" type="CELLRANGE">
-                      <a:rPr lang="en-US"/>
-                      <a:pPr/>
-                      <a:t>[CELLRANGE]</a:t>
-                    </a:fld>
-                    <a:endParaRPr lang="en-US"/>
-                  </a:p>
-                </c:rich>
-              </c:tx>
-              <c:dLblPos val="r"/>
-              <c:showLegendKey val="0"/>
-              <c:showVal val="0"/>
-              <c:showCatName val="0"/>
-              <c:showSerName val="0"/>
-              <c:showPercent val="0"/>
-              <c:showBubbleSize val="0"/>
-              <c:extLst>
-                <c:ext xmlns:c15="http://schemas.microsoft.com/office/drawing/2012/chart" uri="{CE6537A1-D6FC-4f65-9D91-7224C49458BB}">
-                  <c15:dlblFieldTable/>
-                  <c15:xForSave val="1"/>
-                  <c15:showDataLabelsRange val="1"/>
-                </c:ext>
-                <c:ext xmlns:c16="http://schemas.microsoft.com/office/drawing/2014/chart" uri="{C3380CC4-5D6E-409C-BE32-E72D297353CC}">
-                  <c16:uniqueId val="{00000029-41A1-450A-8E98-2BC932F38472}"/>
-                </c:ext>
-              </c:extLst>
-            </c:dLbl>
-            <c:dLbl>
-              <c:idx val="42"/>
-              <c:tx>
-                <c:rich>
-                  <a:bodyPr/>
-                  <a:lstStyle/>
-                  <a:p>
-                    <a:fld id="{B2FB3F20-6106-4861-86F8-DB7843EF1C52}" type="CELLRANGE">
-                      <a:rPr lang="en-US"/>
-                      <a:pPr/>
-                      <a:t>[CELLRANGE]</a:t>
-                    </a:fld>
-                    <a:endParaRPr lang="en-US"/>
-                  </a:p>
-                </c:rich>
-              </c:tx>
-              <c:dLblPos val="r"/>
-              <c:showLegendKey val="0"/>
-              <c:showVal val="0"/>
-              <c:showCatName val="0"/>
-              <c:showSerName val="0"/>
-              <c:showPercent val="0"/>
-              <c:showBubbleSize val="0"/>
-              <c:extLst>
-                <c:ext xmlns:c15="http://schemas.microsoft.com/office/drawing/2012/chart" uri="{CE6537A1-D6FC-4f65-9D91-7224C49458BB}">
-                  <c15:dlblFieldTable/>
-                  <c15:xForSave val="1"/>
-                  <c15:showDataLabelsRange val="1"/>
-                </c:ext>
-                <c:ext xmlns:c16="http://schemas.microsoft.com/office/drawing/2014/chart" uri="{C3380CC4-5D6E-409C-BE32-E72D297353CC}">
-                  <c16:uniqueId val="{0000002A-41A1-450A-8E98-2BC932F38472}"/>
-                </c:ext>
-              </c:extLst>
-            </c:dLbl>
-            <c:dLbl>
-              <c:idx val="43"/>
-              <c:tx>
-                <c:rich>
-                  <a:bodyPr/>
-                  <a:lstStyle/>
-                  <a:p>
-                    <a:fld id="{F72811CD-4AD2-40A7-B1AE-65C3E3A06DA8}" type="CELLRANGE">
-                      <a:rPr lang="en-US"/>
-                      <a:pPr/>
-                      <a:t>[CELLRANGE]</a:t>
-                    </a:fld>
-                    <a:endParaRPr lang="en-US"/>
-                  </a:p>
-                </c:rich>
-              </c:tx>
-              <c:dLblPos val="r"/>
-              <c:showLegendKey val="0"/>
-              <c:showVal val="0"/>
-              <c:showCatName val="0"/>
-              <c:showSerName val="0"/>
-              <c:showPercent val="0"/>
-              <c:showBubbleSize val="0"/>
-              <c:extLst>
-                <c:ext xmlns:c15="http://schemas.microsoft.com/office/drawing/2012/chart" uri="{CE6537A1-D6FC-4f65-9D91-7224C49458BB}">
-                  <c15:dlblFieldTable/>
-                  <c15:xForSave val="1"/>
-                  <c15:showDataLabelsRange val="1"/>
-                </c:ext>
-                <c:ext xmlns:c16="http://schemas.microsoft.com/office/drawing/2014/chart" uri="{C3380CC4-5D6E-409C-BE32-E72D297353CC}">
-                  <c16:uniqueId val="{0000002B-41A1-450A-8E98-2BC932F38472}"/>
-                </c:ext>
-              </c:extLst>
-            </c:dLbl>
-            <c:dLbl>
-              <c:idx val="44"/>
-              <c:tx>
-                <c:rich>
-                  <a:bodyPr/>
-                  <a:lstStyle/>
-                  <a:p>
-                    <a:fld id="{0DAE6B96-7BC8-433F-8CE0-EE8437899700}" type="CELLRANGE">
-                      <a:rPr lang="en-US"/>
-                      <a:pPr/>
-                      <a:t>[CELLRANGE]</a:t>
-                    </a:fld>
-                    <a:endParaRPr lang="en-US"/>
-                  </a:p>
-                </c:rich>
-              </c:tx>
-              <c:dLblPos val="r"/>
-              <c:showLegendKey val="0"/>
-              <c:showVal val="0"/>
-              <c:showCatName val="0"/>
-              <c:showSerName val="0"/>
-              <c:showPercent val="0"/>
-              <c:showBubbleSize val="0"/>
-              <c:extLst>
-                <c:ext xmlns:c15="http://schemas.microsoft.com/office/drawing/2012/chart" uri="{CE6537A1-D6FC-4f65-9D91-7224C49458BB}">
-                  <c15:dlblFieldTable/>
-                  <c15:xForSave val="1"/>
-                  <c15:showDataLabelsRange val="1"/>
-                </c:ext>
-                <c:ext xmlns:c16="http://schemas.microsoft.com/office/drawing/2014/chart" uri="{C3380CC4-5D6E-409C-BE32-E72D297353CC}">
-                  <c16:uniqueId val="{0000002C-41A1-450A-8E98-2BC932F38472}"/>
-                </c:ext>
-              </c:extLst>
-            </c:dLbl>
-            <c:dLbl>
-              <c:idx val="45"/>
-              <c:tx>
-                <c:rich>
-                  <a:bodyPr/>
-                  <a:lstStyle/>
-                  <a:p>
-                    <a:fld id="{20DB886D-CCCA-4B4A-B89E-89786B468169}" type="CELLRANGE">
-                      <a:rPr lang="en-US"/>
-                      <a:pPr/>
-                      <a:t>[CELLRANGE]</a:t>
-                    </a:fld>
-                    <a:endParaRPr lang="en-US"/>
-                  </a:p>
-                </c:rich>
-              </c:tx>
-              <c:dLblPos val="r"/>
-              <c:showLegendKey val="0"/>
-              <c:showVal val="0"/>
-              <c:showCatName val="0"/>
-              <c:showSerName val="0"/>
-              <c:showPercent val="0"/>
-              <c:showBubbleSize val="0"/>
-              <c:extLst>
-                <c:ext xmlns:c15="http://schemas.microsoft.com/office/drawing/2012/chart" uri="{CE6537A1-D6FC-4f65-9D91-7224C49458BB}">
-                  <c15:dlblFieldTable/>
-                  <c15:xForSave val="1"/>
-                  <c15:showDataLabelsRange val="1"/>
-                </c:ext>
-                <c:ext xmlns:c16="http://schemas.microsoft.com/office/drawing/2014/chart" uri="{C3380CC4-5D6E-409C-BE32-E72D297353CC}">
-                  <c16:uniqueId val="{0000002D-41A1-450A-8E98-2BC932F38472}"/>
-                </c:ext>
-              </c:extLst>
-            </c:dLbl>
-            <c:dLbl>
-              <c:idx val="46"/>
-              <c:tx>
-                <c:rich>
-                  <a:bodyPr/>
-                  <a:lstStyle/>
-                  <a:p>
-                    <a:fld id="{77CF2081-E365-4D9B-A8F1-2FE86A71CDF4}" type="CELLRANGE">
-                      <a:rPr lang="en-US"/>
-                      <a:pPr/>
-                      <a:t>[CELLRANGE]</a:t>
-                    </a:fld>
-                    <a:endParaRPr lang="en-US"/>
-                  </a:p>
-                </c:rich>
-              </c:tx>
-              <c:dLblPos val="r"/>
-              <c:showLegendKey val="0"/>
-              <c:showVal val="0"/>
-              <c:showCatName val="0"/>
-              <c:showSerName val="0"/>
-              <c:showPercent val="0"/>
-              <c:showBubbleSize val="0"/>
-              <c:extLst>
-                <c:ext xmlns:c15="http://schemas.microsoft.com/office/drawing/2012/chart" uri="{CE6537A1-D6FC-4f65-9D91-7224C49458BB}">
-                  <c15:dlblFieldTable/>
-                  <c15:xForSave val="1"/>
-                  <c15:showDataLabelsRange val="1"/>
-                </c:ext>
-                <c:ext xmlns:c16="http://schemas.microsoft.com/office/drawing/2014/chart" uri="{C3380CC4-5D6E-409C-BE32-E72D297353CC}">
-                  <c16:uniqueId val="{0000002E-41A1-450A-8E98-2BC932F38472}"/>
-                </c:ext>
-              </c:extLst>
-            </c:dLbl>
-            <c:dLbl>
-              <c:idx val="47"/>
-              <c:tx>
-                <c:rich>
-                  <a:bodyPr/>
-                  <a:lstStyle/>
-                  <a:p>
-                    <a:fld id="{78A34FCE-474B-495A-BE74-1355DDCE9B54}" type="CELLRANGE">
-                      <a:rPr lang="en-US"/>
-                      <a:pPr/>
-                      <a:t>[CELLRANGE]</a:t>
-                    </a:fld>
-                    <a:endParaRPr lang="en-US"/>
-                  </a:p>
-                </c:rich>
-              </c:tx>
-              <c:dLblPos val="r"/>
-              <c:showLegendKey val="0"/>
-              <c:showVal val="0"/>
-              <c:showCatName val="0"/>
-              <c:showSerName val="0"/>
-              <c:showPercent val="0"/>
-              <c:showBubbleSize val="0"/>
-              <c:extLst>
-                <c:ext xmlns:c15="http://schemas.microsoft.com/office/drawing/2012/chart" uri="{CE6537A1-D6FC-4f65-9D91-7224C49458BB}">
-                  <c15:dlblFieldTable/>
-                  <c15:xForSave val="1"/>
-                  <c15:showDataLabelsRange val="1"/>
-                </c:ext>
-                <c:ext xmlns:c16="http://schemas.microsoft.com/office/drawing/2014/chart" uri="{C3380CC4-5D6E-409C-BE32-E72D297353CC}">
-                  <c16:uniqueId val="{0000002F-41A1-450A-8E98-2BC932F38472}"/>
-                </c:ext>
-              </c:extLst>
-            </c:dLbl>
-            <c:dLbl>
-              <c:idx val="48"/>
-              <c:tx>
-                <c:rich>
-                  <a:bodyPr/>
-                  <a:lstStyle/>
-                  <a:p>
-                    <a:fld id="{89A3DBE5-491F-4E1D-9512-E40E85A43E7E}" type="CELLRANGE">
-                      <a:rPr lang="en-US"/>
-                      <a:pPr/>
-                      <a:t>[CELLRANGE]</a:t>
-                    </a:fld>
-                    <a:endParaRPr lang="en-US"/>
-                  </a:p>
-                </c:rich>
-              </c:tx>
-              <c:dLblPos val="r"/>
-              <c:showLegendKey val="0"/>
-              <c:showVal val="0"/>
-              <c:showCatName val="0"/>
-              <c:showSerName val="0"/>
-              <c:showPercent val="0"/>
-              <c:showBubbleSize val="0"/>
-              <c:extLst>
-                <c:ext xmlns:c15="http://schemas.microsoft.com/office/drawing/2012/chart" uri="{CE6537A1-D6FC-4f65-9D91-7224C49458BB}">
-                  <c15:dlblFieldTable/>
-                  <c15:xForSave val="1"/>
-                  <c15:showDataLabelsRange val="1"/>
-                </c:ext>
-                <c:ext xmlns:c16="http://schemas.microsoft.com/office/drawing/2014/chart" uri="{C3380CC4-5D6E-409C-BE32-E72D297353CC}">
-                  <c16:uniqueId val="{00000030-41A1-450A-8E98-2BC932F38472}"/>
-                </c:ext>
-              </c:extLst>
-            </c:dLbl>
-            <c:dLbl>
-              <c:idx val="49"/>
-              <c:tx>
-                <c:rich>
-                  <a:bodyPr/>
-                  <a:lstStyle/>
-                  <a:p>
-                    <a:fld id="{EB304BAF-5508-4B37-86D3-4D54FD4E06E5}" type="CELLRANGE">
-                      <a:rPr lang="en-US"/>
-                      <a:pPr/>
-                      <a:t>[CELLRANGE]</a:t>
-                    </a:fld>
-                    <a:endParaRPr lang="en-US"/>
-                  </a:p>
-                </c:rich>
-              </c:tx>
-              <c:dLblPos val="r"/>
-              <c:showLegendKey val="0"/>
-              <c:showVal val="0"/>
-              <c:showCatName val="0"/>
-              <c:showSerName val="0"/>
-              <c:showPercent val="0"/>
-              <c:showBubbleSize val="0"/>
-              <c:extLst>
-                <c:ext xmlns:c15="http://schemas.microsoft.com/office/drawing/2012/chart" uri="{CE6537A1-D6FC-4f65-9D91-7224C49458BB}">
-                  <c15:dlblFieldTable/>
-                  <c15:xForSave val="1"/>
-                  <c15:showDataLabelsRange val="1"/>
-                </c:ext>
-                <c:ext xmlns:c16="http://schemas.microsoft.com/office/drawing/2014/chart" uri="{C3380CC4-5D6E-409C-BE32-E72D297353CC}">
-                  <c16:uniqueId val="{00000031-41A1-450A-8E98-2BC932F38472}"/>
-                </c:ext>
-              </c:extLst>
-            </c:dLbl>
-            <c:dLbl>
-              <c:idx val="50"/>
-              <c:tx>
-                <c:rich>
-                  <a:bodyPr/>
-                  <a:lstStyle/>
-                  <a:p>
-                    <a:fld id="{D665C51C-9CC5-4319-9588-CA6792DC3AC7}" type="CELLRANGE">
-                      <a:rPr lang="en-US"/>
-                      <a:pPr/>
-                      <a:t>[CELLRANGE]</a:t>
-                    </a:fld>
-                    <a:endParaRPr lang="en-US"/>
-                  </a:p>
-                </c:rich>
-              </c:tx>
-              <c:dLblPos val="r"/>
-              <c:showLegendKey val="0"/>
-              <c:showVal val="0"/>
-              <c:showCatName val="0"/>
-              <c:showSerName val="0"/>
-              <c:showPercent val="0"/>
-              <c:showBubbleSize val="0"/>
-              <c:extLst>
-                <c:ext xmlns:c15="http://schemas.microsoft.com/office/drawing/2012/chart" uri="{CE6537A1-D6FC-4f65-9D91-7224C49458BB}">
-                  <c15:dlblFieldTable/>
-                  <c15:xForSave val="1"/>
-                  <c15:showDataLabelsRange val="1"/>
-                </c:ext>
-                <c:ext xmlns:c16="http://schemas.microsoft.com/office/drawing/2014/chart" uri="{C3380CC4-5D6E-409C-BE32-E72D297353CC}">
-                  <c16:uniqueId val="{00000032-41A1-450A-8E98-2BC932F38472}"/>
-                </c:ext>
-              </c:extLst>
-            </c:dLbl>
-            <c:dLbl>
-              <c:idx val="51"/>
-              <c:tx>
-                <c:rich>
-                  <a:bodyPr/>
-                  <a:lstStyle/>
-                  <a:p>
-                    <a:fld id="{EA313F19-E29B-486E-A436-73A6BCD8045A}" type="CELLRANGE">
-                      <a:rPr lang="en-US"/>
-                      <a:pPr/>
-                      <a:t>[CELLRANGE]</a:t>
-                    </a:fld>
-                    <a:endParaRPr lang="en-US"/>
-                  </a:p>
-                </c:rich>
-              </c:tx>
-              <c:dLblPos val="r"/>
-              <c:showLegendKey val="0"/>
-              <c:showVal val="0"/>
-              <c:showCatName val="0"/>
-              <c:showSerName val="0"/>
-              <c:showPercent val="0"/>
-              <c:showBubbleSize val="0"/>
-              <c:extLst>
-                <c:ext xmlns:c15="http://schemas.microsoft.com/office/drawing/2012/chart" uri="{CE6537A1-D6FC-4f65-9D91-7224C49458BB}">
-                  <c15:dlblFieldTable/>
-                  <c15:xForSave val="1"/>
-                  <c15:showDataLabelsRange val="1"/>
-                </c:ext>
-                <c:ext xmlns:c16="http://schemas.microsoft.com/office/drawing/2014/chart" uri="{C3380CC4-5D6E-409C-BE32-E72D297353CC}">
-                  <c16:uniqueId val="{00000033-41A1-450A-8E98-2BC932F38472}"/>
-                </c:ext>
-              </c:extLst>
-            </c:dLbl>
-            <c:dLbl>
-              <c:idx val="52"/>
-              <c:tx>
-                <c:rich>
-                  <a:bodyPr/>
-                  <a:lstStyle/>
-                  <a:p>
-                    <a:fld id="{45ED63FF-709C-4EA8-83E3-2A1917AFE55C}" type="CELLRANGE">
-                      <a:rPr lang="en-US"/>
-                      <a:pPr/>
-                      <a:t>[CELLRANGE]</a:t>
-                    </a:fld>
-                    <a:endParaRPr lang="en-US"/>
-                  </a:p>
-                </c:rich>
-              </c:tx>
-              <c:dLblPos val="r"/>
-              <c:showLegendKey val="0"/>
-              <c:showVal val="0"/>
-              <c:showCatName val="0"/>
-              <c:showSerName val="0"/>
-              <c:showPercent val="0"/>
-              <c:showBubbleSize val="0"/>
-              <c:extLst>
-                <c:ext xmlns:c15="http://schemas.microsoft.com/office/drawing/2012/chart" uri="{CE6537A1-D6FC-4f65-9D91-7224C49458BB}">
-                  <c15:dlblFieldTable/>
-                  <c15:xForSave val="1"/>
-                  <c15:showDataLabelsRange val="1"/>
-                </c:ext>
-                <c:ext xmlns:c16="http://schemas.microsoft.com/office/drawing/2014/chart" uri="{C3380CC4-5D6E-409C-BE32-E72D297353CC}">
-                  <c16:uniqueId val="{00000034-41A1-450A-8E98-2BC932F38472}"/>
-                </c:ext>
-              </c:extLst>
-            </c:dLbl>
-            <c:dLbl>
-              <c:idx val="53"/>
-              <c:tx>
-                <c:rich>
-                  <a:bodyPr/>
-                  <a:lstStyle/>
-                  <a:p>
-                    <a:fld id="{863A4F02-A3A1-43A1-B5E6-638DF64404EB}" type="CELLRANGE">
-                      <a:rPr lang="en-US"/>
-                      <a:pPr/>
-                      <a:t>[CELLRANGE]</a:t>
-                    </a:fld>
-                    <a:endParaRPr lang="en-US"/>
-                  </a:p>
-                </c:rich>
-              </c:tx>
-              <c:dLblPos val="r"/>
-              <c:showLegendKey val="0"/>
-              <c:showVal val="0"/>
-              <c:showCatName val="0"/>
-              <c:showSerName val="0"/>
-              <c:showPercent val="0"/>
-              <c:showBubbleSize val="0"/>
-              <c:extLst>
-                <c:ext xmlns:c15="http://schemas.microsoft.com/office/drawing/2012/chart" uri="{CE6537A1-D6FC-4f65-9D91-7224C49458BB}">
-                  <c15:dlblFieldTable/>
-                  <c15:xForSave val="1"/>
-                  <c15:showDataLabelsRange val="1"/>
-                </c:ext>
-                <c:ext xmlns:c16="http://schemas.microsoft.com/office/drawing/2014/chart" uri="{C3380CC4-5D6E-409C-BE32-E72D297353CC}">
-                  <c16:uniqueId val="{00000035-41A1-450A-8E98-2BC932F38472}"/>
-                </c:ext>
-              </c:extLst>
-            </c:dLbl>
-            <c:dLbl>
-              <c:idx val="54"/>
-              <c:tx>
-                <c:rich>
-                  <a:bodyPr/>
-                  <a:lstStyle/>
-                  <a:p>
-                    <a:fld id="{A72C6883-D71D-415B-B66A-094C872BDD3C}" type="CELLRANGE">
-                      <a:rPr lang="en-US"/>
-                      <a:pPr/>
-                      <a:t>[CELLRANGE]</a:t>
-                    </a:fld>
-                    <a:endParaRPr lang="en-US"/>
-                  </a:p>
-                </c:rich>
-              </c:tx>
-              <c:dLblPos val="r"/>
-              <c:showLegendKey val="0"/>
-              <c:showVal val="0"/>
-              <c:showCatName val="0"/>
-              <c:showSerName val="0"/>
-              <c:showPercent val="0"/>
-              <c:showBubbleSize val="0"/>
-              <c:extLst>
-                <c:ext xmlns:c15="http://schemas.microsoft.com/office/drawing/2012/chart" uri="{CE6537A1-D6FC-4f65-9D91-7224C49458BB}">
-                  <c15:dlblFieldTable/>
-                  <c15:xForSave val="1"/>
-                  <c15:showDataLabelsRange val="1"/>
-                </c:ext>
-                <c:ext xmlns:c16="http://schemas.microsoft.com/office/drawing/2014/chart" uri="{C3380CC4-5D6E-409C-BE32-E72D297353CC}">
-                  <c16:uniqueId val="{00000036-41A1-450A-8E98-2BC932F38472}"/>
-                </c:ext>
-              </c:extLst>
-            </c:dLbl>
-            <c:dLbl>
-              <c:idx val="55"/>
-              <c:tx>
-                <c:rich>
-                  <a:bodyPr/>
-                  <a:lstStyle/>
-                  <a:p>
-                    <a:fld id="{97ADB8ED-6595-45F3-8D38-C19BDE5A0D15}" type="CELLRANGE">
-                      <a:rPr lang="en-US"/>
-                      <a:pPr/>
-                      <a:t>[CELLRANGE]</a:t>
-                    </a:fld>
-                    <a:endParaRPr lang="en-US"/>
-                  </a:p>
-                </c:rich>
-              </c:tx>
-              <c:dLblPos val="r"/>
-              <c:showLegendKey val="0"/>
-              <c:showVal val="0"/>
-              <c:showCatName val="0"/>
-              <c:showSerName val="0"/>
-              <c:showPercent val="0"/>
-              <c:showBubbleSize val="0"/>
-              <c:extLst>
-                <c:ext xmlns:c15="http://schemas.microsoft.com/office/drawing/2012/chart" uri="{CE6537A1-D6FC-4f65-9D91-7224C49458BB}">
-                  <c15:dlblFieldTable/>
-                  <c15:xForSave val="1"/>
-                  <c15:showDataLabelsRange val="1"/>
-                </c:ext>
-                <c:ext xmlns:c16="http://schemas.microsoft.com/office/drawing/2014/chart" uri="{C3380CC4-5D6E-409C-BE32-E72D297353CC}">
-                  <c16:uniqueId val="{00000037-41A1-450A-8E98-2BC932F38472}"/>
-                </c:ext>
-              </c:extLst>
-            </c:dLbl>
-            <c:dLbl>
-              <c:idx val="56"/>
-              <c:tx>
-                <c:rich>
-                  <a:bodyPr/>
-                  <a:lstStyle/>
-                  <a:p>
-                    <a:fld id="{208E4AD4-735A-4B15-AA60-4165D30AF4C5}" type="CELLRANGE">
-                      <a:rPr lang="en-US"/>
-                      <a:pPr/>
-                      <a:t>[CELLRANGE]</a:t>
-                    </a:fld>
-                    <a:endParaRPr lang="en-US"/>
-                  </a:p>
-                </c:rich>
-              </c:tx>
-              <c:dLblPos val="r"/>
-              <c:showLegendKey val="0"/>
-              <c:showVal val="0"/>
-              <c:showCatName val="0"/>
-              <c:showSerName val="0"/>
-              <c:showPercent val="0"/>
-              <c:showBubbleSize val="0"/>
-              <c:extLst>
-                <c:ext xmlns:c15="http://schemas.microsoft.com/office/drawing/2012/chart" uri="{CE6537A1-D6FC-4f65-9D91-7224C49458BB}">
-                  <c15:dlblFieldTable/>
-                  <c15:xForSave val="1"/>
-                  <c15:showDataLabelsRange val="1"/>
-                </c:ext>
-                <c:ext xmlns:c16="http://schemas.microsoft.com/office/drawing/2014/chart" uri="{C3380CC4-5D6E-409C-BE32-E72D297353CC}">
-                  <c16:uniqueId val="{00000038-41A1-450A-8E98-2BC932F38472}"/>
-                </c:ext>
-              </c:extLst>
-            </c:dLbl>
-            <c:dLbl>
-              <c:idx val="57"/>
-              <c:tx>
-                <c:rich>
-                  <a:bodyPr/>
-                  <a:lstStyle/>
-                  <a:p>
-                    <a:fld id="{AD4CE9A5-02C7-40B2-AD43-FBCC8FFDE7DB}" type="CELLRANGE">
-                      <a:rPr lang="en-US"/>
-                      <a:pPr/>
-                      <a:t>[CELLRANGE]</a:t>
-                    </a:fld>
-                    <a:endParaRPr lang="en-US"/>
-                  </a:p>
-                </c:rich>
-              </c:tx>
-              <c:dLblPos val="r"/>
-              <c:showLegendKey val="0"/>
-              <c:showVal val="0"/>
-              <c:showCatName val="0"/>
-              <c:showSerName val="0"/>
-              <c:showPercent val="0"/>
-              <c:showBubbleSize val="0"/>
-              <c:extLst>
-                <c:ext xmlns:c15="http://schemas.microsoft.com/office/drawing/2012/chart" uri="{CE6537A1-D6FC-4f65-9D91-7224C49458BB}">
-                  <c15:dlblFieldTable/>
-                  <c15:xForSave val="1"/>
-                  <c15:showDataLabelsRange val="1"/>
-                </c:ext>
-                <c:ext xmlns:c16="http://schemas.microsoft.com/office/drawing/2014/chart" uri="{C3380CC4-5D6E-409C-BE32-E72D297353CC}">
-                  <c16:uniqueId val="{00000039-41A1-450A-8E98-2BC932F38472}"/>
-                </c:ext>
-              </c:extLst>
-            </c:dLbl>
-            <c:dLbl>
-              <c:idx val="58"/>
-              <c:tx>
-                <c:rich>
-                  <a:bodyPr/>
-                  <a:lstStyle/>
-                  <a:p>
-                    <a:fld id="{4710B79F-CBCB-4F3B-ABE9-F958DEBD9923}" type="CELLRANGE">
-                      <a:rPr lang="en-US"/>
-                      <a:pPr/>
-                      <a:t>[CELLRANGE]</a:t>
-                    </a:fld>
-                    <a:endParaRPr lang="en-US"/>
-                  </a:p>
-                </c:rich>
-              </c:tx>
-              <c:dLblPos val="r"/>
-              <c:showLegendKey val="0"/>
-              <c:showVal val="0"/>
-              <c:showCatName val="0"/>
-              <c:showSerName val="0"/>
-              <c:showPercent val="0"/>
-              <c:showBubbleSize val="0"/>
-              <c:extLst>
-                <c:ext xmlns:c15="http://schemas.microsoft.com/office/drawing/2012/chart" uri="{CE6537A1-D6FC-4f65-9D91-7224C49458BB}">
-                  <c15:dlblFieldTable/>
-                  <c15:xForSave val="1"/>
-                  <c15:showDataLabelsRange val="1"/>
-                </c:ext>
-                <c:ext xmlns:c16="http://schemas.microsoft.com/office/drawing/2014/chart" uri="{C3380CC4-5D6E-409C-BE32-E72D297353CC}">
-                  <c16:uniqueId val="{0000003A-41A1-450A-8E98-2BC932F38472}"/>
-                </c:ext>
-              </c:extLst>
-            </c:dLbl>
-            <c:dLbl>
-              <c:idx val="59"/>
-              <c:tx>
-                <c:rich>
-                  <a:bodyPr/>
-                  <a:lstStyle/>
-                  <a:p>
-                    <a:fld id="{DEAFC787-A33A-4081-BCD3-121479D00823}" type="CELLRANGE">
-                      <a:rPr lang="en-US"/>
-                      <a:pPr/>
-                      <a:t>[CELLRANGE]</a:t>
-                    </a:fld>
-                    <a:endParaRPr lang="en-US"/>
-                  </a:p>
-                </c:rich>
-              </c:tx>
-              <c:dLblPos val="r"/>
-              <c:showLegendKey val="0"/>
-              <c:showVal val="0"/>
-              <c:showCatName val="0"/>
-              <c:showSerName val="0"/>
-              <c:showPercent val="0"/>
-              <c:showBubbleSize val="0"/>
-              <c:extLst>
-                <c:ext xmlns:c15="http://schemas.microsoft.com/office/drawing/2012/chart" uri="{CE6537A1-D6FC-4f65-9D91-7224C49458BB}">
-                  <c15:dlblFieldTable/>
-                  <c15:xForSave val="1"/>
-                  <c15:showDataLabelsRange val="1"/>
-                </c:ext>
-                <c:ext xmlns:c16="http://schemas.microsoft.com/office/drawing/2014/chart" uri="{C3380CC4-5D6E-409C-BE32-E72D297353CC}">
-                  <c16:uniqueId val="{0000003B-41A1-450A-8E98-2BC932F38472}"/>
-                </c:ext>
-              </c:extLst>
-            </c:dLbl>
-            <c:spPr>
-              <a:solidFill>
-                <a:schemeClr val="accent6">
-                  <a:lumMod val="20000"/>
-                  <a:lumOff val="80000"/>
-                  <a:alpha val="75000"/>
-                </a:schemeClr>
-              </a:solidFill>
-              <a:ln>
-                <a:noFill/>
-              </a:ln>
-              <a:effectLst/>
-            </c:spPr>
-            <c:txPr>
-              <a:bodyPr rot="0" spcFirstLastPara="1" vertOverflow="ellipsis" vert="horz" wrap="square" lIns="38100" tIns="19050" rIns="38100" bIns="19050" anchor="ctr" anchorCtr="1">
-                <a:spAutoFit/>
-              </a:bodyPr>
-              <a:lstStyle/>
-              <a:p>
-                <a:pPr>
-                  <a:defRPr sz="900" b="0" i="0" u="none" strike="noStrike" kern="1200" baseline="0">
-                    <a:solidFill>
-                      <a:schemeClr val="tx1">
-                        <a:lumMod val="75000"/>
-                        <a:lumOff val="25000"/>
-                      </a:schemeClr>
-                    </a:solidFill>
-                    <a:latin typeface="+mn-lt"/>
-                    <a:ea typeface="+mn-ea"/>
-                    <a:cs typeface="+mn-cs"/>
-                  </a:defRPr>
-                </a:pPr>
-                <a:endParaRPr lang="en-US"/>
-              </a:p>
-            </c:txPr>
-            <c:dLblPos val="r"/>
-            <c:showLegendKey val="0"/>
-            <c:showVal val="0"/>
-            <c:showCatName val="0"/>
-            <c:showSerName val="0"/>
-            <c:showPercent val="0"/>
-            <c:showBubbleSize val="0"/>
-            <c:showLeaderLines val="0"/>
-            <c:extLst>
-              <c:ext xmlns:c15="http://schemas.microsoft.com/office/drawing/2012/chart" uri="{CE6537A1-D6FC-4f65-9D91-7224C49458BB}">
-                <c15:showDataLabelsRange val="1"/>
-                <c15:showLeaderLines val="1"/>
-                <c15:leaderLines>
-                  <c:spPr>
-                    <a:ln w="9525" cap="flat" cmpd="sng" algn="ctr">
-                      <a:solidFill>
-                        <a:schemeClr val="tx1">
-                          <a:lumMod val="35000"/>
-                          <a:lumOff val="65000"/>
-                        </a:schemeClr>
-                      </a:solidFill>
-                      <a:round/>
-                    </a:ln>
-                    <a:effectLst/>
-                  </c:spPr>
-                </c15:leaderLines>
-              </c:ext>
-            </c:extLst>
-          </c:dLbls>
-          <c:errBars>
-            <c:errDir val="y"/>
-            <c:errBarType val="minus"/>
-            <c:errValType val="percentage"/>
-            <c:noEndCap val="1"/>
-            <c:val val="100"/>
-            <c:spPr>
-              <a:noFill/>
-              <a:ln w="9525" cap="flat" cmpd="sng" algn="ctr">
-                <a:solidFill>
-                  <a:schemeClr val="tx1">
-                    <a:lumMod val="65000"/>
-                    <a:lumOff val="35000"/>
-                  </a:schemeClr>
-                </a:solidFill>
-                <a:prstDash val="dash"/>
-                <a:round/>
-              </a:ln>
-              <a:effectLst/>
-            </c:spPr>
-          </c:errBars>
-          <c:errBars>
-            <c:errDir val="x"/>
-            <c:errBarType val="both"/>
-            <c:errValType val="fixedVal"/>
-            <c:noEndCap val="1"/>
-            <c:val val="0"/>
-            <c:spPr>
-              <a:noFill/>
-              <a:ln w="9525" cap="flat" cmpd="sng" algn="ctr">
-                <a:solidFill>
-                  <a:schemeClr val="tx1">
-                    <a:lumMod val="65000"/>
-                    <a:lumOff val="35000"/>
-                  </a:schemeClr>
-                </a:solidFill>
-                <a:round/>
-              </a:ln>
-              <a:effectLst/>
-            </c:spPr>
-          </c:errBars>
-          <c:xVal>
-            <c:numRef>
-              <c:f>Timeline!$F$31:$F$90</c:f>
-              <c:numCache>
-                <c:formatCode>General</c:formatCode>
-                <c:ptCount val="60"/>
-                <c:pt idx="0">
-                  <c:v>1970</c:v>
-                </c:pt>
-                <c:pt idx="1">
-                  <c:v>1971</c:v>
-                </c:pt>
-                <c:pt idx="2">
-                  <c:v>1972</c:v>
-                </c:pt>
-                <c:pt idx="3">
-                  <c:v>1973</c:v>
-                </c:pt>
-                <c:pt idx="4">
-                  <c:v>1974</c:v>
-                </c:pt>
-                <c:pt idx="5">
-                  <c:v>1975</c:v>
-                </c:pt>
-                <c:pt idx="6">
-                  <c:v>1976</c:v>
-                </c:pt>
-                <c:pt idx="7">
-                  <c:v>1977</c:v>
-                </c:pt>
-                <c:pt idx="8">
-                  <c:v>1978</c:v>
-                </c:pt>
-                <c:pt idx="9">
-                  <c:v>1979</c:v>
-                </c:pt>
-                <c:pt idx="10">
-                  <c:v>1980</c:v>
-                </c:pt>
-                <c:pt idx="11">
-                  <c:v>1981</c:v>
-                </c:pt>
-                <c:pt idx="12">
-                  <c:v>1982</c:v>
-                </c:pt>
-                <c:pt idx="13">
-                  <c:v>1983</c:v>
-                </c:pt>
-                <c:pt idx="14">
-                  <c:v>1984</c:v>
-                </c:pt>
-                <c:pt idx="15">
-                  <c:v>1985</c:v>
-                </c:pt>
-                <c:pt idx="16">
-                  <c:v>1986</c:v>
-                </c:pt>
-                <c:pt idx="17">
-                  <c:v>1987</c:v>
-                </c:pt>
-                <c:pt idx="18">
-                  <c:v>1988</c:v>
-                </c:pt>
-                <c:pt idx="19">
-                  <c:v>1989</c:v>
-                </c:pt>
-                <c:pt idx="20">
-                  <c:v>1990</c:v>
-                </c:pt>
-                <c:pt idx="21">
-                  <c:v>1991</c:v>
-                </c:pt>
-                <c:pt idx="22">
-                  <c:v>1992</c:v>
-                </c:pt>
-                <c:pt idx="23">
-                  <c:v>1993</c:v>
-                </c:pt>
-                <c:pt idx="24">
-                  <c:v>1994</c:v>
-                </c:pt>
-                <c:pt idx="25">
-                  <c:v>1995</c:v>
-                </c:pt>
-                <c:pt idx="26">
-                  <c:v>1996</c:v>
-                </c:pt>
-                <c:pt idx="27">
-                  <c:v>1997</c:v>
-                </c:pt>
-                <c:pt idx="28">
-                  <c:v>1998</c:v>
-                </c:pt>
-                <c:pt idx="29">
-                  <c:v>1999</c:v>
-                </c:pt>
-                <c:pt idx="30">
-                  <c:v>2000</c:v>
-                </c:pt>
-                <c:pt idx="31">
-                  <c:v>2001</c:v>
-                </c:pt>
-                <c:pt idx="32">
-                  <c:v>2002</c:v>
-                </c:pt>
-                <c:pt idx="33">
-                  <c:v>2003</c:v>
-                </c:pt>
-                <c:pt idx="34">
-                  <c:v>2004</c:v>
-                </c:pt>
-                <c:pt idx="35">
-                  <c:v>2005</c:v>
-                </c:pt>
-                <c:pt idx="36">
-                  <c:v>2006</c:v>
-                </c:pt>
-                <c:pt idx="37">
-                  <c:v>2007</c:v>
-                </c:pt>
-                <c:pt idx="38">
-                  <c:v>2008</c:v>
-                </c:pt>
-                <c:pt idx="39">
-                  <c:v>2009</c:v>
-                </c:pt>
-                <c:pt idx="40">
-                  <c:v>2010</c:v>
-                </c:pt>
-                <c:pt idx="41">
-                  <c:v>2011</c:v>
-                </c:pt>
-                <c:pt idx="42">
-                  <c:v>2012</c:v>
-                </c:pt>
-                <c:pt idx="43">
-                  <c:v>2013</c:v>
-                </c:pt>
-                <c:pt idx="44">
-                  <c:v>2014</c:v>
-                </c:pt>
-                <c:pt idx="45">
-                  <c:v>2015</c:v>
-                </c:pt>
-                <c:pt idx="46">
-                  <c:v>2016</c:v>
-                </c:pt>
-                <c:pt idx="47">
-                  <c:v>2017</c:v>
-                </c:pt>
-                <c:pt idx="48">
-                  <c:v>2018</c:v>
-                </c:pt>
-                <c:pt idx="49">
-                  <c:v>2019</c:v>
-                </c:pt>
-                <c:pt idx="50">
-                  <c:v>2020</c:v>
-                </c:pt>
-                <c:pt idx="51">
-                  <c:v>2021</c:v>
-                </c:pt>
-                <c:pt idx="52">
-                  <c:v>2022</c:v>
-                </c:pt>
-                <c:pt idx="53">
-                  <c:v>2023</c:v>
-                </c:pt>
-                <c:pt idx="54">
-                  <c:v>2024</c:v>
-                </c:pt>
-                <c:pt idx="55">
-                  <c:v>2025</c:v>
-                </c:pt>
-                <c:pt idx="56">
-                  <c:v>2026</c:v>
-                </c:pt>
-                <c:pt idx="57">
-                  <c:v>2027</c:v>
-                </c:pt>
-                <c:pt idx="58">
-                  <c:v>2028</c:v>
-                </c:pt>
-                <c:pt idx="59">
-                  <c:v>2029</c:v>
-                </c:pt>
-              </c:numCache>
-            </c:numRef>
-          </c:xVal>
-          <c:yVal>
-            <c:numRef>
-              <c:f>Timeline!$E$31:$E$90</c:f>
-              <c:numCache>
-                <c:formatCode>General</c:formatCode>
-                <c:ptCount val="60"/>
-                <c:pt idx="0">
-                  <c:v>50</c:v>
-                </c:pt>
-                <c:pt idx="1">
-                  <c:v>-75</c:v>
-                </c:pt>
-                <c:pt idx="2">
-                  <c:v>-40</c:v>
-                </c:pt>
-                <c:pt idx="3">
-                  <c:v>100</c:v>
-                </c:pt>
-                <c:pt idx="4">
-                  <c:v>75</c:v>
-                </c:pt>
-                <c:pt idx="5">
-                  <c:v>50</c:v>
-                </c:pt>
-                <c:pt idx="6">
-                  <c:v>-75</c:v>
-                </c:pt>
-                <c:pt idx="7">
-                  <c:v>-40</c:v>
-                </c:pt>
-                <c:pt idx="8">
-                  <c:v>100</c:v>
-                </c:pt>
-                <c:pt idx="9">
-                  <c:v>-100</c:v>
-                </c:pt>
-                <c:pt idx="10">
-                  <c:v>50</c:v>
-                </c:pt>
-                <c:pt idx="11">
-                  <c:v>-75</c:v>
-                </c:pt>
-                <c:pt idx="12">
-                  <c:v>-40</c:v>
-                </c:pt>
-                <c:pt idx="13">
-                  <c:v>100</c:v>
-                </c:pt>
-                <c:pt idx="14">
-                  <c:v>75</c:v>
-                </c:pt>
-                <c:pt idx="15">
-                  <c:v>50</c:v>
-                </c:pt>
-                <c:pt idx="16">
-                  <c:v>-75</c:v>
-                </c:pt>
-                <c:pt idx="17">
-                  <c:v>-40</c:v>
-                </c:pt>
-                <c:pt idx="18">
-                  <c:v>100</c:v>
-                </c:pt>
-                <c:pt idx="19">
-                  <c:v>-100</c:v>
-                </c:pt>
-                <c:pt idx="20">
-                  <c:v>50</c:v>
-                </c:pt>
-                <c:pt idx="21">
-                  <c:v>-75</c:v>
-                </c:pt>
-                <c:pt idx="22">
-                  <c:v>-40</c:v>
-                </c:pt>
-                <c:pt idx="23">
-                  <c:v>100</c:v>
-                </c:pt>
-                <c:pt idx="24">
-                  <c:v>75</c:v>
-                </c:pt>
-                <c:pt idx="25">
-                  <c:v>50</c:v>
-                </c:pt>
-                <c:pt idx="26">
-                  <c:v>-75</c:v>
-                </c:pt>
-                <c:pt idx="27">
-                  <c:v>-40</c:v>
-                </c:pt>
-                <c:pt idx="28">
-                  <c:v>100</c:v>
-                </c:pt>
-                <c:pt idx="29">
-                  <c:v>-100</c:v>
-                </c:pt>
-                <c:pt idx="30">
-                  <c:v>50</c:v>
-                </c:pt>
-                <c:pt idx="31">
-                  <c:v>-75</c:v>
-                </c:pt>
-                <c:pt idx="32">
-                  <c:v>-40</c:v>
-                </c:pt>
-                <c:pt idx="33">
-                  <c:v>100</c:v>
-                </c:pt>
-                <c:pt idx="34">
-                  <c:v>75</c:v>
-                </c:pt>
-                <c:pt idx="35">
-                  <c:v>50</c:v>
-                </c:pt>
-                <c:pt idx="36">
-                  <c:v>-75</c:v>
-                </c:pt>
-                <c:pt idx="37">
-                  <c:v>-40</c:v>
-                </c:pt>
-                <c:pt idx="38">
-                  <c:v>100</c:v>
-                </c:pt>
-                <c:pt idx="39">
-                  <c:v>-100</c:v>
-                </c:pt>
-                <c:pt idx="40">
-                  <c:v>50</c:v>
-                </c:pt>
-                <c:pt idx="41">
-                  <c:v>-75</c:v>
-                </c:pt>
-                <c:pt idx="42">
-                  <c:v>-40</c:v>
-                </c:pt>
-                <c:pt idx="43">
-                  <c:v>100</c:v>
-                </c:pt>
-                <c:pt idx="44">
-                  <c:v>75</c:v>
-                </c:pt>
-                <c:pt idx="45">
-                  <c:v>50</c:v>
-                </c:pt>
-                <c:pt idx="46">
-                  <c:v>-75</c:v>
-                </c:pt>
-                <c:pt idx="47">
-                  <c:v>-40</c:v>
-                </c:pt>
-                <c:pt idx="48">
-                  <c:v>100</c:v>
-                </c:pt>
-                <c:pt idx="49">
-                  <c:v>-100</c:v>
-                </c:pt>
-                <c:pt idx="50">
-                  <c:v>50</c:v>
-                </c:pt>
-                <c:pt idx="51">
-                  <c:v>-75</c:v>
-                </c:pt>
-                <c:pt idx="52">
-                  <c:v>-40</c:v>
-                </c:pt>
-                <c:pt idx="53">
-                  <c:v>100</c:v>
-                </c:pt>
-                <c:pt idx="54">
-                  <c:v>75</c:v>
-                </c:pt>
-                <c:pt idx="55">
-                  <c:v>50</c:v>
-                </c:pt>
-                <c:pt idx="56">
-                  <c:v>-75</c:v>
-                </c:pt>
-                <c:pt idx="57">
-                  <c:v>-40</c:v>
-                </c:pt>
-                <c:pt idx="58">
-                  <c:v>100</c:v>
-                </c:pt>
-                <c:pt idx="59">
-                  <c:v>-100</c:v>
-                </c:pt>
-              </c:numCache>
-            </c:numRef>
-          </c:yVal>
-          <c:smooth val="0"/>
-          <c:extLst>
-            <c:ext xmlns:c15="http://schemas.microsoft.com/office/drawing/2012/chart" uri="{02D57815-91ED-43cb-92C2-25804820EDAC}">
-              <c15:datalabelsRange>
-                <c15:f>Timeline!$G$31:$G$90</c15:f>
-                <c15:dlblRangeCache>
-                  <c:ptCount val="60"/>
-                  <c:pt idx="0">
-                    <c:v>Event 1</c:v>
-                  </c:pt>
-                  <c:pt idx="1">
-                    <c:v>Event 2</c:v>
-                  </c:pt>
-                  <c:pt idx="2">
-                    <c:v>Event 3</c:v>
-                  </c:pt>
-                  <c:pt idx="3">
-                    <c:v>Event 4</c:v>
-                  </c:pt>
-                  <c:pt idx="4">
-                    <c:v>Event 5</c:v>
-                  </c:pt>
-                  <c:pt idx="5">
-                    <c:v>Event 6</c:v>
-                  </c:pt>
-                  <c:pt idx="6">
-                    <c:v>Event 7</c:v>
-                  </c:pt>
-                  <c:pt idx="7">
-                    <c:v>Event 8</c:v>
-                  </c:pt>
-                  <c:pt idx="8">
-                    <c:v>Event 9</c:v>
-                  </c:pt>
-                  <c:pt idx="9">
-                    <c:v>Event 10</c:v>
-                  </c:pt>
-                  <c:pt idx="10">
-                    <c:v>Event 11</c:v>
-                  </c:pt>
-                  <c:pt idx="11">
-                    <c:v>Event 12</c:v>
-                  </c:pt>
-                  <c:pt idx="12">
-                    <c:v>Event 13</c:v>
-                  </c:pt>
-                  <c:pt idx="13">
-                    <c:v>Event 14</c:v>
-                  </c:pt>
-                  <c:pt idx="14">
-                    <c:v>Event 15</c:v>
-                  </c:pt>
-                  <c:pt idx="15">
-                    <c:v>Event 16</c:v>
-                  </c:pt>
-                  <c:pt idx="16">
-                    <c:v>Event 17</c:v>
-                  </c:pt>
-                  <c:pt idx="17">
-                    <c:v>Event 18</c:v>
-                  </c:pt>
-                  <c:pt idx="18">
-                    <c:v>Event 19</c:v>
-                  </c:pt>
-                  <c:pt idx="19">
-                    <c:v>Event 20</c:v>
-                  </c:pt>
-                  <c:pt idx="20">
-                    <c:v>Event 21</c:v>
-                  </c:pt>
-                  <c:pt idx="21">
-                    <c:v>Event 22</c:v>
-                  </c:pt>
-                  <c:pt idx="22">
-                    <c:v>Event 23</c:v>
-                  </c:pt>
-                  <c:pt idx="23">
-                    <c:v>Event 24</c:v>
-                  </c:pt>
-                  <c:pt idx="24">
-                    <c:v>Event 25</c:v>
-                  </c:pt>
-                  <c:pt idx="25">
-                    <c:v>Event 26</c:v>
-                  </c:pt>
-                  <c:pt idx="26">
-                    <c:v>Event 27</c:v>
-                  </c:pt>
-                  <c:pt idx="27">
-                    <c:v>Event 28</c:v>
-                  </c:pt>
-                  <c:pt idx="28">
-                    <c:v>Event 29</c:v>
-                  </c:pt>
-                  <c:pt idx="29">
-                    <c:v>Event 30</c:v>
-                  </c:pt>
-                  <c:pt idx="30">
-                    <c:v>Event 31</c:v>
-                  </c:pt>
-                  <c:pt idx="31">
-                    <c:v>Event 32</c:v>
-                  </c:pt>
-                  <c:pt idx="32">
-                    <c:v>Event 33</c:v>
-                  </c:pt>
-                  <c:pt idx="33">
-                    <c:v>Event 34</c:v>
-                  </c:pt>
-                  <c:pt idx="34">
-                    <c:v>Event 35</c:v>
-                  </c:pt>
-                  <c:pt idx="35">
-                    <c:v>Event 36</c:v>
-                  </c:pt>
-                  <c:pt idx="36">
-                    <c:v>Event 37</c:v>
-                  </c:pt>
-                  <c:pt idx="37">
-                    <c:v>Event 38</c:v>
-                  </c:pt>
-                  <c:pt idx="38">
-                    <c:v>Event 39</c:v>
-                  </c:pt>
-                  <c:pt idx="39">
-                    <c:v>Event 40</c:v>
-                  </c:pt>
-                  <c:pt idx="40">
-                    <c:v>Event 41</c:v>
-                  </c:pt>
-                  <c:pt idx="41">
-                    <c:v>Event 42</c:v>
-                  </c:pt>
-                  <c:pt idx="42">
-                    <c:v>Event 43</c:v>
-                  </c:pt>
-                  <c:pt idx="43">
-                    <c:v>Event 44</c:v>
-                  </c:pt>
-                  <c:pt idx="44">
-                    <c:v>Event 45</c:v>
-                  </c:pt>
-                  <c:pt idx="45">
-                    <c:v>Event 46</c:v>
-                  </c:pt>
-                  <c:pt idx="46">
-                    <c:v>Event 47</c:v>
-                  </c:pt>
-                  <c:pt idx="47">
-                    <c:v>Event 48</c:v>
-                  </c:pt>
-                  <c:pt idx="48">
-                    <c:v>Event 49</c:v>
-                  </c:pt>
-                  <c:pt idx="49">
-                    <c:v>Event 50</c:v>
-                  </c:pt>
-                  <c:pt idx="50">
-                    <c:v>Event 51</c:v>
-                  </c:pt>
-                  <c:pt idx="51">
-                    <c:v>Event 52</c:v>
-                  </c:pt>
-                  <c:pt idx="52">
-                    <c:v>Event 53</c:v>
-                  </c:pt>
-                  <c:pt idx="53">
-                    <c:v>Event 54</c:v>
-                  </c:pt>
-                  <c:pt idx="54">
-                    <c:v>Event 55</c:v>
-                  </c:pt>
-                  <c:pt idx="55">
-                    <c:v>Event 56</c:v>
-                  </c:pt>
-                  <c:pt idx="56">
-                    <c:v>Event 57</c:v>
-                  </c:pt>
-                  <c:pt idx="57">
-                    <c:v>Event 58</c:v>
-                  </c:pt>
-                  <c:pt idx="58">
-                    <c:v>Event 59</c:v>
-                  </c:pt>
-                  <c:pt idx="59">
-                    <c:v>Event 60</c:v>
-                  </c:pt>
-                </c15:dlblRangeCache>
-              </c15:datalabelsRange>
-            </c:ext>
-            <c:ext xmlns:c16="http://schemas.microsoft.com/office/drawing/2014/chart" uri="{C3380CC4-5D6E-409C-BE32-E72D297353CC}">
-              <c16:uniqueId val="{0000003C-41A1-450A-8E98-2BC932F38472}"/>
-            </c:ext>
-          </c:extLst>
-        </c:ser>
-        <c:dLbls>
-          <c:dLblPos val="r"/>
-          <c:showLegendKey val="0"/>
-          <c:showVal val="1"/>
-          <c:showCatName val="0"/>
-          <c:showSerName val="0"/>
-          <c:showPercent val="0"/>
-          <c:showBubbleSize val="0"/>
-        </c:dLbls>
-        <c:axId val="364131704"/>
-        <c:axId val="364132344"/>
-      </c:scatterChart>
-      <c:valAx>
-        <c:axId val="364131704"/>
-        <c:scaling>
-          <c:orientation val="minMax"/>
-          <c:min val="1970"/>
-        </c:scaling>
-        <c:delete val="0"/>
-        <c:axPos val="b"/>
-        <c:majorGridlines>
-          <c:spPr>
-            <a:ln w="9525" cap="flat" cmpd="sng" algn="ctr">
-              <a:solidFill>
-                <a:schemeClr val="tx1">
-                  <a:lumMod val="15000"/>
-                  <a:lumOff val="85000"/>
-                </a:schemeClr>
-              </a:solidFill>
-              <a:round/>
-            </a:ln>
-            <a:effectLst/>
-          </c:spPr>
-        </c:majorGridlines>
-        <c:numFmt formatCode="General" sourceLinked="1"/>
-        <c:majorTickMark val="none"/>
-        <c:minorTickMark val="none"/>
-        <c:tickLblPos val="nextTo"/>
-        <c:spPr>
-          <a:noFill/>
-          <a:ln w="9525" cap="flat" cmpd="sng" algn="ctr">
-            <a:solidFill>
-              <a:schemeClr val="tx1">
-                <a:lumMod val="25000"/>
-                <a:lumOff val="75000"/>
-              </a:schemeClr>
-            </a:solidFill>
-            <a:round/>
-          </a:ln>
-          <a:effectLst/>
-        </c:spPr>
-        <c:txPr>
-          <a:bodyPr rot="-60000000" spcFirstLastPara="1" vertOverflow="ellipsis" vert="horz" wrap="square" anchor="ctr" anchorCtr="1"/>
-          <a:lstStyle/>
-          <a:p>
-            <a:pPr>
-              <a:defRPr sz="900" b="0" i="0" u="none" strike="noStrike" kern="1200" baseline="0">
-                <a:solidFill>
-                  <a:schemeClr val="tx1">
-                    <a:lumMod val="65000"/>
-                    <a:lumOff val="35000"/>
-                  </a:schemeClr>
-                </a:solidFill>
-                <a:latin typeface="+mn-lt"/>
-                <a:ea typeface="+mn-ea"/>
-                <a:cs typeface="+mn-cs"/>
-              </a:defRPr>
-            </a:pPr>
-            <a:endParaRPr lang="en-US"/>
-          </a:p>
-        </c:txPr>
-        <c:crossAx val="364132344"/>
-        <c:crosses val="autoZero"/>
-        <c:crossBetween val="midCat"/>
-        <c:minorUnit val="5"/>
-      </c:valAx>
-      <c:valAx>
-        <c:axId val="364132344"/>
-        <c:scaling>
-          <c:orientation val="minMax"/>
-        </c:scaling>
-        <c:delete val="0"/>
-        <c:axPos val="l"/>
-        <c:majorGridlines>
-          <c:spPr>
-            <a:ln w="9525" cap="flat" cmpd="sng" algn="ctr">
-              <a:solidFill>
-                <a:schemeClr val="tx1">
-                  <a:lumMod val="15000"/>
-                  <a:lumOff val="85000"/>
-                </a:schemeClr>
-              </a:solidFill>
-              <a:round/>
-            </a:ln>
-            <a:effectLst/>
-          </c:spPr>
-        </c:majorGridlines>
-        <c:numFmt formatCode="General" sourceLinked="1"/>
-        <c:majorTickMark val="none"/>
-        <c:minorTickMark val="none"/>
-        <c:tickLblPos val="nextTo"/>
-        <c:spPr>
-          <a:noFill/>
-          <a:ln w="9525" cap="flat" cmpd="sng" algn="ctr">
-            <a:solidFill>
-              <a:schemeClr val="tx1">
-                <a:lumMod val="25000"/>
-                <a:lumOff val="75000"/>
-              </a:schemeClr>
-            </a:solidFill>
-            <a:round/>
-          </a:ln>
-          <a:effectLst/>
-        </c:spPr>
-        <c:txPr>
-          <a:bodyPr rot="-60000000" spcFirstLastPara="1" vertOverflow="ellipsis" vert="horz" wrap="square" anchor="ctr" anchorCtr="1"/>
-          <a:lstStyle/>
-          <a:p>
-            <a:pPr>
-              <a:defRPr sz="900" b="0" i="0" u="none" strike="noStrike" kern="1200" baseline="0">
-                <a:solidFill>
-                  <a:schemeClr val="tx1">
-                    <a:lumMod val="65000"/>
-                    <a:lumOff val="35000"/>
-                  </a:schemeClr>
-                </a:solidFill>
-                <a:latin typeface="+mn-lt"/>
-                <a:ea typeface="+mn-ea"/>
-                <a:cs typeface="+mn-cs"/>
-              </a:defRPr>
-            </a:pPr>
-            <a:endParaRPr lang="en-US"/>
-          </a:p>
-        </c:txPr>
-        <c:crossAx val="364131704"/>
-        <c:crosses val="autoZero"/>
-        <c:crossBetween val="midCat"/>
-      </c:valAx>
-      <c:spPr>
-        <a:solidFill>
-          <a:schemeClr val="bg1"/>
-        </a:solidFill>
-        <a:ln>
-          <a:noFill/>
-        </a:ln>
-        <a:effectLst/>
-      </c:spPr>
-    </c:plotArea>
-    <c:plotVisOnly val="1"/>
-    <c:dispBlanksAs val="gap"/>
-    <c:extLst>
-      <c:ext xmlns:c16r3="http://schemas.microsoft.com/office/drawing/2017/03/chart" uri="{56B9EC1D-385E-4148-901F-78D8002777C0}">
-        <c16r3:dataDisplayOptions16>
-          <c16r3:dispNaAsBlank val="1"/>
-        </c16r3:dataDisplayOptions16>
-      </c:ext>
-    </c:extLst>
-    <c:showDLblsOverMax val="0"/>
-  </c:chart>
-  <c:spPr>
-    <a:noFill/>
-    <a:ln>
-      <a:noFill/>
-    </a:ln>
-    <a:effectLst/>
-  </c:spPr>
-  <c:txPr>
-    <a:bodyPr/>
-    <a:lstStyle/>
-    <a:p>
-      <a:pPr>
-        <a:defRPr/>
-      </a:pPr>
-      <a:endParaRPr lang="en-US"/>
-    </a:p>
-  </c:txPr>
-  <c:externalData r:id="rId3">
-    <c:autoUpdate val="0"/>
-  </c:externalData>
-</c:chartSpace>
-</file>
-
-<file path=ppt/charts/colors1.xml><?xml version="1.0" encoding="utf-8"?>
-<cs:colorStyle xmlns:cs="http://schemas.microsoft.com/office/drawing/2012/chartStyle" xmlns:a="http://schemas.openxmlformats.org/drawingml/2006/main" meth="cycle" id="10">
-  <a:schemeClr val="accent1"/>
-  <a:schemeClr val="accent2"/>
-  <a:schemeClr val="accent3"/>
-  <a:schemeClr val="accent4"/>
-  <a:schemeClr val="accent5"/>
-  <a:schemeClr val="accent6"/>
-  <cs:variation/>
-  <cs:variation>
-    <a:lumMod val="60000"/>
-  </cs:variation>
-  <cs:variation>
-    <a:lumMod val="80000"/>
-    <a:lumOff val="20000"/>
-  </cs:variation>
-  <cs:variation>
-    <a:lumMod val="80000"/>
-  </cs:variation>
-  <cs:variation>
-    <a:lumMod val="60000"/>
-    <a:lumOff val="40000"/>
-  </cs:variation>
-  <cs:variation>
-    <a:lumMod val="50000"/>
-  </cs:variation>
-  <cs:variation>
-    <a:lumMod val="70000"/>
-    <a:lumOff val="30000"/>
-  </cs:variation>
-  <cs:variation>
-    <a:lumMod val="70000"/>
-  </cs:variation>
-  <cs:variation>
-    <a:lumMod val="50000"/>
-    <a:lumOff val="50000"/>
-  </cs:variation>
-</cs:colorStyle>
-</file>
-
-<file path=ppt/charts/style1.xml><?xml version="1.0" encoding="utf-8"?>
-<cs:chartStyle xmlns:cs="http://schemas.microsoft.com/office/drawing/2012/chartStyle" xmlns:a="http://schemas.openxmlformats.org/drawingml/2006/main" id="240">
-  <cs:axisTitle>
-    <cs:lnRef idx="0"/>
-    <cs:fillRef idx="0"/>
-    <cs:effectRef idx="0"/>
-    <cs:fontRef idx="minor">
-      <a:schemeClr val="tx1">
-        <a:lumMod val="65000"/>
-        <a:lumOff val="35000"/>
-      </a:schemeClr>
-    </cs:fontRef>
-    <cs:defRPr sz="1000" kern="1200"/>
-  </cs:axisTitle>
-  <cs:categoryAxis>
-    <cs:lnRef idx="0"/>
-    <cs:fillRef idx="0"/>
-    <cs:effectRef idx="0"/>
-    <cs:fontRef idx="minor">
-      <a:schemeClr val="tx1">
-        <a:lumMod val="65000"/>
-        <a:lumOff val="35000"/>
-      </a:schemeClr>
-    </cs:fontRef>
-    <cs:spPr>
-      <a:ln w="9525" cap="flat" cmpd="sng" algn="ctr">
-        <a:solidFill>
-          <a:schemeClr val="tx1">
-            <a:lumMod val="25000"/>
-            <a:lumOff val="75000"/>
-          </a:schemeClr>
-        </a:solidFill>
-        <a:round/>
-      </a:ln>
-    </cs:spPr>
-    <cs:defRPr sz="900" kern="1200"/>
-  </cs:categoryAxis>
-  <cs:chartArea mods="allowNoFillOverride allowNoLineOverride">
-    <cs:lnRef idx="0"/>
-    <cs:fillRef idx="0"/>
-    <cs:effectRef idx="0"/>
-    <cs:fontRef idx="minor">
-      <a:schemeClr val="tx1"/>
-    </cs:fontRef>
-    <cs:spPr>
-      <a:solidFill>
-        <a:schemeClr val="bg1"/>
-      </a:solidFill>
-      <a:ln w="9525" cap="flat" cmpd="sng" algn="ctr">
-        <a:solidFill>
-          <a:schemeClr val="tx1">
-            <a:lumMod val="15000"/>
-            <a:lumOff val="85000"/>
-          </a:schemeClr>
-        </a:solidFill>
-        <a:round/>
-      </a:ln>
-    </cs:spPr>
-    <cs:defRPr sz="1000" kern="1200"/>
-  </cs:chartArea>
-  <cs:dataLabel>
-    <cs:lnRef idx="0"/>
-    <cs:fillRef idx="0"/>
-    <cs:effectRef idx="0"/>
-    <cs:fontRef idx="minor">
-      <a:schemeClr val="tx1">
-        <a:lumMod val="75000"/>
-        <a:lumOff val="25000"/>
-      </a:schemeClr>
-    </cs:fontRef>
-    <cs:defRPr sz="900" kern="1200"/>
-  </cs:dataLabel>
-  <cs:dataLabelCallout>
-    <cs:lnRef idx="0"/>
-    <cs:fillRef idx="0"/>
-    <cs:effectRef idx="0"/>
-    <cs:fontRef idx="minor">
-      <a:schemeClr val="dk1">
-        <a:lumMod val="65000"/>
-        <a:lumOff val="35000"/>
-      </a:schemeClr>
-    </cs:fontRef>
-    <cs:spPr>
-      <a:solidFill>
-        <a:schemeClr val="lt1"/>
-      </a:solidFill>
-      <a:ln>
-        <a:solidFill>
-          <a:schemeClr val="dk1">
-            <a:lumMod val="25000"/>
-            <a:lumOff val="75000"/>
-          </a:schemeClr>
-        </a:solidFill>
-      </a:ln>
-    </cs:spPr>
-    <cs:defRPr sz="900" kern="1200"/>
-    <cs:bodyPr rot="0" spcFirstLastPara="1" vertOverflow="clip" horzOverflow="clip" vert="horz" wrap="square" lIns="36576" tIns="18288" rIns="36576" bIns="18288" anchor="ctr" anchorCtr="1">
-      <a:spAutoFit/>
-    </cs:bodyPr>
-  </cs:dataLabelCallout>
-  <cs:dataPoint>
-    <cs:lnRef idx="0"/>
-    <cs:fillRef idx="1">
-      <cs:styleClr val="auto"/>
-    </cs:fillRef>
-    <cs:effectRef idx="0"/>
-    <cs:fontRef idx="minor">
-      <a:schemeClr val="tx1"/>
-    </cs:fontRef>
-  </cs:dataPoint>
-  <cs:dataPoint3D>
-    <cs:lnRef idx="0"/>
-    <cs:fillRef idx="1">
-      <cs:styleClr val="auto"/>
-    </cs:fillRef>
-    <cs:effectRef idx="0"/>
-    <cs:fontRef idx="minor">
-      <a:schemeClr val="tx1"/>
-    </cs:fontRef>
-  </cs:dataPoint3D>
-  <cs:dataPointLine>
-    <cs:lnRef idx="0">
-      <cs:styleClr val="auto"/>
-    </cs:lnRef>
-    <cs:fillRef idx="1"/>
-    <cs:effectRef idx="0"/>
-    <cs:fontRef idx="minor">
-      <a:schemeClr val="tx1"/>
-    </cs:fontRef>
-    <cs:spPr>
-      <a:ln w="19050" cap="rnd">
-        <a:solidFill>
-          <a:schemeClr val="phClr"/>
-        </a:solidFill>
-        <a:round/>
-      </a:ln>
-    </cs:spPr>
-  </cs:dataPointLine>
-  <cs:dataPointMarker>
-    <cs:lnRef idx="0">
-      <cs:styleClr val="auto"/>
-    </cs:lnRef>
-    <cs:fillRef idx="1">
-      <cs:styleClr val="auto"/>
-    </cs:fillRef>
-    <cs:effectRef idx="0"/>
-    <cs:fontRef idx="minor">
-      <a:schemeClr val="tx1"/>
-    </cs:fontRef>
-    <cs:spPr>
-      <a:ln w="9525">
-        <a:solidFill>
-          <a:schemeClr val="phClr"/>
-        </a:solidFill>
-      </a:ln>
-    </cs:spPr>
-  </cs:dataPointMarker>
-  <cs:dataPointMarkerLayout symbol="circle" size="5"/>
-  <cs:dataPointWireframe>
-    <cs:lnRef idx="0">
-      <cs:styleClr val="auto"/>
-    </cs:lnRef>
-    <cs:fillRef idx="0"/>
-    <cs:effectRef idx="0"/>
-    <cs:fontRef idx="minor">
-      <a:schemeClr val="dk1"/>
-    </cs:fontRef>
-    <cs:spPr>
-      <a:ln w="9525" cap="rnd">
-        <a:solidFill>
-          <a:schemeClr val="phClr"/>
-        </a:solidFill>
-        <a:round/>
-      </a:ln>
-    </cs:spPr>
-  </cs:dataPointWireframe>
-  <cs:dataTable>
-    <cs:lnRef idx="0"/>
-    <cs:fillRef idx="0"/>
-    <cs:effectRef idx="0"/>
-    <cs:fontRef idx="minor">
-      <a:schemeClr val="tx1">
-        <a:lumMod val="65000"/>
-        <a:lumOff val="35000"/>
-      </a:schemeClr>
-    </cs:fontRef>
-    <cs:spPr>
-      <a:noFill/>
-      <a:ln w="9525" cap="flat" cmpd="sng" algn="ctr">
-        <a:solidFill>
-          <a:schemeClr val="tx1">
-            <a:lumMod val="15000"/>
-            <a:lumOff val="85000"/>
-          </a:schemeClr>
-        </a:solidFill>
-        <a:round/>
-      </a:ln>
-    </cs:spPr>
-    <cs:defRPr sz="900" kern="1200"/>
-  </cs:dataTable>
-  <cs:downBar>
-    <cs:lnRef idx="0"/>
-    <cs:fillRef idx="0"/>
-    <cs:effectRef idx="0"/>
-    <cs:fontRef idx="minor">
-      <a:schemeClr val="tx1"/>
-    </cs:fontRef>
-    <cs:spPr>
-      <a:solidFill>
-        <a:schemeClr val="dk1">
-          <a:lumMod val="75000"/>
-          <a:lumOff val="25000"/>
-        </a:schemeClr>
-      </a:solidFill>
-      <a:ln w="9525" cap="flat" cmpd="sng" algn="ctr">
-        <a:solidFill>
-          <a:schemeClr val="tx1">
-            <a:lumMod val="65000"/>
-            <a:lumOff val="35000"/>
-          </a:schemeClr>
-        </a:solidFill>
-        <a:round/>
-      </a:ln>
-    </cs:spPr>
-  </cs:downBar>
-  <cs:dropLine>
-    <cs:lnRef idx="0"/>
-    <cs:fillRef idx="0"/>
-    <cs:effectRef idx="0"/>
-    <cs:fontRef idx="minor">
-      <a:schemeClr val="tx1"/>
-    </cs:fontRef>
-    <cs:spPr>
-      <a:ln w="9525" cap="flat" cmpd="sng" algn="ctr">
-        <a:solidFill>
-          <a:schemeClr val="tx1">
-            <a:lumMod val="35000"/>
-            <a:lumOff val="65000"/>
-          </a:schemeClr>
-        </a:solidFill>
-        <a:round/>
-      </a:ln>
-    </cs:spPr>
-  </cs:dropLine>
-  <cs:errorBar>
-    <cs:lnRef idx="0"/>
-    <cs:fillRef idx="0"/>
-    <cs:effectRef idx="0"/>
-    <cs:fontRef idx="minor">
-      <a:schemeClr val="tx1"/>
-    </cs:fontRef>
-    <cs:spPr>
-      <a:ln w="9525" cap="flat" cmpd="sng" algn="ctr">
-        <a:solidFill>
-          <a:schemeClr val="tx1">
-            <a:lumMod val="65000"/>
-            <a:lumOff val="35000"/>
-          </a:schemeClr>
-        </a:solidFill>
-        <a:round/>
-      </a:ln>
-    </cs:spPr>
-  </cs:errorBar>
-  <cs:floor>
-    <cs:lnRef idx="0"/>
-    <cs:fillRef idx="0"/>
-    <cs:effectRef idx="0"/>
-    <cs:fontRef idx="minor">
-      <a:schemeClr val="tx1"/>
-    </cs:fontRef>
-    <cs:spPr>
-      <a:noFill/>
-      <a:ln>
-        <a:noFill/>
-      </a:ln>
-    </cs:spPr>
-  </cs:floor>
-  <cs:gridlineMajor>
-    <cs:lnRef idx="0"/>
-    <cs:fillRef idx="0"/>
-    <cs:effectRef idx="0"/>
-    <cs:fontRef idx="minor">
-      <a:schemeClr val="tx1"/>
-    </cs:fontRef>
-    <cs:spPr>
-      <a:ln w="9525" cap="flat" cmpd="sng" algn="ctr">
-        <a:solidFill>
-          <a:schemeClr val="tx1">
-            <a:lumMod val="15000"/>
-            <a:lumOff val="85000"/>
-          </a:schemeClr>
-        </a:solidFill>
-        <a:round/>
-      </a:ln>
-    </cs:spPr>
-  </cs:gridlineMajor>
-  <cs:gridlineMinor>
-    <cs:lnRef idx="0"/>
-    <cs:fillRef idx="0"/>
-    <cs:effectRef idx="0"/>
-    <cs:fontRef idx="minor">
-      <a:schemeClr val="tx1"/>
-    </cs:fontRef>
-    <cs:spPr>
-      <a:ln w="9525" cap="flat" cmpd="sng" algn="ctr">
-        <a:solidFill>
-          <a:schemeClr val="tx1">
-            <a:lumMod val="5000"/>
-            <a:lumOff val="95000"/>
-          </a:schemeClr>
-        </a:solidFill>
-        <a:round/>
-      </a:ln>
-    </cs:spPr>
-  </cs:gridlineMinor>
-  <cs:hiLoLine>
-    <cs:lnRef idx="0"/>
-    <cs:fillRef idx="0"/>
-    <cs:effectRef idx="0"/>
-    <cs:fontRef idx="minor">
-      <a:schemeClr val="tx1"/>
-    </cs:fontRef>
-    <cs:spPr>
-      <a:ln w="9525" cap="flat" cmpd="sng" algn="ctr">
-        <a:solidFill>
-          <a:schemeClr val="tx1">
-            <a:lumMod val="50000"/>
-            <a:lumOff val="50000"/>
-          </a:schemeClr>
-        </a:solidFill>
-        <a:round/>
-      </a:ln>
-    </cs:spPr>
-  </cs:hiLoLine>
-  <cs:leaderLine>
-    <cs:lnRef idx="0"/>
-    <cs:fillRef idx="0"/>
-    <cs:effectRef idx="0"/>
-    <cs:fontRef idx="minor">
-      <a:schemeClr val="tx1"/>
-    </cs:fontRef>
-    <cs:spPr>
-      <a:ln w="9525" cap="flat" cmpd="sng" algn="ctr">
-        <a:solidFill>
-          <a:schemeClr val="tx1">
-            <a:lumMod val="35000"/>
-            <a:lumOff val="65000"/>
-          </a:schemeClr>
-        </a:solidFill>
-        <a:round/>
-      </a:ln>
-    </cs:spPr>
-  </cs:leaderLine>
-  <cs:legend>
-    <cs:lnRef idx="0"/>
-    <cs:fillRef idx="0"/>
-    <cs:effectRef idx="0"/>
-    <cs:fontRef idx="minor">
-      <a:schemeClr val="tx1">
-        <a:lumMod val="65000"/>
-        <a:lumOff val="35000"/>
-      </a:schemeClr>
-    </cs:fontRef>
-    <cs:defRPr sz="900" kern="1200"/>
-  </cs:legend>
-  <cs:plotArea mods="allowNoFillOverride allowNoLineOverride">
-    <cs:lnRef idx="0"/>
-    <cs:fillRef idx="0"/>
-    <cs:effectRef idx="0"/>
-    <cs:fontRef idx="minor">
-      <a:schemeClr val="tx1"/>
-    </cs:fontRef>
-  </cs:plotArea>
-  <cs:plotArea3D mods="allowNoFillOverride allowNoLineOverride">
-    <cs:lnRef idx="0"/>
-    <cs:fillRef idx="0"/>
-    <cs:effectRef idx="0"/>
-    <cs:fontRef idx="minor">
-      <a:schemeClr val="tx1"/>
-    </cs:fontRef>
-  </cs:plotArea3D>
-  <cs:seriesAxis>
-    <cs:lnRef idx="0"/>
-    <cs:fillRef idx="0"/>
-    <cs:effectRef idx="0"/>
-    <cs:fontRef idx="minor">
-      <a:schemeClr val="tx1">
-        <a:lumMod val="65000"/>
-        <a:lumOff val="35000"/>
-      </a:schemeClr>
-    </cs:fontRef>
-    <cs:defRPr sz="900" kern="1200"/>
-  </cs:seriesAxis>
-  <cs:seriesLine>
-    <cs:lnRef idx="0"/>
-    <cs:fillRef idx="0"/>
-    <cs:effectRef idx="0"/>
-    <cs:fontRef idx="minor">
-      <a:schemeClr val="tx1"/>
-    </cs:fontRef>
-    <cs:spPr>
-      <a:ln w="9525" cap="flat" cmpd="sng" algn="ctr">
-        <a:solidFill>
-          <a:schemeClr val="tx1">
-            <a:lumMod val="35000"/>
-            <a:lumOff val="65000"/>
-          </a:schemeClr>
-        </a:solidFill>
-        <a:round/>
-      </a:ln>
-    </cs:spPr>
-  </cs:seriesLine>
-  <cs:title>
-    <cs:lnRef idx="0"/>
-    <cs:fillRef idx="0"/>
-    <cs:effectRef idx="0"/>
-    <cs:fontRef idx="minor">
-      <a:schemeClr val="tx1">
-        <a:lumMod val="65000"/>
-        <a:lumOff val="35000"/>
-      </a:schemeClr>
-    </cs:fontRef>
-    <cs:defRPr sz="1400" b="0" kern="1200" spc="0" baseline="0"/>
-  </cs:title>
-  <cs:trendline>
-    <cs:lnRef idx="0">
-      <cs:styleClr val="auto"/>
-    </cs:lnRef>
-    <cs:fillRef idx="0"/>
-    <cs:effectRef idx="0"/>
-    <cs:fontRef idx="minor">
-      <a:schemeClr val="tx1"/>
-    </cs:fontRef>
-    <cs:spPr>
-      <a:ln w="19050" cap="rnd">
-        <a:solidFill>
-          <a:schemeClr val="phClr"/>
-        </a:solidFill>
-        <a:prstDash val="sysDot"/>
-      </a:ln>
-    </cs:spPr>
-  </cs:trendline>
-  <cs:trendlineLabel>
-    <cs:lnRef idx="0"/>
-    <cs:fillRef idx="0"/>
-    <cs:effectRef idx="0"/>
-    <cs:fontRef idx="minor">
-      <a:schemeClr val="tx1">
-        <a:lumMod val="65000"/>
-        <a:lumOff val="35000"/>
-      </a:schemeClr>
-    </cs:fontRef>
-    <cs:defRPr sz="900" kern="1200"/>
-  </cs:trendlineLabel>
-  <cs:upBar>
-    <cs:lnRef idx="0"/>
-    <cs:fillRef idx="0"/>
-    <cs:effectRef idx="0"/>
-    <cs:fontRef idx="minor">
-      <a:schemeClr val="tx1"/>
-    </cs:fontRef>
-    <cs:spPr>
-      <a:solidFill>
-        <a:schemeClr val="lt1"/>
-      </a:solidFill>
-      <a:ln w="9525" cap="flat" cmpd="sng" algn="ctr">
-        <a:solidFill>
-          <a:schemeClr val="tx1">
-            <a:lumMod val="65000"/>
-            <a:lumOff val="35000"/>
-          </a:schemeClr>
-        </a:solidFill>
-        <a:round/>
-      </a:ln>
-    </cs:spPr>
-  </cs:upBar>
-  <cs:valueAxis>
-    <cs:lnRef idx="0"/>
-    <cs:fillRef idx="0"/>
-    <cs:effectRef idx="0"/>
-    <cs:fontRef idx="minor">
-      <a:schemeClr val="tx1">
-        <a:lumMod val="65000"/>
-        <a:lumOff val="35000"/>
-      </a:schemeClr>
-    </cs:fontRef>
-    <cs:spPr>
-      <a:ln w="9525" cap="flat" cmpd="sng" algn="ctr">
-        <a:solidFill>
-          <a:schemeClr val="tx1">
-            <a:lumMod val="25000"/>
-            <a:lumOff val="75000"/>
-          </a:schemeClr>
-        </a:solidFill>
-        <a:round/>
-      </a:ln>
-    </cs:spPr>
-    <cs:defRPr sz="900" kern="1200"/>
-  </cs:valueAxis>
-  <cs:wall>
-    <cs:lnRef idx="0"/>
-    <cs:fillRef idx="0"/>
-    <cs:effectRef idx="0"/>
-    <cs:fontRef idx="minor">
-      <a:schemeClr val="tx1"/>
-    </cs:fontRef>
-    <cs:spPr>
-      <a:noFill/>
-      <a:ln>
-        <a:noFill/>
-      </a:ln>
-    </cs:spPr>
-  </cs:wall>
-</cs:chartStyle>
 </file>
 
 <file path=ppt/diagrams/colors1.xml><?xml version="1.0" encoding="utf-8"?>
@@ -4840,7 +1341,9 @@
       </dgm:spPr>
       <dgm:extLst>
         <a:ext uri="{E40237B7-FDA0-4F09-8148-C483321AD2D9}">
-          <dgm14:cNvPr xmlns:dgm14="http://schemas.microsoft.com/office/drawing/2010/diagram" id="0" name="" descr="Stopwatch"/>
+          <dgm14:cNvPr xmlns:dgm14="http://schemas.microsoft.com/office/drawing/2010/diagram" id="0" name="" descr="Stopwatch">
+            <a:hlinkClick xmlns:r="http://schemas.openxmlformats.org/officeDocument/2006/relationships" r:id="rId8"/>
+          </dgm14:cNvPr>
         </a:ext>
       </dgm:extLst>
     </dgm:pt>
@@ -7076,7 +3579,7 @@
           <a:p>
             <a:fld id="{EA0C0817-A112-4847-8014-A94B7D2A4EA3}" type="datetime1">
               <a:rPr lang="en-US" smtClean="0"/>
-              <a:t>6/16/2020</a:t>
+              <a:t>6/18/2020</a:t>
             </a:fld>
             <a:endParaRPr lang="en-US" dirty="0"/>
           </a:p>
@@ -7278,7 +3781,7 @@
           <a:p>
             <a:fld id="{7332B432-ACDA-4023-A761-2BAB76577B62}" type="datetime1">
               <a:rPr lang="en-US" smtClean="0"/>
-              <a:t>6/16/2020</a:t>
+              <a:t>6/18/2020</a:t>
             </a:fld>
             <a:endParaRPr lang="en-US" dirty="0"/>
           </a:p>
@@ -7877,7 +4380,7 @@
           <a:p>
             <a:fld id="{D9C646AA-F36E-4540-911D-FFFC0A0EF24A}" type="datetime1">
               <a:rPr lang="en-US" smtClean="0"/>
-              <a:t>6/16/2020</a:t>
+              <a:t>6/18/2020</a:t>
             </a:fld>
             <a:endParaRPr lang="en-US" dirty="0"/>
           </a:p>
@@ -8197,7 +4700,7 @@
           <a:p>
             <a:fld id="{69186D26-FA5F-4637-B602-B7C2DC34CFD4}" type="datetime1">
               <a:rPr lang="en-US" smtClean="0"/>
-              <a:t>6/16/2020</a:t>
+              <a:t>6/18/2020</a:t>
             </a:fld>
             <a:endParaRPr lang="en-US" dirty="0"/>
           </a:p>
@@ -8634,7 +5137,7 @@
           <a:p>
             <a:fld id="{8A7F15D8-96D1-4781-BC50-CA8A088B2FE4}" type="datetime1">
               <a:rPr lang="en-US" smtClean="0"/>
-              <a:t>6/16/2020</a:t>
+              <a:t>6/18/2020</a:t>
             </a:fld>
             <a:endParaRPr lang="en-US" dirty="0"/>
           </a:p>
@@ -8752,7 +5255,7 @@
           <a:p>
             <a:fld id="{F9A96C99-B8F8-4528-BD05-0E16E943DC09}" type="datetime1">
               <a:rPr lang="en-US" smtClean="0"/>
-              <a:t>6/16/2020</a:t>
+              <a:t>6/18/2020</a:t>
             </a:fld>
             <a:endParaRPr lang="en-US" dirty="0"/>
           </a:p>
@@ -8847,7 +5350,7 @@
           <a:p>
             <a:fld id="{03636942-C211-4B28-8DBD-C953E00AF71B}" type="datetime1">
               <a:rPr lang="en-US" smtClean="0"/>
-              <a:t>6/16/2020</a:t>
+              <a:t>6/18/2020</a:t>
             </a:fld>
             <a:endParaRPr lang="en-US" dirty="0"/>
           </a:p>
@@ -9264,7 +5767,7 @@
           <a:p>
             <a:fld id="{7E8D12A6-918A-48BD-8CB9-CA713993B0EA}" type="datetime1">
               <a:rPr lang="en-US" smtClean="0"/>
-              <a:t>6/16/2020</a:t>
+              <a:t>6/18/2020</a:t>
             </a:fld>
             <a:endParaRPr lang="en-US" dirty="0"/>
           </a:p>
@@ -9526,7 +6029,7 @@
             <a:fld id="{E778CE86-875F-4587-BCF6-FA054AFC0D53}" type="datetime1">
               <a:rPr lang="en-US" smtClean="0"/>
               <a:pPr/>
-              <a:t>6/16/2020</a:t>
+              <a:t>6/18/2020</a:t>
             </a:fld>
             <a:endParaRPr lang="en-US" dirty="0"/>
           </a:p>
@@ -10042,7 +6545,7 @@
           <a:p>
             <a:fld id="{F6FA2B21-3FCD-4721-B95C-427943F61125}" type="datetime1">
               <a:rPr lang="en-US" smtClean="0"/>
-              <a:t>6/16/2020</a:t>
+              <a:t>6/18/2020</a:t>
             </a:fld>
             <a:endParaRPr lang="en-US" dirty="0"/>
           </a:p>
@@ -10756,6 +7259,104 @@
       </p:grpSpPr>
       <p:sp>
         <p:nvSpPr>
+          <p:cNvPr id="2" name="Picture Placeholder 1">
+            <a:extLst>
+              <a:ext uri="{FF2B5EF4-FFF2-40B4-BE49-F238E27FC236}">
+                <a16:creationId xmlns:a16="http://schemas.microsoft.com/office/drawing/2014/main" id="{3B4D1DC1-B996-4266-96F3-161C80576AF3}"/>
+              </a:ext>
+            </a:extLst>
+          </p:cNvPr>
+          <p:cNvSpPr>
+            <a:spLocks noGrp="1"/>
+          </p:cNvSpPr>
+          <p:nvPr>
+            <p:ph type="pic" idx="1"/>
+          </p:nvPr>
+        </p:nvSpPr>
+        <p:spPr/>
+      </p:sp>
+      <p:sp>
+        <p:nvSpPr>
+          <p:cNvPr id="3" name="Title 2">
+            <a:extLst>
+              <a:ext uri="{FF2B5EF4-FFF2-40B4-BE49-F238E27FC236}">
+                <a16:creationId xmlns:a16="http://schemas.microsoft.com/office/drawing/2014/main" id="{753D0EC6-67F3-4611-B990-1174C22AE9D6}"/>
+              </a:ext>
+            </a:extLst>
+          </p:cNvPr>
+          <p:cNvSpPr>
+            <a:spLocks noGrp="1"/>
+          </p:cNvSpPr>
+          <p:nvPr>
+            <p:ph type="title"/>
+          </p:nvPr>
+        </p:nvSpPr>
+        <p:spPr/>
+        <p:txBody>
+          <a:bodyPr/>
+          <a:lstStyle/>
+          <a:p>
+            <a:endParaRPr lang="en-US"/>
+          </a:p>
+        </p:txBody>
+      </p:sp>
+      <p:sp>
+        <p:nvSpPr>
+          <p:cNvPr id="4" name="Text Placeholder 3">
+            <a:extLst>
+              <a:ext uri="{FF2B5EF4-FFF2-40B4-BE49-F238E27FC236}">
+                <a16:creationId xmlns:a16="http://schemas.microsoft.com/office/drawing/2014/main" id="{DAAC1E2C-A6B2-4FC9-9E03-A586DAEB1DDA}"/>
+              </a:ext>
+            </a:extLst>
+          </p:cNvPr>
+          <p:cNvSpPr>
+            <a:spLocks noGrp="1"/>
+          </p:cNvSpPr>
+          <p:nvPr>
+            <p:ph type="body" sz="half" idx="2"/>
+          </p:nvPr>
+        </p:nvSpPr>
+        <p:spPr/>
+        <p:txBody>
+          <a:bodyPr/>
+          <a:lstStyle/>
+          <a:p>
+            <a:endParaRPr lang="en-US"/>
+          </a:p>
+        </p:txBody>
+      </p:sp>
+    </p:spTree>
+    <p:extLst>
+      <p:ext uri="{BB962C8B-B14F-4D97-AF65-F5344CB8AC3E}">
+        <p14:creationId xmlns:p14="http://schemas.microsoft.com/office/powerpoint/2010/main" val="57412028"/>
+      </p:ext>
+    </p:extLst>
+  </p:cSld>
+  <p:clrMapOvr>
+    <a:masterClrMapping/>
+  </p:clrMapOvr>
+</p:sld>
+</file>
+
+<file path=ppt/slides/slide11.xml><?xml version="1.0" encoding="utf-8"?>
+<p:sld xmlns:a="http://schemas.openxmlformats.org/drawingml/2006/main" xmlns:r="http://schemas.openxmlformats.org/officeDocument/2006/relationships" xmlns:p="http://schemas.openxmlformats.org/presentationml/2006/main">
+  <p:cSld>
+    <p:spTree>
+      <p:nvGrpSpPr>
+        <p:cNvPr id="1" name=""/>
+        <p:cNvGrpSpPr/>
+        <p:nvPr/>
+      </p:nvGrpSpPr>
+      <p:grpSpPr>
+        <a:xfrm>
+          <a:off x="0" y="0"/>
+          <a:ext cx="0" cy="0"/>
+          <a:chOff x="0" y="0"/>
+          <a:chExt cx="0" cy="0"/>
+        </a:xfrm>
+      </p:grpSpPr>
+      <p:sp>
+        <p:nvSpPr>
           <p:cNvPr id="2" name="Title 1">
             <a:extLst>
               <a:ext uri="{FF2B5EF4-FFF2-40B4-BE49-F238E27FC236}">
@@ -10947,7 +7548,7 @@
 </p:sld>
 </file>
 
-<file path=ppt/slides/slide11.xml><?xml version="1.0" encoding="utf-8"?>
+<file path=ppt/slides/slide12.xml><?xml version="1.0" encoding="utf-8"?>
 <p:sld xmlns:a="http://schemas.openxmlformats.org/drawingml/2006/main" xmlns:r="http://schemas.openxmlformats.org/officeDocument/2006/relationships" xmlns:p="http://schemas.openxmlformats.org/presentationml/2006/main">
   <p:cSld>
     <p:spTree>
@@ -11013,6 +7614,91 @@
           <a:bodyPr/>
           <a:lstStyle/>
           <a:p>
+            <a:r>
+              <a:rPr lang="en-US" dirty="0"/>
+              <a:t>US Census data: </a:t>
+            </a:r>
+            <a:r>
+              <a:rPr lang="en-US" dirty="0">
+                <a:hlinkClick r:id="rId2"/>
+              </a:rPr>
+              <a:t>https://data.census.gov/cedsci/</a:t>
+            </a:r>
+            <a:endParaRPr lang="en-US" dirty="0"/>
+          </a:p>
+          <a:p>
+            <a:r>
+              <a:rPr lang="en-US" dirty="0"/>
+              <a:t>Used for US Population Forecast population through 2050 – web scrapping technique used:</a:t>
+            </a:r>
+            <a:br>
+              <a:rPr lang="en-US" dirty="0"/>
+            </a:br>
+            <a:r>
+              <a:rPr lang="en-US" dirty="0">
+                <a:hlinkClick r:id="rId3"/>
+              </a:rPr>
+              <a:t>https://www.worldometers.info/world-population/us-population/</a:t>
+            </a:r>
+            <a:endParaRPr lang="en-US" dirty="0"/>
+          </a:p>
+          <a:p>
+            <a:endParaRPr lang="en-US" dirty="0"/>
+          </a:p>
+          <a:p>
+            <a:r>
+              <a:rPr lang="en-US" dirty="0"/>
+              <a:t>SNAP Supplemental Nutritional Assistance Program</a:t>
+            </a:r>
+          </a:p>
+          <a:p>
+            <a:r>
+              <a:rPr lang="en-US" dirty="0">
+                <a:hlinkClick r:id="rId4"/>
+              </a:rPr>
+              <a:t>Snap program data page</a:t>
+            </a:r>
+            <a:endParaRPr lang="en-US" dirty="0"/>
+          </a:p>
+          <a:p>
+            <a:r>
+              <a:rPr lang="en-US" dirty="0"/>
+              <a:t> </a:t>
+            </a:r>
+            <a:r>
+              <a:rPr lang="en-US" dirty="0">
+                <a:hlinkClick r:id="rId5"/>
+              </a:rPr>
+              <a:t>https://www.fns.usda.gov/research-analysis</a:t>
+            </a:r>
+            <a:endParaRPr lang="en-US" dirty="0"/>
+          </a:p>
+          <a:p>
+            <a:r>
+              <a:rPr lang="en-US" dirty="0"/>
+              <a:t> </a:t>
+            </a:r>
+            <a:r>
+              <a:rPr lang="en-US" dirty="0">
+                <a:hlinkClick r:id="rId6"/>
+              </a:rPr>
+              <a:t>https://www.fns.usda.gov/pd/child-nutrition-tables</a:t>
+            </a:r>
+            <a:endParaRPr lang="en-US" dirty="0"/>
+          </a:p>
+          <a:p>
+            <a:r>
+              <a:rPr lang="en-US" dirty="0"/>
+              <a:t>WIC</a:t>
+            </a:r>
+          </a:p>
+          <a:p>
+            <a:r>
+              <a:rPr lang="en-US" dirty="0">
+                <a:hlinkClick r:id="rId7"/>
+              </a:rPr>
+              <a:t>https://www.fns.usda.gov/wic/frequently-asked-questions-about-wic</a:t>
+            </a:r>
             <a:endParaRPr lang="en-US" dirty="0"/>
           </a:p>
         </p:txBody>
@@ -11030,7 +7716,318 @@
 </p:sld>
 </file>
 
-<file path=ppt/slides/slide12.xml><?xml version="1.0" encoding="utf-8"?>
+<file path=ppt/slides/slide13.xml><?xml version="1.0" encoding="utf-8"?>
+<p:sld xmlns:a="http://schemas.openxmlformats.org/drawingml/2006/main" xmlns:r="http://schemas.openxmlformats.org/officeDocument/2006/relationships" xmlns:p="http://schemas.openxmlformats.org/presentationml/2006/main">
+  <p:cSld>
+    <p:spTree>
+      <p:nvGrpSpPr>
+        <p:cNvPr id="1" name=""/>
+        <p:cNvGrpSpPr/>
+        <p:nvPr/>
+      </p:nvGrpSpPr>
+      <p:grpSpPr>
+        <a:xfrm>
+          <a:off x="0" y="0"/>
+          <a:ext cx="0" cy="0"/>
+          <a:chOff x="0" y="0"/>
+          <a:chExt cx="0" cy="0"/>
+        </a:xfrm>
+      </p:grpSpPr>
+      <p:sp>
+        <p:nvSpPr>
+          <p:cNvPr id="2" name="Title 1">
+            <a:extLst>
+              <a:ext uri="{FF2B5EF4-FFF2-40B4-BE49-F238E27FC236}">
+                <a16:creationId xmlns:a16="http://schemas.microsoft.com/office/drawing/2014/main" id="{2E8F5975-87ED-4A9C-B5CB-262A2E0F3906}"/>
+              </a:ext>
+            </a:extLst>
+          </p:cNvPr>
+          <p:cNvSpPr>
+            <a:spLocks noGrp="1"/>
+          </p:cNvSpPr>
+          <p:nvPr>
+            <p:ph type="title"/>
+          </p:nvPr>
+        </p:nvSpPr>
+        <p:spPr/>
+        <p:txBody>
+          <a:bodyPr/>
+          <a:lstStyle/>
+          <a:p>
+            <a:r>
+              <a:rPr lang="en-US" dirty="0"/>
+              <a:t>Sources</a:t>
+            </a:r>
+          </a:p>
+        </p:txBody>
+      </p:sp>
+      <p:sp>
+        <p:nvSpPr>
+          <p:cNvPr id="3" name="Content Placeholder 2">
+            <a:extLst>
+              <a:ext uri="{FF2B5EF4-FFF2-40B4-BE49-F238E27FC236}">
+                <a16:creationId xmlns:a16="http://schemas.microsoft.com/office/drawing/2014/main" id="{770A82F1-0CBD-4A4C-A646-09C9BC09A4FE}"/>
+              </a:ext>
+            </a:extLst>
+          </p:cNvPr>
+          <p:cNvSpPr>
+            <a:spLocks noGrp="1"/>
+          </p:cNvSpPr>
+          <p:nvPr>
+            <p:ph idx="1"/>
+          </p:nvPr>
+        </p:nvSpPr>
+        <p:spPr/>
+        <p:txBody>
+          <a:bodyPr>
+            <a:normAutofit fontScale="92500" lnSpcReduction="10000"/>
+          </a:bodyPr>
+          <a:lstStyle/>
+          <a:p>
+            <a:pPr marL="0" indent="0">
+              <a:buNone/>
+            </a:pPr>
+            <a:r>
+              <a:rPr lang="en-US" b="1" dirty="0">
+                <a:hlinkClick r:id="rId2"/>
+              </a:rPr>
+              <a:t>National School Lunch Program </a:t>
+            </a:r>
+            <a:endParaRPr lang="en-US" dirty="0"/>
+          </a:p>
+          <a:p>
+            <a:r>
+              <a:rPr lang="en-US" dirty="0"/>
+              <a:t>The National School Lunch Program (NSLP) is a federally assisted meal program operating in public and nonprofit private schools and residential child care institutions. It provides nutritionally balanced, low-cost or free lunches to children each school day. The program was established under the National School Lunch Act, signed by President Harry Truman in 1946.</a:t>
+            </a:r>
+          </a:p>
+          <a:p>
+            <a:pPr marL="0" indent="0">
+              <a:buNone/>
+            </a:pPr>
+            <a:r>
+              <a:rPr lang="en-US" b="1" dirty="0">
+                <a:hlinkClick r:id="rId3"/>
+              </a:rPr>
+              <a:t>School Breakfast Program</a:t>
+            </a:r>
+            <a:endParaRPr lang="en-US" dirty="0"/>
+          </a:p>
+          <a:p>
+            <a:r>
+              <a:rPr lang="en-US" dirty="0"/>
+              <a:t>The School Breakfast Program (SBP) provides reimbursement to states to operate nonprofit breakfast programs in schools and residential childcare institutions. The Food and Nutrition Service administers the SBP at the federal level. State education agencies administer the SBP at the state level, and local school food authorities operate the program in schools.</a:t>
+            </a:r>
+          </a:p>
+          <a:p>
+            <a:pPr marL="0" indent="0">
+              <a:buNone/>
+            </a:pPr>
+            <a:r>
+              <a:rPr lang="en-US" b="1" dirty="0">
+                <a:hlinkClick r:id="rId4"/>
+              </a:rPr>
+              <a:t>Summer Food Service Program</a:t>
+            </a:r>
+            <a:endParaRPr lang="en-US" dirty="0"/>
+          </a:p>
+          <a:p>
+            <a:r>
+              <a:rPr lang="en-US" dirty="0"/>
+              <a:t>The Summer Food Service Program (SFSP) is a federally-funded, state-administered program. SFSP reimburses program operators who serve free healthy meals and snacks to children and teens in low-income areas.</a:t>
+            </a:r>
+          </a:p>
+          <a:p>
+            <a:pPr marL="0" indent="0">
+              <a:buNone/>
+            </a:pPr>
+            <a:r>
+              <a:rPr lang="en-US" dirty="0"/>
+              <a:t> </a:t>
+            </a:r>
+            <a:r>
+              <a:rPr lang="en-US" i="1" dirty="0"/>
+              <a:t>From &lt;</a:t>
+            </a:r>
+            <a:r>
+              <a:rPr lang="en-US" i="1" dirty="0">
+                <a:hlinkClick r:id="rId5"/>
+              </a:rPr>
+              <a:t>https://www.fns.usda.gov/cn</a:t>
+            </a:r>
+            <a:r>
+              <a:rPr lang="en-US" i="1" dirty="0"/>
+              <a:t>&gt; </a:t>
+            </a:r>
+            <a:endParaRPr lang="en-US" dirty="0"/>
+          </a:p>
+          <a:p>
+            <a:endParaRPr lang="en-US" dirty="0"/>
+          </a:p>
+          <a:p>
+            <a:endParaRPr lang="en-US" dirty="0"/>
+          </a:p>
+        </p:txBody>
+      </p:sp>
+    </p:spTree>
+    <p:extLst>
+      <p:ext uri="{BB962C8B-B14F-4D97-AF65-F5344CB8AC3E}">
+        <p14:creationId xmlns:p14="http://schemas.microsoft.com/office/powerpoint/2010/main" val="3939926904"/>
+      </p:ext>
+    </p:extLst>
+  </p:cSld>
+  <p:clrMapOvr>
+    <a:masterClrMapping/>
+  </p:clrMapOvr>
+</p:sld>
+</file>
+
+<file path=ppt/slides/slide14.xml><?xml version="1.0" encoding="utf-8"?>
+<p:sld xmlns:a="http://schemas.openxmlformats.org/drawingml/2006/main" xmlns:r="http://schemas.openxmlformats.org/officeDocument/2006/relationships" xmlns:p="http://schemas.openxmlformats.org/presentationml/2006/main">
+  <p:cSld>
+    <p:spTree>
+      <p:nvGrpSpPr>
+        <p:cNvPr id="1" name=""/>
+        <p:cNvGrpSpPr/>
+        <p:nvPr/>
+      </p:nvGrpSpPr>
+      <p:grpSpPr>
+        <a:xfrm>
+          <a:off x="0" y="0"/>
+          <a:ext cx="0" cy="0"/>
+          <a:chOff x="0" y="0"/>
+          <a:chExt cx="0" cy="0"/>
+        </a:xfrm>
+      </p:grpSpPr>
+      <p:sp>
+        <p:nvSpPr>
+          <p:cNvPr id="2" name="Title 1">
+            <a:extLst>
+              <a:ext uri="{FF2B5EF4-FFF2-40B4-BE49-F238E27FC236}">
+                <a16:creationId xmlns:a16="http://schemas.microsoft.com/office/drawing/2014/main" id="{2E8F5975-87ED-4A9C-B5CB-262A2E0F3906}"/>
+              </a:ext>
+            </a:extLst>
+          </p:cNvPr>
+          <p:cNvSpPr>
+            <a:spLocks noGrp="1"/>
+          </p:cNvSpPr>
+          <p:nvPr>
+            <p:ph type="title"/>
+          </p:nvPr>
+        </p:nvSpPr>
+        <p:spPr/>
+        <p:txBody>
+          <a:bodyPr/>
+          <a:lstStyle/>
+          <a:p>
+            <a:r>
+              <a:rPr lang="en-US" dirty="0"/>
+              <a:t>Sources</a:t>
+            </a:r>
+          </a:p>
+        </p:txBody>
+      </p:sp>
+      <p:sp>
+        <p:nvSpPr>
+          <p:cNvPr id="3" name="Content Placeholder 2">
+            <a:extLst>
+              <a:ext uri="{FF2B5EF4-FFF2-40B4-BE49-F238E27FC236}">
+                <a16:creationId xmlns:a16="http://schemas.microsoft.com/office/drawing/2014/main" id="{770A82F1-0CBD-4A4C-A646-09C9BC09A4FE}"/>
+              </a:ext>
+            </a:extLst>
+          </p:cNvPr>
+          <p:cNvSpPr>
+            <a:spLocks noGrp="1"/>
+          </p:cNvSpPr>
+          <p:nvPr>
+            <p:ph idx="1"/>
+          </p:nvPr>
+        </p:nvSpPr>
+        <p:spPr/>
+        <p:txBody>
+          <a:bodyPr>
+            <a:normAutofit lnSpcReduction="10000"/>
+          </a:bodyPr>
+          <a:lstStyle/>
+          <a:p>
+            <a:pPr marL="0" indent="0">
+              <a:buNone/>
+            </a:pPr>
+            <a:r>
+              <a:rPr lang="en-US" b="1" dirty="0">
+                <a:hlinkClick r:id="rId2"/>
+              </a:rPr>
+              <a:t>Special Milk Program</a:t>
+            </a:r>
+            <a:r>
+              <a:rPr lang="en-US" b="1" dirty="0"/>
+              <a:t> </a:t>
+            </a:r>
+            <a:endParaRPr lang="en-US" dirty="0"/>
+          </a:p>
+          <a:p>
+            <a:r>
+              <a:rPr lang="en-US" dirty="0"/>
+              <a:t>The Special Milk Program (SMP) provides milk to children in schools and childcare institutions who do not participate in other federal meal service programs. The program reimburses schools for the milk they serve. Schools in the </a:t>
+            </a:r>
+            <a:r>
+              <a:rPr lang="en-US" dirty="0">
+                <a:hlinkClick r:id="rId3"/>
+              </a:rPr>
+              <a:t>National School Lunch</a:t>
+            </a:r>
+            <a:r>
+              <a:rPr lang="en-US" dirty="0"/>
+              <a:t> or </a:t>
+            </a:r>
+            <a:r>
+              <a:rPr lang="en-US" dirty="0">
+                <a:hlinkClick r:id="rId4"/>
+              </a:rPr>
+              <a:t>School Breakfast Programs</a:t>
+            </a:r>
+            <a:r>
+              <a:rPr lang="en-US" dirty="0"/>
+              <a:t> may also participate in the Special  Milk Program to provide milk to children in half-day pre-kindergarten and kindergarten programs where children do not have access to the school meal programs.</a:t>
+            </a:r>
+          </a:p>
+          <a:p>
+            <a:pPr marL="0" indent="0">
+              <a:buNone/>
+            </a:pPr>
+            <a:r>
+              <a:rPr lang="en-US" b="1" dirty="0">
+                <a:hlinkClick r:id="rId5"/>
+              </a:rPr>
+              <a:t>Child and Adult Care Food Program</a:t>
+            </a:r>
+            <a:endParaRPr lang="en-US" dirty="0"/>
+          </a:p>
+          <a:p>
+            <a:r>
+              <a:rPr lang="en-US" dirty="0"/>
+              <a:t>The Child and Adult Care Food Program (CACFP) is a federal program that provides reimbursements for nutritious meals and snacks to eligible children and adults who are enrolled for care at participating child care centers, day care homes, and adult day care centers. CACFP also provides reimbursements for meals served to children and youth participating in afterschool care programs, children residing in emergency shelters, adults over the age of 60 or living with a disability and enrolled in day care facilities. CACFP contributes to the wellness, healthy growth, and development of young children and adults in the United States.</a:t>
+            </a:r>
+          </a:p>
+          <a:p>
+            <a:endParaRPr lang="en-US" dirty="0"/>
+          </a:p>
+        </p:txBody>
+      </p:sp>
+    </p:spTree>
+    <p:extLst>
+      <p:ext uri="{BB962C8B-B14F-4D97-AF65-F5344CB8AC3E}">
+        <p14:creationId xmlns:p14="http://schemas.microsoft.com/office/powerpoint/2010/main" val="2339129925"/>
+      </p:ext>
+    </p:extLst>
+  </p:cSld>
+  <p:clrMapOvr>
+    <a:masterClrMapping/>
+  </p:clrMapOvr>
+</p:sld>
+</file>
+
+<file path=ppt/slides/slide15.xml><?xml version="1.0" encoding="utf-8"?>
 <p:sld xmlns:a="http://schemas.openxmlformats.org/drawingml/2006/main" xmlns:r="http://schemas.openxmlformats.org/officeDocument/2006/relationships" xmlns:p="http://schemas.openxmlformats.org/presentationml/2006/main">
   <p:cSld>
     <p:spTree>
@@ -11214,7 +8211,7 @@
             <p:ph idx="1"/>
             <p:extLst>
               <p:ext uri="{D42A27DB-BD31-4B8C-83A1-F6EECF244321}">
-                <p14:modId xmlns:p14="http://schemas.microsoft.com/office/powerpoint/2010/main" val="2786834153"/>
+                <p14:modId xmlns:p14="http://schemas.microsoft.com/office/powerpoint/2010/main" val="3604976668"/>
               </p:ext>
             </p:extLst>
           </p:nvPr>
@@ -11310,13 +8307,13 @@
           <a:p>
             <a:r>
               <a:rPr lang="en-US" sz="2000" dirty="0"/>
-              <a:t>Tools used Python, Power BI, Tableau, Excel </a:t>
+              <a:t>Tools used Python, Tableau, Excel </a:t>
             </a:r>
           </a:p>
           <a:p>
             <a:r>
               <a:rPr lang="en-US" sz="2000" dirty="0"/>
-              <a:t>To use a correlation plot I installed an R package in Power BI </a:t>
+              <a:t>Power BI (correlation plot R package) </a:t>
             </a:r>
             <a:endParaRPr lang="en-US" sz="2800" dirty="0"/>
           </a:p>
@@ -11584,7 +8581,7 @@
                 <a:latin typeface="Arial" panose="020B0604020202020204" pitchFamily="34" charset="0"/>
                 <a:cs typeface="Arial" panose="020B0604020202020204" pitchFamily="34" charset="0"/>
               </a:rPr>
-              <a:t>adding electronic benefit access in 1984, and peaking at 47 million in 2013, </a:t>
+              <a:t>Electronic benefit access in 1984, and peaking at 47 million in 2013, </a:t>
             </a:r>
           </a:p>
           <a:p>
@@ -11593,7 +8590,7 @@
                 <a:latin typeface="Arial" panose="020B0604020202020204" pitchFamily="34" charset="0"/>
                 <a:cs typeface="Arial" panose="020B0604020202020204" pitchFamily="34" charset="0"/>
               </a:rPr>
-              <a:t>then declining to the current level with 37 million SNAP recipients in February 2020.</a:t>
+              <a:t>Declining to the current level with 37 million SNAP recipients in February 2020.</a:t>
             </a:r>
           </a:p>
           <a:p>
@@ -11662,7 +8659,18 @@
               <a:rPr lang="en-US" dirty="0">
                 <a:latin typeface="+mn-lt"/>
               </a:rPr>
-              <a:t>Snap - Supplemental Nutrition Assistance Program - USDA</a:t>
+              <a:t>USDA Food and Nutrition Service</a:t>
+            </a:r>
+            <a:br>
+              <a:rPr lang="en-US" dirty="0">
+                <a:latin typeface="+mn-lt"/>
+              </a:rPr>
+            </a:br>
+            <a:r>
+              <a:rPr lang="en-US" sz="2800" dirty="0">
+                <a:latin typeface="+mn-lt"/>
+              </a:rPr>
+              <a:t>Federally assisted food programs</a:t>
             </a:r>
           </a:p>
         </p:txBody>
@@ -11686,19 +8694,27 @@
         <p:spPr/>
         <p:txBody>
           <a:bodyPr>
-            <a:normAutofit/>
+            <a:normAutofit fontScale="92500" lnSpcReduction="10000"/>
           </a:bodyPr>
           <a:lstStyle/>
           <a:p>
             <a:r>
+              <a:rPr lang="en-US" b="1" dirty="0"/>
+              <a:t>School Lunch program (NSLP) </a:t>
+            </a:r>
+            <a:r>
               <a:rPr lang="en-US" dirty="0"/>
-              <a:t>School Lunch program established in 1946, providing nutritionally balanced, low-cost or free lunches to children each school day</a:t>
-            </a:r>
-          </a:p>
-          <a:p>
+              <a:t>established in 1946, with the National School Lunch Act providing nutritionally balanced, low-cost or free lunches to children each school day in public and nonprofit private schools and residential childcare institutions</a:t>
+            </a:r>
+          </a:p>
+          <a:p>
+            <a:r>
+              <a:rPr lang="en-US" b="1" dirty="0"/>
+              <a:t>School Breakfast Program (SBP) </a:t>
+            </a:r>
             <a:r>
               <a:rPr lang="en-US" dirty="0"/>
-              <a:t>School Breakfast Program (SBP) provides reimbursement to states to operate nonprofit breakfast programs in schools and residential childcare institutions.</a:t>
+              <a:t>provides reimbursement to states to operate nonprofit breakfast programs in schools and residential childcare institutions.</a:t>
             </a:r>
           </a:p>
           <a:p>
@@ -11706,8 +8722,12 @@
           </a:p>
           <a:p>
             <a:r>
+              <a:rPr lang="en-US" b="1" dirty="0"/>
+              <a:t>The Child and Adult Care Food Program (CACFP) </a:t>
+            </a:r>
+            <a:r>
               <a:rPr lang="en-US" dirty="0"/>
-              <a:t>The Special Milk Program (SMP) provides milk to children in schools and childcare institutions who do not participate in other federal meal service programs.</a:t>
+              <a:t>is a federal program that provides reimbursements for nutritious meals and snacks to eligible children and adults who are enrolled for care at participating childcare centers, day care homes, and adult day care centers.</a:t>
             </a:r>
           </a:p>
           <a:p>
@@ -11715,9 +8735,19 @@
           </a:p>
           <a:p>
             <a:r>
+              <a:rPr lang="en-US" b="1" dirty="0"/>
+              <a:t>The Special Milk Program (SMP) </a:t>
+            </a:r>
+            <a:r>
               <a:rPr lang="en-US" dirty="0"/>
-              <a:t>The Child and Adult Care Food Program (CACFP) is a federal program that provides reimbursements for nutritious meals and snacks to eligible children and adults who are enrolled for care at participating child care centers, day care homes, and adult day care centers.</a:t>
-            </a:r>
+              <a:t>provides milk to children in schools and childcare institutions who do not participate in other federal meal service programs.</a:t>
+            </a:r>
+          </a:p>
+          <a:p>
+            <a:pPr marL="0" indent="0">
+              <a:buNone/>
+            </a:pPr>
+            <a:endParaRPr lang="en-US" dirty="0"/>
           </a:p>
           <a:p>
             <a:r>
@@ -11881,37 +8911,36 @@
           <a:p>
             <a:r>
               <a:rPr lang="en-US" dirty="0"/>
-              <a:t>Timeline</a:t>
+              <a:t>Food away from Home trends</a:t>
             </a:r>
           </a:p>
         </p:txBody>
       </p:sp>
-      <p:graphicFrame>
-        <p:nvGraphicFramePr>
-          <p:cNvPr id="4" name="Content Placeholder 3">
+      <p:sp>
+        <p:nvSpPr>
+          <p:cNvPr id="5" name="Content Placeholder 4">
             <a:extLst>
               <a:ext uri="{FF2B5EF4-FFF2-40B4-BE49-F238E27FC236}">
-                <a16:creationId xmlns:a16="http://schemas.microsoft.com/office/drawing/2014/main" id="{9ABADFEF-045A-4271-B33C-DD6B26D6CF82}"/>
+                <a16:creationId xmlns:a16="http://schemas.microsoft.com/office/drawing/2014/main" id="{4BDA0F49-5DF2-4EDF-A30F-24DF220E4764}"/>
               </a:ext>
             </a:extLst>
           </p:cNvPr>
-          <p:cNvGraphicFramePr>
-            <a:graphicFrameLocks noGrp="1"/>
-          </p:cNvGraphicFramePr>
+          <p:cNvSpPr>
+            <a:spLocks noGrp="1"/>
+          </p:cNvSpPr>
           <p:nvPr>
             <p:ph idx="1"/>
           </p:nvPr>
-        </p:nvGraphicFramePr>
-        <p:xfrm>
-          <a:off x="1066800" y="2103438"/>
-          <a:ext cx="10058400" cy="3849687"/>
-        </p:xfrm>
-        <a:graphic>
-          <a:graphicData uri="http://schemas.openxmlformats.org/drawingml/2006/chart">
-            <c:chart xmlns:c="http://schemas.openxmlformats.org/drawingml/2006/chart" xmlns:r="http://schemas.openxmlformats.org/officeDocument/2006/relationships" r:id="rId2"/>
-          </a:graphicData>
-        </a:graphic>
-      </p:graphicFrame>
+        </p:nvSpPr>
+        <p:spPr/>
+        <p:txBody>
+          <a:bodyPr/>
+          <a:lstStyle/>
+          <a:p>
+            <a:endParaRPr lang="en-US" dirty="0"/>
+          </a:p>
+        </p:txBody>
+      </p:sp>
     </p:spTree>
     <p:extLst>
       <p:ext uri="{BB962C8B-B14F-4D97-AF65-F5344CB8AC3E}">
@@ -11944,28 +8973,10 @@
       </p:grpSpPr>
       <p:sp>
         <p:nvSpPr>
-          <p:cNvPr id="2" name="Picture Placeholder 1">
+          <p:cNvPr id="2" name="Title 1">
             <a:extLst>
               <a:ext uri="{FF2B5EF4-FFF2-40B4-BE49-F238E27FC236}">
-                <a16:creationId xmlns:a16="http://schemas.microsoft.com/office/drawing/2014/main" id="{3B4D1DC1-B996-4266-96F3-161C80576AF3}"/>
-              </a:ext>
-            </a:extLst>
-          </p:cNvPr>
-          <p:cNvSpPr>
-            <a:spLocks noGrp="1"/>
-          </p:cNvSpPr>
-          <p:nvPr>
-            <p:ph type="pic" idx="1"/>
-          </p:nvPr>
-        </p:nvSpPr>
-        <p:spPr/>
-      </p:sp>
-      <p:sp>
-        <p:nvSpPr>
-          <p:cNvPr id="3" name="Title 2">
-            <a:extLst>
-              <a:ext uri="{FF2B5EF4-FFF2-40B4-BE49-F238E27FC236}">
-                <a16:creationId xmlns:a16="http://schemas.microsoft.com/office/drawing/2014/main" id="{753D0EC6-67F3-4611-B990-1174C22AE9D6}"/>
+                <a16:creationId xmlns:a16="http://schemas.microsoft.com/office/drawing/2014/main" id="{7DCEB8B7-65B2-4961-846A-97CD75062B4E}"/>
               </a:ext>
             </a:extLst>
           </p:cNvPr>
@@ -11981,16 +8992,19 @@
           <a:bodyPr/>
           <a:lstStyle/>
           <a:p>
-            <a:endParaRPr lang="en-US"/>
+            <a:r>
+              <a:rPr lang="en-US" dirty="0"/>
+              <a:t>Poverty and Median Family Income</a:t>
+            </a:r>
           </a:p>
         </p:txBody>
       </p:sp>
       <p:sp>
         <p:nvSpPr>
-          <p:cNvPr id="4" name="Text Placeholder 3">
+          <p:cNvPr id="5" name="Content Placeholder 4">
             <a:extLst>
               <a:ext uri="{FF2B5EF4-FFF2-40B4-BE49-F238E27FC236}">
-                <a16:creationId xmlns:a16="http://schemas.microsoft.com/office/drawing/2014/main" id="{DAAC1E2C-A6B2-4FC9-9E03-A586DAEB1DDA}"/>
+                <a16:creationId xmlns:a16="http://schemas.microsoft.com/office/drawing/2014/main" id="{4BDA0F49-5DF2-4EDF-A30F-24DF220E4764}"/>
               </a:ext>
             </a:extLst>
           </p:cNvPr>
@@ -11998,7 +9012,7 @@
             <a:spLocks noGrp="1"/>
           </p:cNvSpPr>
           <p:nvPr>
-            <p:ph type="body" sz="half" idx="2"/>
+            <p:ph idx="1"/>
           </p:nvPr>
         </p:nvSpPr>
         <p:spPr/>
@@ -12006,14 +9020,14 @@
           <a:bodyPr/>
           <a:lstStyle/>
           <a:p>
-            <a:endParaRPr lang="en-US"/>
+            <a:endParaRPr lang="en-US" dirty="0"/>
           </a:p>
         </p:txBody>
       </p:sp>
     </p:spTree>
     <p:extLst>
       <p:ext uri="{BB962C8B-B14F-4D97-AF65-F5344CB8AC3E}">
-        <p14:creationId xmlns:p14="http://schemas.microsoft.com/office/powerpoint/2010/main" val="57412028"/>
+        <p14:creationId xmlns:p14="http://schemas.microsoft.com/office/powerpoint/2010/main" val="294699604"/>
       </p:ext>
     </p:extLst>
   </p:cSld>
@@ -12309,15 +9323,6 @@
 </file>
 
 <file path=customXml/item2.xml><?xml version="1.0" encoding="utf-8"?>
-<?mso-contentType ?>
-<FormTemplates xmlns="http://schemas.microsoft.com/sharepoint/v3/contenttype/forms">
-  <Display>DocumentLibraryForm</Display>
-  <Edit>DocumentLibraryForm</Edit>
-  <New>DocumentLibraryForm</New>
-</FormTemplates>
-</file>
-
-<file path=customXml/item3.xml><?xml version="1.0" encoding="utf-8"?>
 <ct:contentTypeSchema xmlns:ct="http://schemas.microsoft.com/office/2006/metadata/contentType" xmlns:ma="http://schemas.microsoft.com/office/2006/metadata/properties/metaAttributes" ct:_="" ma:_="" ma:contentTypeName="Document" ma:contentTypeID="0x01010079F111ED35F8CC479449609E8A0923A6" ma:contentTypeVersion="12" ma:contentTypeDescription="Create a new document." ma:contentTypeScope="" ma:versionID="a410dd7f93c95333ffa1b60ed6adedd1">
   <xsd:schema xmlns:xsd="http://www.w3.org/2001/XMLSchema" xmlns:xs="http://www.w3.org/2001/XMLSchema" xmlns:p="http://schemas.microsoft.com/office/2006/metadata/properties" xmlns:ns2="71af3243-3dd4-4a8d-8c0d-dd76da1f02a5" xmlns:ns3="16c05727-aa75-4e4a-9b5f-8a80a1165891" targetNamespace="http://schemas.microsoft.com/office/2006/metadata/properties" ma:root="true" ma:fieldsID="a936d9baba76aa3866493feff160faab" ns2:_="" ns3:_="">
     <xsd:import namespace="71af3243-3dd4-4a8d-8c0d-dd76da1f02a5"/>
@@ -12538,6 +9543,15 @@
 </ct:contentTypeSchema>
 </file>
 
+<file path=customXml/item3.xml><?xml version="1.0" encoding="utf-8"?>
+<?mso-contentType ?>
+<FormTemplates xmlns="http://schemas.microsoft.com/sharepoint/v3/contenttype/forms">
+  <Display>DocumentLibraryForm</Display>
+  <Edit>DocumentLibraryForm</Edit>
+  <New>DocumentLibraryForm</New>
+</FormTemplates>
+</file>
+
 <file path=customXml/itemProps1.xml><?xml version="1.0" encoding="utf-8"?>
 <ds:datastoreItem xmlns:ds="http://schemas.openxmlformats.org/officeDocument/2006/customXml" ds:itemID="{137651BA-F45C-4845-9AB3-E0A65B39F5E1}">
   <ds:schemaRefs>
@@ -12549,14 +9563,6 @@
 </file>
 
 <file path=customXml/itemProps2.xml><?xml version="1.0" encoding="utf-8"?>
-<ds:datastoreItem xmlns:ds="http://schemas.openxmlformats.org/officeDocument/2006/customXml" ds:itemID="{CDB58277-F8DF-46FF-84EC-EF41B835E69F}">
-  <ds:schemaRefs>
-    <ds:schemaRef ds:uri="http://schemas.microsoft.com/sharepoint/v3/contenttype/forms"/>
-  </ds:schemaRefs>
-</ds:datastoreItem>
-</file>
-
-<file path=customXml/itemProps3.xml><?xml version="1.0" encoding="utf-8"?>
 <ds:datastoreItem xmlns:ds="http://schemas.openxmlformats.org/officeDocument/2006/customXml" ds:itemID="{2D276E62-80A3-44DD-9BCC-97ED2B99B57F}">
   <ds:schemaRefs>
     <ds:schemaRef ds:uri="http://schemas.microsoft.com/office/2006/metadata/contentType"/>
@@ -12573,4 +9579,12 @@
     <ds:schemaRef ds:uri="http://schemas.microsoft.com/internal/obd"/>
   </ds:schemaRefs>
 </ds:datastoreItem>
+</file>
+
+<file path=customXml/itemProps3.xml><?xml version="1.0" encoding="utf-8"?>
+<ds:datastoreItem xmlns:ds="http://schemas.openxmlformats.org/officeDocument/2006/customXml" ds:itemID="{CDB58277-F8DF-46FF-84EC-EF41B835E69F}">
+  <ds:schemaRefs>
+    <ds:schemaRef ds:uri="http://schemas.microsoft.com/sharepoint/v3/contenttype/forms"/>
+  </ds:schemaRefs>
+</ds:datastoreItem>
 </file>
</xml_diff>

<commit_message>
updated Power Point with suggested changes
</commit_message>
<xml_diff>
--- a/NSS Capstone Ann Rumsey.pptx
+++ b/NSS Capstone Ann Rumsey.pptx
@@ -18,13 +18,13 @@
     <p:sldId id="270" r:id="rId12"/>
     <p:sldId id="287" r:id="rId13"/>
     <p:sldId id="292" r:id="rId14"/>
-    <p:sldId id="266" r:id="rId15"/>
-    <p:sldId id="293" r:id="rId16"/>
-    <p:sldId id="274" r:id="rId17"/>
-    <p:sldId id="265" r:id="rId18"/>
-    <p:sldId id="282" r:id="rId19"/>
-    <p:sldId id="283" r:id="rId20"/>
-    <p:sldId id="280" r:id="rId21"/>
+    <p:sldId id="295" r:id="rId15"/>
+    <p:sldId id="294" r:id="rId16"/>
+    <p:sldId id="265" r:id="rId17"/>
+    <p:sldId id="282" r:id="rId18"/>
+    <p:sldId id="283" r:id="rId19"/>
+    <p:sldId id="280" r:id="rId20"/>
+    <p:sldId id="274" r:id="rId21"/>
   </p:sldIdLst>
   <p:sldSz cx="12192000" cy="6858000"/>
   <p:notesSz cx="6858000" cy="9144000"/>
@@ -126,6 +126,9 @@
   <p:extLst>
     <p:ext uri="{EFAFB233-063F-42B5-8137-9DF3F51BA10A}">
       <p15:sldGuideLst xmlns:p15="http://schemas.microsoft.com/office/powerpoint/2012/main"/>
+    </p:ext>
+    <p:ext uri="{2D200454-40CA-4A62-9FC3-DE9A4176ACB9}">
+      <p15:notesGuideLst xmlns:p15="http://schemas.microsoft.com/office/powerpoint/2012/main"/>
     </p:ext>
   </p:extLst>
 </p:presentation>
@@ -7629,7 +7632,7 @@
           <a:p>
             <a:fld id="{AD9D857C-FF83-4289-BDE6-391ACE68FC06}" type="datetimeFigureOut">
               <a:rPr lang="en-US" smtClean="0"/>
-              <a:t>6/19/2020</a:t>
+              <a:t>6/20/2020</a:t>
             </a:fld>
             <a:endParaRPr lang="en-US"/>
           </a:p>
@@ -8584,7 +8587,7 @@
           <a:p>
             <a:fld id="{EA0C0817-A112-4847-8014-A94B7D2A4EA3}" type="datetime1">
               <a:rPr lang="en-US" smtClean="0"/>
-              <a:t>6/19/2020</a:t>
+              <a:t>6/20/2020</a:t>
             </a:fld>
             <a:endParaRPr lang="en-US" dirty="0"/>
           </a:p>
@@ -8806,7 +8809,7 @@
           <a:p>
             <a:fld id="{627ED9C8-F09A-4D9E-BEC0-4725162E21FF}" type="datetimeFigureOut">
               <a:rPr lang="en-US" smtClean="0"/>
-              <a:t>6/19/2020</a:t>
+              <a:t>6/20/2020</a:t>
             </a:fld>
             <a:endParaRPr lang="en-US"/>
           </a:p>
@@ -8974,7 +8977,7 @@
           <a:p>
             <a:fld id="{627ED9C8-F09A-4D9E-BEC0-4725162E21FF}" type="datetimeFigureOut">
               <a:rPr lang="en-US" smtClean="0"/>
-              <a:t>6/19/2020</a:t>
+              <a:t>6/20/2020</a:t>
             </a:fld>
             <a:endParaRPr lang="en-US"/>
           </a:p>
@@ -9219,7 +9222,7 @@
           <a:p>
             <a:fld id="{627ED9C8-F09A-4D9E-BEC0-4725162E21FF}" type="datetimeFigureOut">
               <a:rPr lang="en-US" smtClean="0"/>
-              <a:t>6/19/2020</a:t>
+              <a:t>6/20/2020</a:t>
             </a:fld>
             <a:endParaRPr lang="en-US"/>
           </a:p>
@@ -9448,7 +9451,7 @@
           <a:p>
             <a:fld id="{627ED9C8-F09A-4D9E-BEC0-4725162E21FF}" type="datetimeFigureOut">
               <a:rPr lang="en-US" smtClean="0"/>
-              <a:t>6/19/2020</a:t>
+              <a:t>6/20/2020</a:t>
             </a:fld>
             <a:endParaRPr lang="en-US"/>
           </a:p>
@@ -9812,7 +9815,7 @@
           <a:p>
             <a:fld id="{627ED9C8-F09A-4D9E-BEC0-4725162E21FF}" type="datetimeFigureOut">
               <a:rPr lang="en-US" smtClean="0"/>
-              <a:t>6/19/2020</a:t>
+              <a:t>6/20/2020</a:t>
             </a:fld>
             <a:endParaRPr lang="en-US"/>
           </a:p>
@@ -9929,7 +9932,7 @@
           <a:p>
             <a:fld id="{627ED9C8-F09A-4D9E-BEC0-4725162E21FF}" type="datetimeFigureOut">
               <a:rPr lang="en-US" smtClean="0"/>
-              <a:t>6/19/2020</a:t>
+              <a:t>6/20/2020</a:t>
             </a:fld>
             <a:endParaRPr lang="en-US"/>
           </a:p>
@@ -10024,7 +10027,7 @@
           <a:p>
             <a:fld id="{627ED9C8-F09A-4D9E-BEC0-4725162E21FF}" type="datetimeFigureOut">
               <a:rPr lang="en-US" smtClean="0"/>
-              <a:t>6/19/2020</a:t>
+              <a:t>6/20/2020</a:t>
             </a:fld>
             <a:endParaRPr lang="en-US"/>
           </a:p>
@@ -10299,7 +10302,7 @@
           <a:p>
             <a:fld id="{627ED9C8-F09A-4D9E-BEC0-4725162E21FF}" type="datetimeFigureOut">
               <a:rPr lang="en-US" smtClean="0"/>
-              <a:t>6/19/2020</a:t>
+              <a:t>6/20/2020</a:t>
             </a:fld>
             <a:endParaRPr lang="en-US"/>
           </a:p>
@@ -10551,7 +10554,7 @@
           <a:p>
             <a:fld id="{627ED9C8-F09A-4D9E-BEC0-4725162E21FF}" type="datetimeFigureOut">
               <a:rPr lang="en-US" smtClean="0"/>
-              <a:t>6/19/2020</a:t>
+              <a:t>6/20/2020</a:t>
             </a:fld>
             <a:endParaRPr lang="en-US"/>
           </a:p>
@@ -10719,7 +10722,7 @@
           <a:p>
             <a:fld id="{627ED9C8-F09A-4D9E-BEC0-4725162E21FF}" type="datetimeFigureOut">
               <a:rPr lang="en-US" smtClean="0"/>
-              <a:t>6/19/2020</a:t>
+              <a:t>6/20/2020</a:t>
             </a:fld>
             <a:endParaRPr lang="en-US"/>
           </a:p>
@@ -10889,7 +10892,7 @@
           <a:p>
             <a:fld id="{7332B432-ACDA-4023-A761-2BAB76577B62}" type="datetime1">
               <a:rPr lang="en-US" smtClean="0"/>
-              <a:t>6/19/2020</a:t>
+              <a:t>6/20/2020</a:t>
             </a:fld>
             <a:endParaRPr lang="en-US" dirty="0"/>
           </a:p>
@@ -11067,7 +11070,7 @@
           <a:p>
             <a:fld id="{627ED9C8-F09A-4D9E-BEC0-4725162E21FF}" type="datetimeFigureOut">
               <a:rPr lang="en-US" smtClean="0"/>
-              <a:t>6/19/2020</a:t>
+              <a:t>6/20/2020</a:t>
             </a:fld>
             <a:endParaRPr lang="en-US"/>
           </a:p>
@@ -11666,7 +11669,7 @@
           <a:p>
             <a:fld id="{D9C646AA-F36E-4540-911D-FFFC0A0EF24A}" type="datetime1">
               <a:rPr lang="en-US" smtClean="0"/>
-              <a:t>6/19/2020</a:t>
+              <a:t>6/20/2020</a:t>
             </a:fld>
             <a:endParaRPr lang="en-US" dirty="0"/>
           </a:p>
@@ -11986,7 +11989,7 @@
           <a:p>
             <a:fld id="{69186D26-FA5F-4637-B602-B7C2DC34CFD4}" type="datetime1">
               <a:rPr lang="en-US" smtClean="0"/>
-              <a:t>6/19/2020</a:t>
+              <a:t>6/20/2020</a:t>
             </a:fld>
             <a:endParaRPr lang="en-US" dirty="0"/>
           </a:p>
@@ -12423,7 +12426,7 @@
           <a:p>
             <a:fld id="{8A7F15D8-96D1-4781-BC50-CA8A088B2FE4}" type="datetime1">
               <a:rPr lang="en-US" smtClean="0"/>
-              <a:t>6/19/2020</a:t>
+              <a:t>6/20/2020</a:t>
             </a:fld>
             <a:endParaRPr lang="en-US" dirty="0"/>
           </a:p>
@@ -12541,7 +12544,7 @@
           <a:p>
             <a:fld id="{F9A96C99-B8F8-4528-BD05-0E16E943DC09}" type="datetime1">
               <a:rPr lang="en-US" smtClean="0"/>
-              <a:t>6/19/2020</a:t>
+              <a:t>6/20/2020</a:t>
             </a:fld>
             <a:endParaRPr lang="en-US" dirty="0"/>
           </a:p>
@@ -12636,7 +12639,7 @@
           <a:p>
             <a:fld id="{03636942-C211-4B28-8DBD-C953E00AF71B}" type="datetime1">
               <a:rPr lang="en-US" smtClean="0"/>
-              <a:t>6/19/2020</a:t>
+              <a:t>6/20/2020</a:t>
             </a:fld>
             <a:endParaRPr lang="en-US" dirty="0"/>
           </a:p>
@@ -13053,7 +13056,7 @@
           <a:p>
             <a:fld id="{7E8D12A6-918A-48BD-8CB9-CA713993B0EA}" type="datetime1">
               <a:rPr lang="en-US" smtClean="0"/>
-              <a:t>6/19/2020</a:t>
+              <a:t>6/20/2020</a:t>
             </a:fld>
             <a:endParaRPr lang="en-US" dirty="0"/>
           </a:p>
@@ -13315,7 +13318,7 @@
             <a:fld id="{E778CE86-875F-4587-BCF6-FA054AFC0D53}" type="datetime1">
               <a:rPr lang="en-US" smtClean="0"/>
               <a:pPr/>
-              <a:t>6/19/2020</a:t>
+              <a:t>6/20/2020</a:t>
             </a:fld>
             <a:endParaRPr lang="en-US" dirty="0"/>
           </a:p>
@@ -13831,7 +13834,7 @@
           <a:p>
             <a:fld id="{F6FA2B21-3FCD-4721-B95C-427943F61125}" type="datetime1">
               <a:rPr lang="en-US" smtClean="0"/>
-              <a:t>6/19/2020</a:t>
+              <a:t>6/20/2020</a:t>
             </a:fld>
             <a:endParaRPr lang="en-US" dirty="0"/>
           </a:p>
@@ -14431,7 +14434,7 @@
           <a:p>
             <a:fld id="{627ED9C8-F09A-4D9E-BEC0-4725162E21FF}" type="datetimeFigureOut">
               <a:rPr lang="en-US" smtClean="0"/>
-              <a:t>6/19/2020</a:t>
+              <a:t>6/20/2020</a:t>
             </a:fld>
             <a:endParaRPr lang="en-US"/>
           </a:p>
@@ -15067,6 +15070,14 @@
 <file path=ppt/slides/slide10.xml><?xml version="1.0" encoding="utf-8"?>
 <p:sld xmlns:a="http://schemas.openxmlformats.org/drawingml/2006/main" xmlns:r="http://schemas.openxmlformats.org/officeDocument/2006/relationships" xmlns:p="http://schemas.openxmlformats.org/presentationml/2006/main">
   <p:cSld>
+    <p:bg>
+      <p:bgPr>
+        <a:solidFill>
+          <a:schemeClr val="bg1"/>
+        </a:solidFill>
+        <a:effectLst/>
+      </p:bgPr>
+    </p:bg>
     <p:spTree>
       <p:nvGrpSpPr>
         <p:cNvPr id="1" name=""/>
@@ -15083,32 +15094,39 @@
       </p:grpSpPr>
       <p:pic>
         <p:nvPicPr>
-          <p:cNvPr id="3" name="Picture">
-            <a:hlinkClick r:id="rId2"/>
+          <p:cNvPr id="6" name="Picture 5" descr="A picture containing measure, comb&#10;&#10;Description automatically generated">
+            <a:extLst>
+              <a:ext uri="{FF2B5EF4-FFF2-40B4-BE49-F238E27FC236}">
+                <a16:creationId xmlns:a16="http://schemas.microsoft.com/office/drawing/2014/main" id="{1456E8BC-5766-455C-B1FB-73E5B694D49C}"/>
+              </a:ext>
+            </a:extLst>
           </p:cNvPr>
           <p:cNvPicPr>
             <a:picLocks noChangeAspect="1"/>
           </p:cNvPicPr>
           <p:nvPr/>
         </p:nvPicPr>
-        <p:blipFill>
-          <a:blip r:embed="rId3"/>
-          <a:stretch>
-            <a:fillRect/>
-          </a:stretch>
+        <p:blipFill rotWithShape="1">
+          <a:blip r:embed="rId2"/>
+          <a:srcRect t="5462"/>
+          <a:stretch/>
         </p:blipFill>
         <p:spPr>
           <a:xfrm>
-            <a:off x="76200" y="0"/>
-            <a:ext cx="12020550" cy="6858000"/>
+            <a:off x="20" y="10"/>
+            <a:ext cx="12191980" cy="6857990"/>
           </a:xfrm>
           <a:prstGeom prst="rect">
             <a:avLst/>
           </a:prstGeom>
-          <a:noFill/>
         </p:spPr>
       </p:pic>
     </p:spTree>
+    <p:extLst>
+      <p:ext uri="{BB962C8B-B14F-4D97-AF65-F5344CB8AC3E}">
+        <p14:creationId xmlns:p14="http://schemas.microsoft.com/office/powerpoint/2010/main" val="3917905493"/>
+      </p:ext>
+    </p:extLst>
   </p:cSld>
   <p:clrMapOvr>
     <a:masterClrMapping/>
@@ -15135,10 +15153,10 @@
       </p:grpSpPr>
       <p:pic>
         <p:nvPicPr>
-          <p:cNvPr id="5" name="Picture 4">
+          <p:cNvPr id="6" name="Picture 5" descr="A picture containing pencil, truck, sitting&#10;&#10;Description automatically generated">
             <a:extLst>
               <a:ext uri="{FF2B5EF4-FFF2-40B4-BE49-F238E27FC236}">
-                <a16:creationId xmlns:a16="http://schemas.microsoft.com/office/drawing/2014/main" id="{2AA849E7-2B58-4EFF-BBDB-4FDFCFED6C2C}"/>
+                <a16:creationId xmlns:a16="http://schemas.microsoft.com/office/drawing/2014/main" id="{F91B5AE7-C815-45EE-9461-9177F1C83516}"/>
               </a:ext>
             </a:extLst>
           </p:cNvPr>
@@ -15155,8 +15173,8 @@
         </p:blipFill>
         <p:spPr>
           <a:xfrm>
-            <a:off x="436983" y="0"/>
-            <a:ext cx="11318033" cy="6858000"/>
+            <a:off x="41885" y="0"/>
+            <a:ext cx="12108230" cy="6858000"/>
           </a:xfrm>
           <a:prstGeom prst="rect">
             <a:avLst/>
@@ -15166,7 +15184,7 @@
     </p:spTree>
     <p:extLst>
       <p:ext uri="{BB962C8B-B14F-4D97-AF65-F5344CB8AC3E}">
-        <p14:creationId xmlns:p14="http://schemas.microsoft.com/office/powerpoint/2010/main" val="2402169047"/>
+        <p14:creationId xmlns:p14="http://schemas.microsoft.com/office/powerpoint/2010/main" val="2572025998"/>
       </p:ext>
     </p:extLst>
   </p:cSld>
@@ -15177,148 +15195,6 @@
 </file>
 
 <file path=ppt/slides/slide12.xml><?xml version="1.0" encoding="utf-8"?>
-<p:sld xmlns:a="http://schemas.openxmlformats.org/drawingml/2006/main" xmlns:r="http://schemas.openxmlformats.org/officeDocument/2006/relationships" xmlns:p="http://schemas.openxmlformats.org/presentationml/2006/main">
-  <p:cSld>
-    <p:spTree>
-      <p:nvGrpSpPr>
-        <p:cNvPr id="1" name=""/>
-        <p:cNvGrpSpPr/>
-        <p:nvPr/>
-      </p:nvGrpSpPr>
-      <p:grpSpPr>
-        <a:xfrm>
-          <a:off x="0" y="0"/>
-          <a:ext cx="0" cy="0"/>
-          <a:chOff x="0" y="0"/>
-          <a:chExt cx="0" cy="0"/>
-        </a:xfrm>
-      </p:grpSpPr>
-      <p:sp>
-        <p:nvSpPr>
-          <p:cNvPr id="2" name="Title 1">
-            <a:extLst>
-              <a:ext uri="{FF2B5EF4-FFF2-40B4-BE49-F238E27FC236}">
-                <a16:creationId xmlns:a16="http://schemas.microsoft.com/office/drawing/2014/main" id="{7DCEB8B7-65B2-4961-846A-97CD75062B4E}"/>
-              </a:ext>
-            </a:extLst>
-          </p:cNvPr>
-          <p:cNvSpPr>
-            <a:spLocks noGrp="1"/>
-          </p:cNvSpPr>
-          <p:nvPr>
-            <p:ph type="title"/>
-          </p:nvPr>
-        </p:nvSpPr>
-        <p:spPr>
-          <a:xfrm>
-            <a:off x="1066800" y="642594"/>
-            <a:ext cx="10058400" cy="1371600"/>
-          </a:xfrm>
-        </p:spPr>
-        <p:txBody>
-          <a:bodyPr anchor="ctr">
-            <a:normAutofit/>
-          </a:bodyPr>
-          <a:lstStyle/>
-          <a:p>
-            <a:r>
-              <a:rPr lang="en-US" dirty="0"/>
-              <a:t>Poverty and Median Family Income</a:t>
-            </a:r>
-          </a:p>
-        </p:txBody>
-      </p:sp>
-      <p:sp>
-        <p:nvSpPr>
-          <p:cNvPr id="9" name="Text Placeholder 3">
-            <a:extLst>
-              <a:ext uri="{FF2B5EF4-FFF2-40B4-BE49-F238E27FC236}">
-                <a16:creationId xmlns:a16="http://schemas.microsoft.com/office/drawing/2014/main" id="{7A259E0A-D07F-43B4-8893-49AAB9F519BD}"/>
-              </a:ext>
-            </a:extLst>
-          </p:cNvPr>
-          <p:cNvSpPr>
-            <a:spLocks noGrp="1"/>
-          </p:cNvSpPr>
-          <p:nvPr>
-            <p:ph sz="half" idx="1"/>
-          </p:nvPr>
-        </p:nvSpPr>
-        <p:spPr>
-          <a:xfrm>
-            <a:off x="1066800" y="2103120"/>
-            <a:ext cx="4663440" cy="3749040"/>
-          </a:xfrm>
-        </p:spPr>
-        <p:txBody>
-          <a:bodyPr>
-            <a:normAutofit/>
-          </a:bodyPr>
-          <a:lstStyle/>
-          <a:p>
-            <a:r>
-              <a:rPr lang="en-US" dirty="0"/>
-              <a:t>Filter by State</a:t>
-            </a:r>
-          </a:p>
-          <a:p>
-            <a:r>
-              <a:rPr lang="en-US" dirty="0"/>
-              <a:t>Tennessee</a:t>
-            </a:r>
-          </a:p>
-          <a:p>
-            <a:r>
-              <a:rPr lang="en-US" dirty="0"/>
-              <a:t>County level</a:t>
-            </a:r>
-          </a:p>
-        </p:txBody>
-      </p:sp>
-      <p:pic>
-        <p:nvPicPr>
-          <p:cNvPr id="4" name="Content Placeholder 3" descr="A picture containing text, map&#10;&#10;Description automatically generated">
-            <a:extLst>
-              <a:ext uri="{FF2B5EF4-FFF2-40B4-BE49-F238E27FC236}">
-                <a16:creationId xmlns:a16="http://schemas.microsoft.com/office/drawing/2014/main" id="{71334F23-A2D5-4ECE-B8D0-57CA73EE81FF}"/>
-              </a:ext>
-            </a:extLst>
-          </p:cNvPr>
-          <p:cNvPicPr>
-            <a:picLocks noGrp="1" noChangeAspect="1"/>
-          </p:cNvPicPr>
-          <p:nvPr>
-            <p:ph sz="half" idx="2"/>
-          </p:nvPr>
-        </p:nvPicPr>
-        <p:blipFill>
-          <a:blip r:embed="rId2"/>
-          <a:stretch>
-            <a:fillRect/>
-          </a:stretch>
-        </p:blipFill>
-        <p:spPr>
-          <a:xfrm>
-            <a:off x="3048000" y="1782618"/>
-            <a:ext cx="8077200" cy="4039220"/>
-          </a:xfrm>
-          <a:noFill/>
-        </p:spPr>
-      </p:pic>
-    </p:spTree>
-    <p:extLst>
-      <p:ext uri="{BB962C8B-B14F-4D97-AF65-F5344CB8AC3E}">
-        <p14:creationId xmlns:p14="http://schemas.microsoft.com/office/powerpoint/2010/main" val="294699604"/>
-      </p:ext>
-    </p:extLst>
-  </p:cSld>
-  <p:clrMapOvr>
-    <a:masterClrMapping/>
-  </p:clrMapOvr>
-</p:sld>
-</file>
-
-<file path=ppt/slides/slide13.xml><?xml version="1.0" encoding="utf-8"?>
 <p:sld xmlns:a="http://schemas.openxmlformats.org/drawingml/2006/main" xmlns:r="http://schemas.openxmlformats.org/officeDocument/2006/relationships" xmlns:p="http://schemas.openxmlformats.org/presentationml/2006/main">
   <p:cSld>
     <p:spTree>
@@ -15433,13 +15309,7 @@
               <a:rPr lang="en-US" dirty="0">
                 <a:hlinkClick r:id="rId4"/>
               </a:rPr>
-              <a:t> </a:t>
-            </a:r>
-            <a:r>
-              <a:rPr lang="en-US" dirty="0">
-                <a:hlinkClick r:id="rId4"/>
-              </a:rPr>
-              <a:t>https://www.fns.usda.gov/research-analysis</a:t>
+              <a:t> https://www.fns.usda.gov/research-analysis</a:t>
             </a:r>
             <a:endParaRPr lang="en-US" dirty="0"/>
           </a:p>
@@ -15558,7 +15428,7 @@
 </p:sld>
 </file>
 
-<file path=ppt/slides/slide14.xml><?xml version="1.0" encoding="utf-8"?>
+<file path=ppt/slides/slide13.xml><?xml version="1.0" encoding="utf-8"?>
 <p:sld xmlns:a="http://schemas.openxmlformats.org/drawingml/2006/main" xmlns:r="http://schemas.openxmlformats.org/officeDocument/2006/relationships" xmlns:p="http://schemas.openxmlformats.org/presentationml/2006/main">
   <p:cSld>
     <p:spTree>
@@ -16021,7 +15891,7 @@
 </p:sld>
 </file>
 
-<file path=ppt/slides/slide15.xml><?xml version="1.0" encoding="utf-8"?>
+<file path=ppt/slides/slide14.xml><?xml version="1.0" encoding="utf-8"?>
 <p:sld xmlns:a="http://schemas.openxmlformats.org/drawingml/2006/main" xmlns:r="http://schemas.openxmlformats.org/officeDocument/2006/relationships" xmlns:p="http://schemas.openxmlformats.org/presentationml/2006/main">
   <p:cSld>
     <p:spTree>
@@ -16203,7 +16073,7 @@
 </p:sld>
 </file>
 
-<file path=ppt/slides/slide16.xml><?xml version="1.0" encoding="utf-8"?>
+<file path=ppt/slides/slide15.xml><?xml version="1.0" encoding="utf-8"?>
 <p:sld xmlns:a="http://schemas.openxmlformats.org/drawingml/2006/main" xmlns:r="http://schemas.openxmlformats.org/officeDocument/2006/relationships" xmlns:p="http://schemas.openxmlformats.org/presentationml/2006/main">
   <p:cSld>
     <p:spTree>
@@ -16336,6 +16206,148 @@
     <p:extLst>
       <p:ext uri="{BB962C8B-B14F-4D97-AF65-F5344CB8AC3E}">
         <p14:creationId xmlns:p14="http://schemas.microsoft.com/office/powerpoint/2010/main" val="2169139774"/>
+      </p:ext>
+    </p:extLst>
+  </p:cSld>
+  <p:clrMapOvr>
+    <a:masterClrMapping/>
+  </p:clrMapOvr>
+</p:sld>
+</file>
+
+<file path=ppt/slides/slide16.xml><?xml version="1.0" encoding="utf-8"?>
+<p:sld xmlns:a="http://schemas.openxmlformats.org/drawingml/2006/main" xmlns:r="http://schemas.openxmlformats.org/officeDocument/2006/relationships" xmlns:p="http://schemas.openxmlformats.org/presentationml/2006/main">
+  <p:cSld>
+    <p:spTree>
+      <p:nvGrpSpPr>
+        <p:cNvPr id="1" name=""/>
+        <p:cNvGrpSpPr/>
+        <p:nvPr/>
+      </p:nvGrpSpPr>
+      <p:grpSpPr>
+        <a:xfrm>
+          <a:off x="0" y="0"/>
+          <a:ext cx="0" cy="0"/>
+          <a:chOff x="0" y="0"/>
+          <a:chExt cx="0" cy="0"/>
+        </a:xfrm>
+      </p:grpSpPr>
+      <p:sp>
+        <p:nvSpPr>
+          <p:cNvPr id="2" name="Title 1">
+            <a:extLst>
+              <a:ext uri="{FF2B5EF4-FFF2-40B4-BE49-F238E27FC236}">
+                <a16:creationId xmlns:a16="http://schemas.microsoft.com/office/drawing/2014/main" id="{7DCEB8B7-65B2-4961-846A-97CD75062B4E}"/>
+              </a:ext>
+            </a:extLst>
+          </p:cNvPr>
+          <p:cNvSpPr>
+            <a:spLocks noGrp="1"/>
+          </p:cNvSpPr>
+          <p:nvPr>
+            <p:ph type="title"/>
+          </p:nvPr>
+        </p:nvSpPr>
+        <p:spPr>
+          <a:xfrm>
+            <a:off x="1066800" y="642594"/>
+            <a:ext cx="10058400" cy="1371600"/>
+          </a:xfrm>
+        </p:spPr>
+        <p:txBody>
+          <a:bodyPr anchor="ctr">
+            <a:normAutofit/>
+          </a:bodyPr>
+          <a:lstStyle/>
+          <a:p>
+            <a:r>
+              <a:rPr lang="en-US" dirty="0"/>
+              <a:t>Poverty and Median Family Income</a:t>
+            </a:r>
+          </a:p>
+        </p:txBody>
+      </p:sp>
+      <p:sp>
+        <p:nvSpPr>
+          <p:cNvPr id="9" name="Text Placeholder 3">
+            <a:extLst>
+              <a:ext uri="{FF2B5EF4-FFF2-40B4-BE49-F238E27FC236}">
+                <a16:creationId xmlns:a16="http://schemas.microsoft.com/office/drawing/2014/main" id="{7A259E0A-D07F-43B4-8893-49AAB9F519BD}"/>
+              </a:ext>
+            </a:extLst>
+          </p:cNvPr>
+          <p:cNvSpPr>
+            <a:spLocks noGrp="1"/>
+          </p:cNvSpPr>
+          <p:nvPr>
+            <p:ph sz="half" idx="1"/>
+          </p:nvPr>
+        </p:nvSpPr>
+        <p:spPr>
+          <a:xfrm>
+            <a:off x="1066800" y="2103120"/>
+            <a:ext cx="4663440" cy="3749040"/>
+          </a:xfrm>
+        </p:spPr>
+        <p:txBody>
+          <a:bodyPr>
+            <a:normAutofit/>
+          </a:bodyPr>
+          <a:lstStyle/>
+          <a:p>
+            <a:r>
+              <a:rPr lang="en-US" dirty="0"/>
+              <a:t>Filter by State</a:t>
+            </a:r>
+          </a:p>
+          <a:p>
+            <a:r>
+              <a:rPr lang="en-US" dirty="0"/>
+              <a:t>Tennessee</a:t>
+            </a:r>
+          </a:p>
+          <a:p>
+            <a:r>
+              <a:rPr lang="en-US" dirty="0"/>
+              <a:t>County level</a:t>
+            </a:r>
+          </a:p>
+        </p:txBody>
+      </p:sp>
+      <p:pic>
+        <p:nvPicPr>
+          <p:cNvPr id="4" name="Content Placeholder 3" descr="A picture containing text, map&#10;&#10;Description automatically generated">
+            <a:extLst>
+              <a:ext uri="{FF2B5EF4-FFF2-40B4-BE49-F238E27FC236}">
+                <a16:creationId xmlns:a16="http://schemas.microsoft.com/office/drawing/2014/main" id="{71334F23-A2D5-4ECE-B8D0-57CA73EE81FF}"/>
+              </a:ext>
+            </a:extLst>
+          </p:cNvPr>
+          <p:cNvPicPr>
+            <a:picLocks noGrp="1" noChangeAspect="1"/>
+          </p:cNvPicPr>
+          <p:nvPr>
+            <p:ph sz="half" idx="2"/>
+          </p:nvPr>
+        </p:nvPicPr>
+        <p:blipFill>
+          <a:blip r:embed="rId2"/>
+          <a:stretch>
+            <a:fillRect/>
+          </a:stretch>
+        </p:blipFill>
+        <p:spPr>
+          <a:xfrm>
+            <a:off x="3048000" y="1782618"/>
+            <a:ext cx="8077200" cy="4039220"/>
+          </a:xfrm>
+          <a:noFill/>
+        </p:spPr>
+      </p:pic>
+    </p:spTree>
+    <p:extLst>
+      <p:ext uri="{BB962C8B-B14F-4D97-AF65-F5344CB8AC3E}">
+        <p14:creationId xmlns:p14="http://schemas.microsoft.com/office/powerpoint/2010/main" val="294699604"/>
       </p:ext>
     </p:extLst>
   </p:cSld>
@@ -18924,21 +18936,21 @@
 </file>
 
 <file path=customXml/item1.xml><?xml version="1.0" encoding="utf-8"?>
+<p:properties xmlns:p="http://schemas.microsoft.com/office/2006/metadata/properties" xmlns:xsi="http://www.w3.org/2001/XMLSchema-instance" xmlns:pc="http://schemas.microsoft.com/office/infopath/2007/PartnerControls">
+  <documentManagement>
+    <Status xmlns="71af3243-3dd4-4a8d-8c0d-dd76da1f02a5">Not started</Status>
+    <MediaServiceKeyPoints xmlns="71af3243-3dd4-4a8d-8c0d-dd76da1f02a5" xsi:nil="true"/>
+  </documentManagement>
+</p:properties>
+</file>
+
+<file path=customXml/item2.xml><?xml version="1.0" encoding="utf-8"?>
 <?mso-contentType ?>
 <FormTemplates xmlns="http://schemas.microsoft.com/sharepoint/v3/contenttype/forms">
   <Display>DocumentLibraryForm</Display>
   <Edit>DocumentLibraryForm</Edit>
   <New>DocumentLibraryForm</New>
 </FormTemplates>
-</file>
-
-<file path=customXml/item2.xml><?xml version="1.0" encoding="utf-8"?>
-<p:properties xmlns:p="http://schemas.microsoft.com/office/2006/metadata/properties" xmlns:xsi="http://www.w3.org/2001/XMLSchema-instance" xmlns:pc="http://schemas.microsoft.com/office/infopath/2007/PartnerControls">
-  <documentManagement>
-    <Status xmlns="71af3243-3dd4-4a8d-8c0d-dd76da1f02a5">Not started</Status>
-    <MediaServiceKeyPoints xmlns="71af3243-3dd4-4a8d-8c0d-dd76da1f02a5" xsi:nil="true"/>
-  </documentManagement>
-</p:properties>
 </file>
 
 <file path=customXml/item3.xml><?xml version="1.0" encoding="utf-8"?>
@@ -19163,19 +19175,19 @@
 </file>
 
 <file path=customXml/itemProps1.xml><?xml version="1.0" encoding="utf-8"?>
-<ds:datastoreItem xmlns:ds="http://schemas.openxmlformats.org/officeDocument/2006/customXml" ds:itemID="{CDB58277-F8DF-46FF-84EC-EF41B835E69F}">
+<ds:datastoreItem xmlns:ds="http://schemas.openxmlformats.org/officeDocument/2006/customXml" ds:itemID="{137651BA-F45C-4845-9AB3-E0A65B39F5E1}">
   <ds:schemaRefs>
-    <ds:schemaRef ds:uri="http://schemas.microsoft.com/sharepoint/v3/contenttype/forms"/>
+    <ds:schemaRef ds:uri="http://schemas.microsoft.com/office/2006/metadata/properties"/>
+    <ds:schemaRef ds:uri="http://schemas.microsoft.com/office/infopath/2007/PartnerControls"/>
+    <ds:schemaRef ds:uri="71af3243-3dd4-4a8d-8c0d-dd76da1f02a5"/>
   </ds:schemaRefs>
 </ds:datastoreItem>
 </file>
 
 <file path=customXml/itemProps2.xml><?xml version="1.0" encoding="utf-8"?>
-<ds:datastoreItem xmlns:ds="http://schemas.openxmlformats.org/officeDocument/2006/customXml" ds:itemID="{137651BA-F45C-4845-9AB3-E0A65B39F5E1}">
+<ds:datastoreItem xmlns:ds="http://schemas.openxmlformats.org/officeDocument/2006/customXml" ds:itemID="{CDB58277-F8DF-46FF-84EC-EF41B835E69F}">
   <ds:schemaRefs>
-    <ds:schemaRef ds:uri="http://schemas.microsoft.com/office/2006/metadata/properties"/>
-    <ds:schemaRef ds:uri="http://schemas.microsoft.com/office/infopath/2007/PartnerControls"/>
-    <ds:schemaRef ds:uri="71af3243-3dd4-4a8d-8c0d-dd76da1f02a5"/>
+    <ds:schemaRef ds:uri="http://schemas.microsoft.com/sharepoint/v3/contenttype/forms"/>
   </ds:schemaRefs>
 </ds:datastoreItem>
 </file>

</xml_diff>